<commit_message>
jk now finished HW3.pptx
</commit_message>
<xml_diff>
--- a/HW3.pptx
+++ b/HW3.pptx
@@ -5,15 +5,16 @@
     <p:sldMasterId id="2147483673" r:id="rId1"/>
   </p:sldMasterIdLst>
   <p:notesMasterIdLst>
-    <p:notesMasterId r:id="rId8"/>
+    <p:notesMasterId r:id="rId9"/>
   </p:notesMasterIdLst>
   <p:sldIdLst>
     <p:sldId id="256" r:id="rId2"/>
     <p:sldId id="265" r:id="rId3"/>
     <p:sldId id="266" r:id="rId4"/>
-    <p:sldId id="267" r:id="rId5"/>
-    <p:sldId id="268" r:id="rId6"/>
-    <p:sldId id="269" r:id="rId7"/>
+    <p:sldId id="270" r:id="rId5"/>
+    <p:sldId id="267" r:id="rId6"/>
+    <p:sldId id="268" r:id="rId7"/>
+    <p:sldId id="269" r:id="rId8"/>
   </p:sldIdLst>
   <p:sldSz cx="12192000" cy="6858000"/>
   <p:notesSz cx="6858000" cy="9144000"/>
@@ -7515,17 +7516,17 @@
           <a:p>
             <a:r>
               <a:rPr lang="en-US" dirty="0"/>
-              <a:t>LIM</a:t>
+              <a:t>LIM - Concept</a:t>
             </a:r>
           </a:p>
         </p:txBody>
       </p:sp>
       <p:pic>
         <p:nvPicPr>
-          <p:cNvPr id="12" name="Picture 11">
-            <a:extLst>
-              <a:ext uri="{FF2B5EF4-FFF2-40B4-BE49-F238E27FC236}">
-                <a16:creationId xmlns:a16="http://schemas.microsoft.com/office/drawing/2014/main" id="{525DE596-D5AA-36BC-0D14-F0FE888B0864}"/>
+          <p:cNvPr id="24" name="Picture 23">
+            <a:extLst>
+              <a:ext uri="{FF2B5EF4-FFF2-40B4-BE49-F238E27FC236}">
+                <a16:creationId xmlns:a16="http://schemas.microsoft.com/office/drawing/2014/main" id="{B6951466-36EF-D772-23EC-1149F6225753}"/>
               </a:ext>
             </a:extLst>
           </p:cNvPr>
@@ -7542,8 +7543,8 @@
         </p:blipFill>
         <p:spPr>
           <a:xfrm>
-            <a:off x="3194539" y="4171915"/>
-            <a:ext cx="7772400" cy="2228239"/>
+            <a:off x="855469" y="2602781"/>
+            <a:ext cx="4659884" cy="1483555"/>
           </a:xfrm>
           <a:prstGeom prst="rect">
             <a:avLst/>
@@ -7552,10 +7553,10 @@
       </p:pic>
       <p:pic>
         <p:nvPicPr>
-          <p:cNvPr id="15" name="Picture 14">
-            <a:extLst>
-              <a:ext uri="{FF2B5EF4-FFF2-40B4-BE49-F238E27FC236}">
-                <a16:creationId xmlns:a16="http://schemas.microsoft.com/office/drawing/2014/main" id="{0C3C5EE6-1A92-4514-D141-7E0F91352F62}"/>
+          <p:cNvPr id="25" name="Picture 24">
+            <a:extLst>
+              <a:ext uri="{FF2B5EF4-FFF2-40B4-BE49-F238E27FC236}">
+                <a16:creationId xmlns:a16="http://schemas.microsoft.com/office/drawing/2014/main" id="{412AD11C-14C9-DA1D-1F88-DAE7AEC9B41E}"/>
               </a:ext>
             </a:extLst>
           </p:cNvPr>
@@ -7572,8 +7573,8 @@
         </p:blipFill>
         <p:spPr>
           <a:xfrm>
-            <a:off x="2232617" y="5571859"/>
-            <a:ext cx="765950" cy="828295"/>
+            <a:off x="534921" y="4582954"/>
+            <a:ext cx="4606703" cy="809772"/>
           </a:xfrm>
           <a:prstGeom prst="rect">
             <a:avLst/>
@@ -7582,10 +7583,10 @@
       </p:pic>
       <p:pic>
         <p:nvPicPr>
-          <p:cNvPr id="17" name="Picture 16">
-            <a:extLst>
-              <a:ext uri="{FF2B5EF4-FFF2-40B4-BE49-F238E27FC236}">
-                <a16:creationId xmlns:a16="http://schemas.microsoft.com/office/drawing/2014/main" id="{988F83AD-2F78-6A2E-EECB-8B83E34DA8B6}"/>
+          <p:cNvPr id="26" name="Picture 25">
+            <a:extLst>
+              <a:ext uri="{FF2B5EF4-FFF2-40B4-BE49-F238E27FC236}">
+                <a16:creationId xmlns:a16="http://schemas.microsoft.com/office/drawing/2014/main" id="{CE7B3BF3-2F7D-76ED-6FDC-BC9EFB1EB3E1}"/>
               </a:ext>
             </a:extLst>
           </p:cNvPr>
@@ -7602,8 +7603,8 @@
         </p:blipFill>
         <p:spPr>
           <a:xfrm>
-            <a:off x="2262825" y="4514635"/>
-            <a:ext cx="705533" cy="1029916"/>
+            <a:off x="2044833" y="5476594"/>
+            <a:ext cx="3096791" cy="1112107"/>
           </a:xfrm>
           <a:prstGeom prst="rect">
             <a:avLst/>
@@ -7612,10 +7613,10 @@
       </p:pic>
       <p:pic>
         <p:nvPicPr>
-          <p:cNvPr id="18" name="Picture 17">
-            <a:extLst>
-              <a:ext uri="{FF2B5EF4-FFF2-40B4-BE49-F238E27FC236}">
-                <a16:creationId xmlns:a16="http://schemas.microsoft.com/office/drawing/2014/main" id="{1C4CE6D2-6C7D-BAB9-9082-E325BF314174}"/>
+          <p:cNvPr id="27" name="Picture 26">
+            <a:extLst>
+              <a:ext uri="{FF2B5EF4-FFF2-40B4-BE49-F238E27FC236}">
+                <a16:creationId xmlns:a16="http://schemas.microsoft.com/office/drawing/2014/main" id="{833072F7-FB12-D82E-7959-902A1A866CE2}"/>
               </a:ext>
             </a:extLst>
           </p:cNvPr>
@@ -7632,20 +7633,232 @@
         </p:blipFill>
         <p:spPr>
           <a:xfrm>
-            <a:off x="1468190" y="3949308"/>
-            <a:ext cx="679072" cy="2908692"/>
+            <a:off x="828220" y="5722779"/>
+            <a:ext cx="1216613" cy="559642"/>
           </a:xfrm>
           <a:prstGeom prst="rect">
             <a:avLst/>
           </a:prstGeom>
         </p:spPr>
       </p:pic>
-      <p:sp>
-        <p:nvSpPr>
-          <p:cNvPr id="19" name="TextBox 18">
-            <a:extLst>
-              <a:ext uri="{FF2B5EF4-FFF2-40B4-BE49-F238E27FC236}">
-                <a16:creationId xmlns:a16="http://schemas.microsoft.com/office/drawing/2014/main" id="{9EB62826-E8C0-8C6F-2CFB-AC3C73276191}"/>
+      <p:graphicFrame>
+        <p:nvGraphicFramePr>
+          <p:cNvPr id="28" name="Table 28">
+            <a:extLst>
+              <a:ext uri="{FF2B5EF4-FFF2-40B4-BE49-F238E27FC236}">
+                <a16:creationId xmlns:a16="http://schemas.microsoft.com/office/drawing/2014/main" id="{D730CC76-E501-92B8-40E2-D1EFE3F77521}"/>
+              </a:ext>
+            </a:extLst>
+          </p:cNvPr>
+          <p:cNvGraphicFramePr>
+            <a:graphicFrameLocks noGrp="1"/>
+          </p:cNvGraphicFramePr>
+          <p:nvPr>
+            <p:extLst>
+              <p:ext uri="{D42A27DB-BD31-4B8C-83A1-F6EECF244321}">
+                <p14:modId xmlns:p14="http://schemas.microsoft.com/office/powerpoint/2010/main" val="2299244312"/>
+              </p:ext>
+            </p:extLst>
+          </p:nvPr>
+        </p:nvGraphicFramePr>
+        <p:xfrm>
+          <a:off x="6471137" y="2602652"/>
+          <a:ext cx="4243752" cy="741680"/>
+        </p:xfrm>
+        <a:graphic>
+          <a:graphicData uri="http://schemas.openxmlformats.org/drawingml/2006/table">
+            <a:tbl>
+              <a:tblPr firstRow="1" bandRow="1">
+                <a:tableStyleId>{7DF18680-E054-41AD-8BC1-D1AEF772440D}</a:tableStyleId>
+              </a:tblPr>
+              <a:tblGrid>
+                <a:gridCol w="707292">
+                  <a:extLst>
+                    <a:ext uri="{9D8B030D-6E8A-4147-A177-3AD203B41FA5}">
+                      <a16:colId xmlns:a16="http://schemas.microsoft.com/office/drawing/2014/main" val="1477033119"/>
+                    </a:ext>
+                  </a:extLst>
+                </a:gridCol>
+                <a:gridCol w="707292">
+                  <a:extLst>
+                    <a:ext uri="{9D8B030D-6E8A-4147-A177-3AD203B41FA5}">
+                      <a16:colId xmlns:a16="http://schemas.microsoft.com/office/drawing/2014/main" val="351217100"/>
+                    </a:ext>
+                  </a:extLst>
+                </a:gridCol>
+                <a:gridCol w="707292">
+                  <a:extLst>
+                    <a:ext uri="{9D8B030D-6E8A-4147-A177-3AD203B41FA5}">
+                      <a16:colId xmlns:a16="http://schemas.microsoft.com/office/drawing/2014/main" val="3783675637"/>
+                    </a:ext>
+                  </a:extLst>
+                </a:gridCol>
+                <a:gridCol w="707292">
+                  <a:extLst>
+                    <a:ext uri="{9D8B030D-6E8A-4147-A177-3AD203B41FA5}">
+                      <a16:colId xmlns:a16="http://schemas.microsoft.com/office/drawing/2014/main" val="295156759"/>
+                    </a:ext>
+                  </a:extLst>
+                </a:gridCol>
+                <a:gridCol w="707292">
+                  <a:extLst>
+                    <a:ext uri="{9D8B030D-6E8A-4147-A177-3AD203B41FA5}">
+                      <a16:colId xmlns:a16="http://schemas.microsoft.com/office/drawing/2014/main" val="3564346508"/>
+                    </a:ext>
+                  </a:extLst>
+                </a:gridCol>
+                <a:gridCol w="707292">
+                  <a:extLst>
+                    <a:ext uri="{9D8B030D-6E8A-4147-A177-3AD203B41FA5}">
+                      <a16:colId xmlns:a16="http://schemas.microsoft.com/office/drawing/2014/main" val="3625321702"/>
+                    </a:ext>
+                  </a:extLst>
+                </a:gridCol>
+              </a:tblGrid>
+              <a:tr h="370840">
+                <a:tc>
+                  <a:txBody>
+                    <a:bodyPr/>
+                    <a:lstStyle/>
+                    <a:p>
+                      <a:endParaRPr lang="en-US"/>
+                    </a:p>
+                  </a:txBody>
+                  <a:tcPr/>
+                </a:tc>
+                <a:tc>
+                  <a:txBody>
+                    <a:bodyPr/>
+                    <a:lstStyle/>
+                    <a:p>
+                      <a:endParaRPr lang="en-US"/>
+                    </a:p>
+                  </a:txBody>
+                  <a:tcPr/>
+                </a:tc>
+                <a:tc>
+                  <a:txBody>
+                    <a:bodyPr/>
+                    <a:lstStyle/>
+                    <a:p>
+                      <a:endParaRPr lang="en-US"/>
+                    </a:p>
+                  </a:txBody>
+                  <a:tcPr/>
+                </a:tc>
+                <a:tc>
+                  <a:txBody>
+                    <a:bodyPr/>
+                    <a:lstStyle/>
+                    <a:p>
+                      <a:endParaRPr lang="en-US" dirty="0"/>
+                    </a:p>
+                  </a:txBody>
+                  <a:tcPr/>
+                </a:tc>
+                <a:tc>
+                  <a:txBody>
+                    <a:bodyPr/>
+                    <a:lstStyle/>
+                    <a:p>
+                      <a:endParaRPr lang="en-US"/>
+                    </a:p>
+                  </a:txBody>
+                  <a:tcPr/>
+                </a:tc>
+                <a:tc>
+                  <a:txBody>
+                    <a:bodyPr/>
+                    <a:lstStyle/>
+                    <a:p>
+                      <a:endParaRPr lang="en-US"/>
+                    </a:p>
+                  </a:txBody>
+                  <a:tcPr/>
+                </a:tc>
+                <a:extLst>
+                  <a:ext uri="{0D108BD9-81ED-4DB2-BD59-A6C34878D82A}">
+                    <a16:rowId xmlns:a16="http://schemas.microsoft.com/office/drawing/2014/main" val="2608423520"/>
+                  </a:ext>
+                </a:extLst>
+              </a:tr>
+              <a:tr h="370840">
+                <a:tc>
+                  <a:txBody>
+                    <a:bodyPr/>
+                    <a:lstStyle/>
+                    <a:p>
+                      <a:endParaRPr lang="en-US"/>
+                    </a:p>
+                  </a:txBody>
+                  <a:tcPr/>
+                </a:tc>
+                <a:tc>
+                  <a:txBody>
+                    <a:bodyPr/>
+                    <a:lstStyle/>
+                    <a:p>
+                      <a:endParaRPr lang="en-US"/>
+                    </a:p>
+                  </a:txBody>
+                  <a:tcPr/>
+                </a:tc>
+                <a:tc>
+                  <a:txBody>
+                    <a:bodyPr/>
+                    <a:lstStyle/>
+                    <a:p>
+                      <a:endParaRPr lang="en-US"/>
+                    </a:p>
+                  </a:txBody>
+                  <a:tcPr/>
+                </a:tc>
+                <a:tc>
+                  <a:txBody>
+                    <a:bodyPr/>
+                    <a:lstStyle/>
+                    <a:p>
+                      <a:endParaRPr lang="en-US"/>
+                    </a:p>
+                  </a:txBody>
+                  <a:tcPr/>
+                </a:tc>
+                <a:tc>
+                  <a:txBody>
+                    <a:bodyPr/>
+                    <a:lstStyle/>
+                    <a:p>
+                      <a:endParaRPr lang="en-US"/>
+                    </a:p>
+                  </a:txBody>
+                  <a:tcPr/>
+                </a:tc>
+                <a:tc>
+                  <a:txBody>
+                    <a:bodyPr/>
+                    <a:lstStyle/>
+                    <a:p>
+                      <a:endParaRPr lang="en-US" dirty="0"/>
+                    </a:p>
+                  </a:txBody>
+                  <a:tcPr/>
+                </a:tc>
+                <a:extLst>
+                  <a:ext uri="{0D108BD9-81ED-4DB2-BD59-A6C34878D82A}">
+                    <a16:rowId xmlns:a16="http://schemas.microsoft.com/office/drawing/2014/main" val="2917907720"/>
+                  </a:ext>
+                </a:extLst>
+              </a:tr>
+            </a:tbl>
+          </a:graphicData>
+        </a:graphic>
+      </p:graphicFrame>
+      <p:sp>
+        <p:nvSpPr>
+          <p:cNvPr id="29" name="TextBox 28">
+            <a:extLst>
+              <a:ext uri="{FF2B5EF4-FFF2-40B4-BE49-F238E27FC236}">
+                <a16:creationId xmlns:a16="http://schemas.microsoft.com/office/drawing/2014/main" id="{12A9F548-4AD8-D65F-C44E-F2B5E24AFDAB}"/>
               </a:ext>
             </a:extLst>
           </p:cNvPr>
@@ -7653,9 +7866,9 @@
           <p:nvPr/>
         </p:nvSpPr>
         <p:spPr>
-          <a:xfrm rot="16200000">
-            <a:off x="267286" y="4951829"/>
-            <a:ext cx="1244251" cy="369332"/>
+          <a:xfrm>
+            <a:off x="5641826" y="2171311"/>
+            <a:ext cx="1953805" cy="369332"/>
           </a:xfrm>
           <a:prstGeom prst="rect">
             <a:avLst/>
@@ -7670,17 +7883,17 @@
           <a:p>
             <a:r>
               <a:rPr lang="en-US" dirty="0"/>
-              <a:t>Algorithm</a:t>
-            </a:r>
-          </a:p>
-        </p:txBody>
-      </p:sp>
-      <p:sp>
-        <p:nvSpPr>
-          <p:cNvPr id="20" name="TextBox 19">
-            <a:extLst>
-              <a:ext uri="{FF2B5EF4-FFF2-40B4-BE49-F238E27FC236}">
-                <a16:creationId xmlns:a16="http://schemas.microsoft.com/office/drawing/2014/main" id="{15AC9F08-315E-D092-2DBB-EB3EBD9D7226}"/>
+              <a:t>Branch Currents:</a:t>
+            </a:r>
+          </a:p>
+        </p:txBody>
+      </p:sp>
+      <p:sp>
+        <p:nvSpPr>
+          <p:cNvPr id="30" name="TextBox 29">
+            <a:extLst>
+              <a:ext uri="{FF2B5EF4-FFF2-40B4-BE49-F238E27FC236}">
+                <a16:creationId xmlns:a16="http://schemas.microsoft.com/office/drawing/2014/main" id="{AE27974C-B3AD-900B-9272-82CBE7E3A1D1}"/>
               </a:ext>
             </a:extLst>
           </p:cNvPr>
@@ -7688,9 +7901,9 @@
           <p:nvPr/>
         </p:nvSpPr>
         <p:spPr>
-          <a:xfrm rot="16200000">
-            <a:off x="412871" y="2543013"/>
-            <a:ext cx="953081" cy="369332"/>
+          <a:xfrm>
+            <a:off x="5641826" y="4679493"/>
+            <a:ext cx="1813895" cy="369332"/>
           </a:xfrm>
           <a:prstGeom prst="rect">
             <a:avLst/>
@@ -7704,102 +7917,870 @@
           <a:lstStyle/>
           <a:p>
             <a:r>
-              <a:rPr lang="en-US" dirty="0"/>
-              <a:t>Parsing</a:t>
-            </a:r>
-          </a:p>
-        </p:txBody>
-      </p:sp>
-      <p:pic>
-        <p:nvPicPr>
-          <p:cNvPr id="21" name="Picture 20">
-            <a:extLst>
-              <a:ext uri="{FF2B5EF4-FFF2-40B4-BE49-F238E27FC236}">
-                <a16:creationId xmlns:a16="http://schemas.microsoft.com/office/drawing/2014/main" id="{2A37952E-F4AC-ED3F-A04C-B9FB42F1A714}"/>
-              </a:ext>
-            </a:extLst>
-          </p:cNvPr>
-          <p:cNvPicPr>
-            <a:picLocks noChangeAspect="1"/>
-          </p:cNvPicPr>
+              <a:rPr lang="en-US"/>
+              <a:t>Node Voltages:</a:t>
+            </a:r>
+            <a:endParaRPr lang="en-US" dirty="0"/>
+          </a:p>
+        </p:txBody>
+      </p:sp>
+      <p:sp>
+        <p:nvSpPr>
+          <p:cNvPr id="31" name="TextBox 30">
+            <a:extLst>
+              <a:ext uri="{FF2B5EF4-FFF2-40B4-BE49-F238E27FC236}">
+                <a16:creationId xmlns:a16="http://schemas.microsoft.com/office/drawing/2014/main" id="{294C8484-54F1-3635-6159-A5C96ACB7F62}"/>
+              </a:ext>
+            </a:extLst>
+          </p:cNvPr>
+          <p:cNvSpPr txBox="1"/>
           <p:nvPr/>
-        </p:nvPicPr>
-        <p:blipFill>
-          <a:blip r:embed="rId6"/>
-          <a:stretch>
-            <a:fillRect/>
-          </a:stretch>
-        </p:blipFill>
-        <p:spPr>
-          <a:xfrm>
-            <a:off x="3194539" y="2026060"/>
-            <a:ext cx="2237869" cy="1923248"/>
+        </p:nvSpPr>
+        <p:spPr>
+          <a:xfrm>
+            <a:off x="8385264" y="3307826"/>
+            <a:ext cx="415498" cy="369332"/>
           </a:xfrm>
           <a:prstGeom prst="rect">
             <a:avLst/>
           </a:prstGeom>
-        </p:spPr>
-      </p:pic>
-      <p:pic>
-        <p:nvPicPr>
-          <p:cNvPr id="22" name="Picture 21">
-            <a:extLst>
-              <a:ext uri="{FF2B5EF4-FFF2-40B4-BE49-F238E27FC236}">
-                <a16:creationId xmlns:a16="http://schemas.microsoft.com/office/drawing/2014/main" id="{726489B7-1097-5B1A-09DE-345880EEBA92}"/>
-              </a:ext>
-            </a:extLst>
-          </p:cNvPr>
-          <p:cNvPicPr>
-            <a:picLocks noChangeAspect="1"/>
-          </p:cNvPicPr>
+          <a:noFill/>
+        </p:spPr>
+        <p:txBody>
+          <a:bodyPr wrap="none" rtlCol="0">
+            <a:spAutoFit/>
+          </a:bodyPr>
+          <a:lstStyle/>
+          <a:p>
+            <a:r>
+              <a:rPr lang="en-US" dirty="0"/>
+              <a:t>…</a:t>
+            </a:r>
+          </a:p>
+        </p:txBody>
+      </p:sp>
+      <p:graphicFrame>
+        <p:nvGraphicFramePr>
+          <p:cNvPr id="33" name="Table 28">
+            <a:extLst>
+              <a:ext uri="{FF2B5EF4-FFF2-40B4-BE49-F238E27FC236}">
+                <a16:creationId xmlns:a16="http://schemas.microsoft.com/office/drawing/2014/main" id="{0C558E78-EEFF-6E40-12FF-99B7B8C39854}"/>
+              </a:ext>
+            </a:extLst>
+          </p:cNvPr>
+          <p:cNvGraphicFramePr>
+            <a:graphicFrameLocks noGrp="1"/>
+          </p:cNvGraphicFramePr>
+          <p:nvPr>
+            <p:extLst>
+              <p:ext uri="{D42A27DB-BD31-4B8C-83A1-F6EECF244321}">
+                <p14:modId xmlns:p14="http://schemas.microsoft.com/office/powerpoint/2010/main" val="3270689436"/>
+              </p:ext>
+            </p:extLst>
+          </p:nvPr>
+        </p:nvGraphicFramePr>
+        <p:xfrm>
+          <a:off x="6471137" y="3802908"/>
+          <a:ext cx="4243752" cy="370840"/>
+        </p:xfrm>
+        <a:graphic>
+          <a:graphicData uri="http://schemas.openxmlformats.org/drawingml/2006/table">
+            <a:tbl>
+              <a:tblPr firstRow="1" bandRow="1">
+                <a:tableStyleId>{7DF18680-E054-41AD-8BC1-D1AEF772440D}</a:tableStyleId>
+              </a:tblPr>
+              <a:tblGrid>
+                <a:gridCol w="707292">
+                  <a:extLst>
+                    <a:ext uri="{9D8B030D-6E8A-4147-A177-3AD203B41FA5}">
+                      <a16:colId xmlns:a16="http://schemas.microsoft.com/office/drawing/2014/main" val="1477033119"/>
+                    </a:ext>
+                  </a:extLst>
+                </a:gridCol>
+                <a:gridCol w="707292">
+                  <a:extLst>
+                    <a:ext uri="{9D8B030D-6E8A-4147-A177-3AD203B41FA5}">
+                      <a16:colId xmlns:a16="http://schemas.microsoft.com/office/drawing/2014/main" val="351217100"/>
+                    </a:ext>
+                  </a:extLst>
+                </a:gridCol>
+                <a:gridCol w="707292">
+                  <a:extLst>
+                    <a:ext uri="{9D8B030D-6E8A-4147-A177-3AD203B41FA5}">
+                      <a16:colId xmlns:a16="http://schemas.microsoft.com/office/drawing/2014/main" val="3783675637"/>
+                    </a:ext>
+                  </a:extLst>
+                </a:gridCol>
+                <a:gridCol w="707292">
+                  <a:extLst>
+                    <a:ext uri="{9D8B030D-6E8A-4147-A177-3AD203B41FA5}">
+                      <a16:colId xmlns:a16="http://schemas.microsoft.com/office/drawing/2014/main" val="295156759"/>
+                    </a:ext>
+                  </a:extLst>
+                </a:gridCol>
+                <a:gridCol w="707292">
+                  <a:extLst>
+                    <a:ext uri="{9D8B030D-6E8A-4147-A177-3AD203B41FA5}">
+                      <a16:colId xmlns:a16="http://schemas.microsoft.com/office/drawing/2014/main" val="3564346508"/>
+                    </a:ext>
+                  </a:extLst>
+                </a:gridCol>
+                <a:gridCol w="707292">
+                  <a:extLst>
+                    <a:ext uri="{9D8B030D-6E8A-4147-A177-3AD203B41FA5}">
+                      <a16:colId xmlns:a16="http://schemas.microsoft.com/office/drawing/2014/main" val="3625321702"/>
+                    </a:ext>
+                  </a:extLst>
+                </a:gridCol>
+              </a:tblGrid>
+              <a:tr h="370840">
+                <a:tc>
+                  <a:txBody>
+                    <a:bodyPr/>
+                    <a:lstStyle/>
+                    <a:p>
+                      <a:endParaRPr lang="en-US" dirty="0"/>
+                    </a:p>
+                  </a:txBody>
+                  <a:tcPr/>
+                </a:tc>
+                <a:tc>
+                  <a:txBody>
+                    <a:bodyPr/>
+                    <a:lstStyle/>
+                    <a:p>
+                      <a:endParaRPr lang="en-US" dirty="0"/>
+                    </a:p>
+                  </a:txBody>
+                  <a:tcPr/>
+                </a:tc>
+                <a:tc>
+                  <a:txBody>
+                    <a:bodyPr/>
+                    <a:lstStyle/>
+                    <a:p>
+                      <a:endParaRPr lang="en-US" dirty="0"/>
+                    </a:p>
+                  </a:txBody>
+                  <a:tcPr/>
+                </a:tc>
+                <a:tc>
+                  <a:txBody>
+                    <a:bodyPr/>
+                    <a:lstStyle/>
+                    <a:p>
+                      <a:endParaRPr lang="en-US" dirty="0"/>
+                    </a:p>
+                  </a:txBody>
+                  <a:tcPr/>
+                </a:tc>
+                <a:tc>
+                  <a:txBody>
+                    <a:bodyPr/>
+                    <a:lstStyle/>
+                    <a:p>
+                      <a:endParaRPr lang="en-US" dirty="0"/>
+                    </a:p>
+                  </a:txBody>
+                  <a:tcPr/>
+                </a:tc>
+                <a:tc>
+                  <a:txBody>
+                    <a:bodyPr/>
+                    <a:lstStyle/>
+                    <a:p>
+                      <a:endParaRPr lang="en-US" dirty="0"/>
+                    </a:p>
+                  </a:txBody>
+                  <a:tcPr/>
+                </a:tc>
+                <a:extLst>
+                  <a:ext uri="{0D108BD9-81ED-4DB2-BD59-A6C34878D82A}">
+                    <a16:rowId xmlns:a16="http://schemas.microsoft.com/office/drawing/2014/main" val="2917907720"/>
+                  </a:ext>
+                </a:extLst>
+              </a:tr>
+            </a:tbl>
+          </a:graphicData>
+        </a:graphic>
+      </p:graphicFrame>
+      <p:graphicFrame>
+        <p:nvGraphicFramePr>
+          <p:cNvPr id="34" name="Table 28">
+            <a:extLst>
+              <a:ext uri="{FF2B5EF4-FFF2-40B4-BE49-F238E27FC236}">
+                <a16:creationId xmlns:a16="http://schemas.microsoft.com/office/drawing/2014/main" id="{02DDD11A-787E-F04D-C7E1-6C27535B0E00}"/>
+              </a:ext>
+            </a:extLst>
+          </p:cNvPr>
+          <p:cNvGraphicFramePr>
+            <a:graphicFrameLocks noGrp="1"/>
+          </p:cNvGraphicFramePr>
+          <p:nvPr>
+            <p:extLst>
+              <p:ext uri="{D42A27DB-BD31-4B8C-83A1-F6EECF244321}">
+                <p14:modId xmlns:p14="http://schemas.microsoft.com/office/powerpoint/2010/main" val="2247896685"/>
+              </p:ext>
+            </p:extLst>
+          </p:nvPr>
+        </p:nvGraphicFramePr>
+        <p:xfrm>
+          <a:off x="6471137" y="5048825"/>
+          <a:ext cx="4243752" cy="741680"/>
+        </p:xfrm>
+        <a:graphic>
+          <a:graphicData uri="http://schemas.openxmlformats.org/drawingml/2006/table">
+            <a:tbl>
+              <a:tblPr firstRow="1" bandRow="1">
+                <a:tableStyleId>{7DF18680-E054-41AD-8BC1-D1AEF772440D}</a:tableStyleId>
+              </a:tblPr>
+              <a:tblGrid>
+                <a:gridCol w="707292">
+                  <a:extLst>
+                    <a:ext uri="{9D8B030D-6E8A-4147-A177-3AD203B41FA5}">
+                      <a16:colId xmlns:a16="http://schemas.microsoft.com/office/drawing/2014/main" val="1477033119"/>
+                    </a:ext>
+                  </a:extLst>
+                </a:gridCol>
+                <a:gridCol w="707292">
+                  <a:extLst>
+                    <a:ext uri="{9D8B030D-6E8A-4147-A177-3AD203B41FA5}">
+                      <a16:colId xmlns:a16="http://schemas.microsoft.com/office/drawing/2014/main" val="351217100"/>
+                    </a:ext>
+                  </a:extLst>
+                </a:gridCol>
+                <a:gridCol w="707292">
+                  <a:extLst>
+                    <a:ext uri="{9D8B030D-6E8A-4147-A177-3AD203B41FA5}">
+                      <a16:colId xmlns:a16="http://schemas.microsoft.com/office/drawing/2014/main" val="3783675637"/>
+                    </a:ext>
+                  </a:extLst>
+                </a:gridCol>
+                <a:gridCol w="707292">
+                  <a:extLst>
+                    <a:ext uri="{9D8B030D-6E8A-4147-A177-3AD203B41FA5}">
+                      <a16:colId xmlns:a16="http://schemas.microsoft.com/office/drawing/2014/main" val="295156759"/>
+                    </a:ext>
+                  </a:extLst>
+                </a:gridCol>
+                <a:gridCol w="707292">
+                  <a:extLst>
+                    <a:ext uri="{9D8B030D-6E8A-4147-A177-3AD203B41FA5}">
+                      <a16:colId xmlns:a16="http://schemas.microsoft.com/office/drawing/2014/main" val="3564346508"/>
+                    </a:ext>
+                  </a:extLst>
+                </a:gridCol>
+                <a:gridCol w="707292">
+                  <a:extLst>
+                    <a:ext uri="{9D8B030D-6E8A-4147-A177-3AD203B41FA5}">
+                      <a16:colId xmlns:a16="http://schemas.microsoft.com/office/drawing/2014/main" val="3625321702"/>
+                    </a:ext>
+                  </a:extLst>
+                </a:gridCol>
+              </a:tblGrid>
+              <a:tr h="370840">
+                <a:tc>
+                  <a:txBody>
+                    <a:bodyPr/>
+                    <a:lstStyle/>
+                    <a:p>
+                      <a:endParaRPr lang="en-US"/>
+                    </a:p>
+                  </a:txBody>
+                  <a:tcPr/>
+                </a:tc>
+                <a:tc>
+                  <a:txBody>
+                    <a:bodyPr/>
+                    <a:lstStyle/>
+                    <a:p>
+                      <a:endParaRPr lang="en-US"/>
+                    </a:p>
+                  </a:txBody>
+                  <a:tcPr/>
+                </a:tc>
+                <a:tc>
+                  <a:txBody>
+                    <a:bodyPr/>
+                    <a:lstStyle/>
+                    <a:p>
+                      <a:endParaRPr lang="en-US"/>
+                    </a:p>
+                  </a:txBody>
+                  <a:tcPr/>
+                </a:tc>
+                <a:tc>
+                  <a:txBody>
+                    <a:bodyPr/>
+                    <a:lstStyle/>
+                    <a:p>
+                      <a:endParaRPr lang="en-US" dirty="0"/>
+                    </a:p>
+                  </a:txBody>
+                  <a:tcPr/>
+                </a:tc>
+                <a:tc>
+                  <a:txBody>
+                    <a:bodyPr/>
+                    <a:lstStyle/>
+                    <a:p>
+                      <a:endParaRPr lang="en-US"/>
+                    </a:p>
+                  </a:txBody>
+                  <a:tcPr/>
+                </a:tc>
+                <a:tc>
+                  <a:txBody>
+                    <a:bodyPr/>
+                    <a:lstStyle/>
+                    <a:p>
+                      <a:endParaRPr lang="en-US"/>
+                    </a:p>
+                  </a:txBody>
+                  <a:tcPr/>
+                </a:tc>
+                <a:extLst>
+                  <a:ext uri="{0D108BD9-81ED-4DB2-BD59-A6C34878D82A}">
+                    <a16:rowId xmlns:a16="http://schemas.microsoft.com/office/drawing/2014/main" val="2608423520"/>
+                  </a:ext>
+                </a:extLst>
+              </a:tr>
+              <a:tr h="370840">
+                <a:tc>
+                  <a:txBody>
+                    <a:bodyPr/>
+                    <a:lstStyle/>
+                    <a:p>
+                      <a:endParaRPr lang="en-US"/>
+                    </a:p>
+                  </a:txBody>
+                  <a:tcPr/>
+                </a:tc>
+                <a:tc>
+                  <a:txBody>
+                    <a:bodyPr/>
+                    <a:lstStyle/>
+                    <a:p>
+                      <a:endParaRPr lang="en-US"/>
+                    </a:p>
+                  </a:txBody>
+                  <a:tcPr/>
+                </a:tc>
+                <a:tc>
+                  <a:txBody>
+                    <a:bodyPr/>
+                    <a:lstStyle/>
+                    <a:p>
+                      <a:endParaRPr lang="en-US"/>
+                    </a:p>
+                  </a:txBody>
+                  <a:tcPr/>
+                </a:tc>
+                <a:tc>
+                  <a:txBody>
+                    <a:bodyPr/>
+                    <a:lstStyle/>
+                    <a:p>
+                      <a:endParaRPr lang="en-US"/>
+                    </a:p>
+                  </a:txBody>
+                  <a:tcPr/>
+                </a:tc>
+                <a:tc>
+                  <a:txBody>
+                    <a:bodyPr/>
+                    <a:lstStyle/>
+                    <a:p>
+                      <a:endParaRPr lang="en-US"/>
+                    </a:p>
+                  </a:txBody>
+                  <a:tcPr/>
+                </a:tc>
+                <a:tc>
+                  <a:txBody>
+                    <a:bodyPr/>
+                    <a:lstStyle/>
+                    <a:p>
+                      <a:endParaRPr lang="en-US" dirty="0"/>
+                    </a:p>
+                  </a:txBody>
+                  <a:tcPr/>
+                </a:tc>
+                <a:extLst>
+                  <a:ext uri="{0D108BD9-81ED-4DB2-BD59-A6C34878D82A}">
+                    <a16:rowId xmlns:a16="http://schemas.microsoft.com/office/drawing/2014/main" val="2917907720"/>
+                  </a:ext>
+                </a:extLst>
+              </a:tr>
+            </a:tbl>
+          </a:graphicData>
+        </a:graphic>
+      </p:graphicFrame>
+      <p:sp>
+        <p:nvSpPr>
+          <p:cNvPr id="35" name="TextBox 34">
+            <a:extLst>
+              <a:ext uri="{FF2B5EF4-FFF2-40B4-BE49-F238E27FC236}">
+                <a16:creationId xmlns:a16="http://schemas.microsoft.com/office/drawing/2014/main" id="{5A765B4D-10D5-3381-AD03-05D3C98AE29F}"/>
+              </a:ext>
+            </a:extLst>
+          </p:cNvPr>
+          <p:cNvSpPr txBox="1"/>
           <p:nvPr/>
-        </p:nvPicPr>
-        <p:blipFill>
-          <a:blip r:embed="rId7"/>
-          <a:stretch>
-            <a:fillRect/>
-          </a:stretch>
-        </p:blipFill>
-        <p:spPr>
-          <a:xfrm>
-            <a:off x="9228746" y="2593984"/>
-            <a:ext cx="2857500" cy="787400"/>
+        </p:nvSpPr>
+        <p:spPr>
+          <a:xfrm>
+            <a:off x="8385264" y="5903727"/>
+            <a:ext cx="415498" cy="369332"/>
           </a:xfrm>
           <a:prstGeom prst="rect">
             <a:avLst/>
           </a:prstGeom>
-        </p:spPr>
-      </p:pic>
-      <p:pic>
-        <p:nvPicPr>
-          <p:cNvPr id="23" name="Picture 22">
-            <a:extLst>
-              <a:ext uri="{FF2B5EF4-FFF2-40B4-BE49-F238E27FC236}">
-                <a16:creationId xmlns:a16="http://schemas.microsoft.com/office/drawing/2014/main" id="{80D194D9-4E35-DF94-3605-F29DA2E76420}"/>
-              </a:ext>
-            </a:extLst>
-          </p:cNvPr>
-          <p:cNvPicPr>
-            <a:picLocks noChangeAspect="1"/>
-          </p:cNvPicPr>
+          <a:noFill/>
+        </p:spPr>
+        <p:txBody>
+          <a:bodyPr wrap="none" rtlCol="0">
+            <a:spAutoFit/>
+          </a:bodyPr>
+          <a:lstStyle/>
+          <a:p>
+            <a:r>
+              <a:rPr lang="en-US" dirty="0"/>
+              <a:t>…</a:t>
+            </a:r>
+          </a:p>
+        </p:txBody>
+      </p:sp>
+      <p:graphicFrame>
+        <p:nvGraphicFramePr>
+          <p:cNvPr id="36" name="Table 28">
+            <a:extLst>
+              <a:ext uri="{FF2B5EF4-FFF2-40B4-BE49-F238E27FC236}">
+                <a16:creationId xmlns:a16="http://schemas.microsoft.com/office/drawing/2014/main" id="{914B302B-616A-5D4E-6E1B-60A1B0B1291E}"/>
+              </a:ext>
+            </a:extLst>
+          </p:cNvPr>
+          <p:cNvGraphicFramePr>
+            <a:graphicFrameLocks noGrp="1"/>
+          </p:cNvGraphicFramePr>
+          <p:nvPr>
+            <p:extLst>
+              <p:ext uri="{D42A27DB-BD31-4B8C-83A1-F6EECF244321}">
+                <p14:modId xmlns:p14="http://schemas.microsoft.com/office/powerpoint/2010/main" val="3333333695"/>
+              </p:ext>
+            </p:extLst>
+          </p:nvPr>
+        </p:nvGraphicFramePr>
+        <p:xfrm>
+          <a:off x="6471137" y="6462467"/>
+          <a:ext cx="4243752" cy="370840"/>
+        </p:xfrm>
+        <a:graphic>
+          <a:graphicData uri="http://schemas.openxmlformats.org/drawingml/2006/table">
+            <a:tbl>
+              <a:tblPr firstRow="1" bandRow="1">
+                <a:tableStyleId>{7DF18680-E054-41AD-8BC1-D1AEF772440D}</a:tableStyleId>
+              </a:tblPr>
+              <a:tblGrid>
+                <a:gridCol w="707292">
+                  <a:extLst>
+                    <a:ext uri="{9D8B030D-6E8A-4147-A177-3AD203B41FA5}">
+                      <a16:colId xmlns:a16="http://schemas.microsoft.com/office/drawing/2014/main" val="1477033119"/>
+                    </a:ext>
+                  </a:extLst>
+                </a:gridCol>
+                <a:gridCol w="707292">
+                  <a:extLst>
+                    <a:ext uri="{9D8B030D-6E8A-4147-A177-3AD203B41FA5}">
+                      <a16:colId xmlns:a16="http://schemas.microsoft.com/office/drawing/2014/main" val="351217100"/>
+                    </a:ext>
+                  </a:extLst>
+                </a:gridCol>
+                <a:gridCol w="707292">
+                  <a:extLst>
+                    <a:ext uri="{9D8B030D-6E8A-4147-A177-3AD203B41FA5}">
+                      <a16:colId xmlns:a16="http://schemas.microsoft.com/office/drawing/2014/main" val="3783675637"/>
+                    </a:ext>
+                  </a:extLst>
+                </a:gridCol>
+                <a:gridCol w="707292">
+                  <a:extLst>
+                    <a:ext uri="{9D8B030D-6E8A-4147-A177-3AD203B41FA5}">
+                      <a16:colId xmlns:a16="http://schemas.microsoft.com/office/drawing/2014/main" val="295156759"/>
+                    </a:ext>
+                  </a:extLst>
+                </a:gridCol>
+                <a:gridCol w="707292">
+                  <a:extLst>
+                    <a:ext uri="{9D8B030D-6E8A-4147-A177-3AD203B41FA5}">
+                      <a16:colId xmlns:a16="http://schemas.microsoft.com/office/drawing/2014/main" val="3564346508"/>
+                    </a:ext>
+                  </a:extLst>
+                </a:gridCol>
+                <a:gridCol w="707292">
+                  <a:extLst>
+                    <a:ext uri="{9D8B030D-6E8A-4147-A177-3AD203B41FA5}">
+                      <a16:colId xmlns:a16="http://schemas.microsoft.com/office/drawing/2014/main" val="3625321702"/>
+                    </a:ext>
+                  </a:extLst>
+                </a:gridCol>
+              </a:tblGrid>
+              <a:tr h="370840">
+                <a:tc>
+                  <a:txBody>
+                    <a:bodyPr/>
+                    <a:lstStyle/>
+                    <a:p>
+                      <a:endParaRPr lang="en-US" dirty="0"/>
+                    </a:p>
+                  </a:txBody>
+                  <a:tcPr/>
+                </a:tc>
+                <a:tc>
+                  <a:txBody>
+                    <a:bodyPr/>
+                    <a:lstStyle/>
+                    <a:p>
+                      <a:endParaRPr lang="en-US" dirty="0"/>
+                    </a:p>
+                  </a:txBody>
+                  <a:tcPr/>
+                </a:tc>
+                <a:tc>
+                  <a:txBody>
+                    <a:bodyPr/>
+                    <a:lstStyle/>
+                    <a:p>
+                      <a:endParaRPr lang="en-US" dirty="0"/>
+                    </a:p>
+                  </a:txBody>
+                  <a:tcPr/>
+                </a:tc>
+                <a:tc>
+                  <a:txBody>
+                    <a:bodyPr/>
+                    <a:lstStyle/>
+                    <a:p>
+                      <a:endParaRPr lang="en-US" dirty="0"/>
+                    </a:p>
+                  </a:txBody>
+                  <a:tcPr/>
+                </a:tc>
+                <a:tc>
+                  <a:txBody>
+                    <a:bodyPr/>
+                    <a:lstStyle/>
+                    <a:p>
+                      <a:endParaRPr lang="en-US" dirty="0"/>
+                    </a:p>
+                  </a:txBody>
+                  <a:tcPr/>
+                </a:tc>
+                <a:tc>
+                  <a:txBody>
+                    <a:bodyPr/>
+                    <a:lstStyle/>
+                    <a:p>
+                      <a:endParaRPr lang="en-US" dirty="0"/>
+                    </a:p>
+                  </a:txBody>
+                  <a:tcPr/>
+                </a:tc>
+                <a:extLst>
+                  <a:ext uri="{0D108BD9-81ED-4DB2-BD59-A6C34878D82A}">
+                    <a16:rowId xmlns:a16="http://schemas.microsoft.com/office/drawing/2014/main" val="2917907720"/>
+                  </a:ext>
+                </a:extLst>
+              </a:tr>
+            </a:tbl>
+          </a:graphicData>
+        </a:graphic>
+      </p:graphicFrame>
+      <p:sp>
+        <p:nvSpPr>
+          <p:cNvPr id="37" name="TextBox 36">
+            <a:extLst>
+              <a:ext uri="{FF2B5EF4-FFF2-40B4-BE49-F238E27FC236}">
+                <a16:creationId xmlns:a16="http://schemas.microsoft.com/office/drawing/2014/main" id="{458F679B-8F11-DD1D-61B8-8CC930F89F69}"/>
+              </a:ext>
+            </a:extLst>
+          </p:cNvPr>
+          <p:cNvSpPr txBox="1"/>
           <p:nvPr/>
-        </p:nvPicPr>
-        <p:blipFill>
-          <a:blip r:embed="rId8"/>
-          <a:stretch>
-            <a:fillRect/>
-          </a:stretch>
-        </p:blipFill>
-        <p:spPr>
-          <a:xfrm>
-            <a:off x="5628777" y="2073284"/>
-            <a:ext cx="3403600" cy="1828800"/>
+        </p:nvSpPr>
+        <p:spPr>
+          <a:xfrm>
+            <a:off x="7971368" y="2186792"/>
+            <a:ext cx="1243289" cy="369332"/>
           </a:xfrm>
           <a:prstGeom prst="rect">
             <a:avLst/>
           </a:prstGeom>
-        </p:spPr>
-      </p:pic>
+          <a:noFill/>
+        </p:spPr>
+        <p:txBody>
+          <a:bodyPr wrap="none" rtlCol="0">
+            <a:spAutoFit/>
+          </a:bodyPr>
+          <a:lstStyle/>
+          <a:p>
+            <a:r>
+              <a:rPr lang="en-US" dirty="0"/>
+              <a:t>Time Step</a:t>
+            </a:r>
+          </a:p>
+        </p:txBody>
+      </p:sp>
+      <p:sp>
+        <p:nvSpPr>
+          <p:cNvPr id="38" name="TextBox 37">
+            <a:extLst>
+              <a:ext uri="{FF2B5EF4-FFF2-40B4-BE49-F238E27FC236}">
+                <a16:creationId xmlns:a16="http://schemas.microsoft.com/office/drawing/2014/main" id="{28B6D4EC-BE58-70AA-E837-212FD73BB642}"/>
+              </a:ext>
+            </a:extLst>
+          </p:cNvPr>
+          <p:cNvSpPr txBox="1"/>
+          <p:nvPr/>
+        </p:nvSpPr>
+        <p:spPr>
+          <a:xfrm>
+            <a:off x="7971367" y="4661044"/>
+            <a:ext cx="1243289" cy="369332"/>
+          </a:xfrm>
+          <a:prstGeom prst="rect">
+            <a:avLst/>
+          </a:prstGeom>
+          <a:noFill/>
+        </p:spPr>
+        <p:txBody>
+          <a:bodyPr wrap="none" rtlCol="0">
+            <a:spAutoFit/>
+          </a:bodyPr>
+          <a:lstStyle/>
+          <a:p>
+            <a:r>
+              <a:rPr lang="en-US" dirty="0"/>
+              <a:t>Time Step</a:t>
+            </a:r>
+          </a:p>
+        </p:txBody>
+      </p:sp>
+      <p:sp>
+        <p:nvSpPr>
+          <p:cNvPr id="39" name="TextBox 38">
+            <a:extLst>
+              <a:ext uri="{FF2B5EF4-FFF2-40B4-BE49-F238E27FC236}">
+                <a16:creationId xmlns:a16="http://schemas.microsoft.com/office/drawing/2014/main" id="{E2E92FF9-C8CC-8433-C8E0-488FEA82F905}"/>
+              </a:ext>
+            </a:extLst>
+          </p:cNvPr>
+          <p:cNvSpPr txBox="1"/>
+          <p:nvPr/>
+        </p:nvSpPr>
+        <p:spPr>
+          <a:xfrm>
+            <a:off x="10832123" y="2602652"/>
+            <a:ext cx="1113190" cy="369332"/>
+          </a:xfrm>
+          <a:prstGeom prst="rect">
+            <a:avLst/>
+          </a:prstGeom>
+          <a:noFill/>
+        </p:spPr>
+        <p:txBody>
+          <a:bodyPr wrap="none" rtlCol="0">
+            <a:spAutoFit/>
+          </a:bodyPr>
+          <a:lstStyle/>
+          <a:p>
+            <a:r>
+              <a:rPr lang="en-US" dirty="0"/>
+              <a:t>Branch 1</a:t>
+            </a:r>
+          </a:p>
+        </p:txBody>
+      </p:sp>
+      <p:sp>
+        <p:nvSpPr>
+          <p:cNvPr id="40" name="TextBox 39">
+            <a:extLst>
+              <a:ext uri="{FF2B5EF4-FFF2-40B4-BE49-F238E27FC236}">
+                <a16:creationId xmlns:a16="http://schemas.microsoft.com/office/drawing/2014/main" id="{14805981-3409-DFE5-EB0E-F8372044B325}"/>
+              </a:ext>
+            </a:extLst>
+          </p:cNvPr>
+          <p:cNvSpPr txBox="1"/>
+          <p:nvPr/>
+        </p:nvSpPr>
+        <p:spPr>
+          <a:xfrm>
+            <a:off x="10832123" y="2971984"/>
+            <a:ext cx="1113190" cy="369332"/>
+          </a:xfrm>
+          <a:prstGeom prst="rect">
+            <a:avLst/>
+          </a:prstGeom>
+          <a:noFill/>
+        </p:spPr>
+        <p:txBody>
+          <a:bodyPr wrap="none" rtlCol="0">
+            <a:spAutoFit/>
+          </a:bodyPr>
+          <a:lstStyle/>
+          <a:p>
+            <a:r>
+              <a:rPr lang="en-US" dirty="0"/>
+              <a:t>Branch 2</a:t>
+            </a:r>
+          </a:p>
+        </p:txBody>
+      </p:sp>
+      <p:sp>
+        <p:nvSpPr>
+          <p:cNvPr id="41" name="TextBox 40">
+            <a:extLst>
+              <a:ext uri="{FF2B5EF4-FFF2-40B4-BE49-F238E27FC236}">
+                <a16:creationId xmlns:a16="http://schemas.microsoft.com/office/drawing/2014/main" id="{08DFCB0B-9267-67F4-14F0-7AABDB2C371B}"/>
+              </a:ext>
+            </a:extLst>
+          </p:cNvPr>
+          <p:cNvSpPr txBox="1"/>
+          <p:nvPr/>
+        </p:nvSpPr>
+        <p:spPr>
+          <a:xfrm>
+            <a:off x="10832123" y="3766920"/>
+            <a:ext cx="1302344" cy="369332"/>
+          </a:xfrm>
+          <a:prstGeom prst="rect">
+            <a:avLst/>
+          </a:prstGeom>
+          <a:noFill/>
+        </p:spPr>
+        <p:txBody>
+          <a:bodyPr wrap="none" rtlCol="0">
+            <a:spAutoFit/>
+          </a:bodyPr>
+          <a:lstStyle/>
+          <a:p>
+            <a:r>
+              <a:rPr lang="en-US" dirty="0"/>
+              <a:t>Branch Nb</a:t>
+            </a:r>
+          </a:p>
+        </p:txBody>
+      </p:sp>
+      <p:sp>
+        <p:nvSpPr>
+          <p:cNvPr id="42" name="TextBox 41">
+            <a:extLst>
+              <a:ext uri="{FF2B5EF4-FFF2-40B4-BE49-F238E27FC236}">
+                <a16:creationId xmlns:a16="http://schemas.microsoft.com/office/drawing/2014/main" id="{D672B421-EF6D-60A4-7D59-4F3A9BB05ED1}"/>
+              </a:ext>
+            </a:extLst>
+          </p:cNvPr>
+          <p:cNvSpPr txBox="1"/>
+          <p:nvPr/>
+        </p:nvSpPr>
+        <p:spPr>
+          <a:xfrm>
+            <a:off x="10832123" y="5060426"/>
+            <a:ext cx="973343" cy="369332"/>
+          </a:xfrm>
+          <a:prstGeom prst="rect">
+            <a:avLst/>
+          </a:prstGeom>
+          <a:noFill/>
+        </p:spPr>
+        <p:txBody>
+          <a:bodyPr wrap="none" rtlCol="0">
+            <a:spAutoFit/>
+          </a:bodyPr>
+          <a:lstStyle/>
+          <a:p>
+            <a:r>
+              <a:rPr lang="en-US" dirty="0"/>
+              <a:t>Node 1</a:t>
+            </a:r>
+          </a:p>
+        </p:txBody>
+      </p:sp>
+      <p:sp>
+        <p:nvSpPr>
+          <p:cNvPr id="43" name="TextBox 42">
+            <a:extLst>
+              <a:ext uri="{FF2B5EF4-FFF2-40B4-BE49-F238E27FC236}">
+                <a16:creationId xmlns:a16="http://schemas.microsoft.com/office/drawing/2014/main" id="{FB9AC736-D1C9-93BD-592C-08BFABA9AD4A}"/>
+              </a:ext>
+            </a:extLst>
+          </p:cNvPr>
+          <p:cNvSpPr txBox="1"/>
+          <p:nvPr/>
+        </p:nvSpPr>
+        <p:spPr>
+          <a:xfrm>
+            <a:off x="10832123" y="5429758"/>
+            <a:ext cx="973343" cy="369332"/>
+          </a:xfrm>
+          <a:prstGeom prst="rect">
+            <a:avLst/>
+          </a:prstGeom>
+          <a:noFill/>
+        </p:spPr>
+        <p:txBody>
+          <a:bodyPr wrap="none" rtlCol="0">
+            <a:spAutoFit/>
+          </a:bodyPr>
+          <a:lstStyle/>
+          <a:p>
+            <a:r>
+              <a:rPr lang="en-US" dirty="0"/>
+              <a:t>Node 2</a:t>
+            </a:r>
+          </a:p>
+        </p:txBody>
+      </p:sp>
+      <p:sp>
+        <p:nvSpPr>
+          <p:cNvPr id="44" name="TextBox 43">
+            <a:extLst>
+              <a:ext uri="{FF2B5EF4-FFF2-40B4-BE49-F238E27FC236}">
+                <a16:creationId xmlns:a16="http://schemas.microsoft.com/office/drawing/2014/main" id="{ECEF7767-6865-3879-B7FC-9248AF3ECD44}"/>
+              </a:ext>
+            </a:extLst>
+          </p:cNvPr>
+          <p:cNvSpPr txBox="1"/>
+          <p:nvPr/>
+        </p:nvSpPr>
+        <p:spPr>
+          <a:xfrm>
+            <a:off x="10832123" y="6404035"/>
+            <a:ext cx="1149674" cy="369332"/>
+          </a:xfrm>
+          <a:prstGeom prst="rect">
+            <a:avLst/>
+          </a:prstGeom>
+          <a:noFill/>
+        </p:spPr>
+        <p:txBody>
+          <a:bodyPr wrap="none" rtlCol="0">
+            <a:spAutoFit/>
+          </a:bodyPr>
+          <a:lstStyle/>
+          <a:p>
+            <a:r>
+              <a:rPr lang="en-US" dirty="0"/>
+              <a:t>Node </a:t>
+            </a:r>
+            <a:r>
+              <a:rPr lang="en-US" dirty="0" err="1"/>
+              <a:t>Nn</a:t>
+            </a:r>
+            <a:endParaRPr lang="en-US" dirty="0"/>
+          </a:p>
+        </p:txBody>
+      </p:sp>
     </p:spTree>
     <p:extLst>
       <p:ext uri="{BB962C8B-B14F-4D97-AF65-F5344CB8AC3E}">
@@ -7853,17 +8834,17 @@
           <a:p>
             <a:r>
               <a:rPr lang="en-US" dirty="0"/>
-              <a:t>LIM - Example</a:t>
+              <a:t>LIM - Implementation</a:t>
             </a:r>
           </a:p>
         </p:txBody>
       </p:sp>
       <p:pic>
         <p:nvPicPr>
-          <p:cNvPr id="3" name="Picture 2">
-            <a:extLst>
-              <a:ext uri="{FF2B5EF4-FFF2-40B4-BE49-F238E27FC236}">
-                <a16:creationId xmlns:a16="http://schemas.microsoft.com/office/drawing/2014/main" id="{CC569F81-B14B-C802-1FFD-9DC4411A7117}"/>
+          <p:cNvPr id="12" name="Picture 11">
+            <a:extLst>
+              <a:ext uri="{FF2B5EF4-FFF2-40B4-BE49-F238E27FC236}">
+                <a16:creationId xmlns:a16="http://schemas.microsoft.com/office/drawing/2014/main" id="{525DE596-D5AA-36BC-0D14-F0FE888B0864}"/>
               </a:ext>
             </a:extLst>
           </p:cNvPr>
@@ -7880,8 +8861,8 @@
         </p:blipFill>
         <p:spPr>
           <a:xfrm>
-            <a:off x="4969874" y="2503891"/>
-            <a:ext cx="3201571" cy="2625894"/>
+            <a:off x="3194539" y="4171915"/>
+            <a:ext cx="7772400" cy="2228239"/>
           </a:xfrm>
           <a:prstGeom prst="rect">
             <a:avLst/>
@@ -7890,10 +8871,10 @@
       </p:pic>
       <p:pic>
         <p:nvPicPr>
-          <p:cNvPr id="7" name="Picture 6">
-            <a:extLst>
-              <a:ext uri="{FF2B5EF4-FFF2-40B4-BE49-F238E27FC236}">
-                <a16:creationId xmlns:a16="http://schemas.microsoft.com/office/drawing/2014/main" id="{AE9B00A6-F705-8FE5-679F-217FC55C62D9}"/>
+          <p:cNvPr id="15" name="Picture 14">
+            <a:extLst>
+              <a:ext uri="{FF2B5EF4-FFF2-40B4-BE49-F238E27FC236}">
+                <a16:creationId xmlns:a16="http://schemas.microsoft.com/office/drawing/2014/main" id="{0C3C5EE6-1A92-4514-D141-7E0F91352F62}"/>
               </a:ext>
             </a:extLst>
           </p:cNvPr>
@@ -7910,8 +8891,8 @@
         </p:blipFill>
         <p:spPr>
           <a:xfrm>
-            <a:off x="8242337" y="826320"/>
-            <a:ext cx="3432577" cy="2625894"/>
+            <a:off x="2232617" y="5571859"/>
+            <a:ext cx="765950" cy="828295"/>
           </a:xfrm>
           <a:prstGeom prst="rect">
             <a:avLst/>
@@ -7920,10 +8901,10 @@
       </p:pic>
       <p:pic>
         <p:nvPicPr>
-          <p:cNvPr id="11" name="Picture 10">
-            <a:extLst>
-              <a:ext uri="{FF2B5EF4-FFF2-40B4-BE49-F238E27FC236}">
-                <a16:creationId xmlns:a16="http://schemas.microsoft.com/office/drawing/2014/main" id="{7EBFD2FF-4389-D16B-6245-2CDA3E82F269}"/>
+          <p:cNvPr id="17" name="Picture 16">
+            <a:extLst>
+              <a:ext uri="{FF2B5EF4-FFF2-40B4-BE49-F238E27FC236}">
+                <a16:creationId xmlns:a16="http://schemas.microsoft.com/office/drawing/2014/main" id="{988F83AD-2F78-6A2E-EECB-8B83E34DA8B6}"/>
               </a:ext>
             </a:extLst>
           </p:cNvPr>
@@ -7940,109 +8921,20 @@
         </p:blipFill>
         <p:spPr>
           <a:xfrm>
-            <a:off x="8262467" y="3696836"/>
-            <a:ext cx="3412447" cy="2705156"/>
+            <a:off x="2262825" y="4514635"/>
+            <a:ext cx="705533" cy="1029916"/>
           </a:xfrm>
           <a:prstGeom prst="rect">
             <a:avLst/>
           </a:prstGeom>
         </p:spPr>
       </p:pic>
-      <p:sp>
-        <p:nvSpPr>
-          <p:cNvPr id="5" name="TextBox 4">
-            <a:extLst>
-              <a:ext uri="{FF2B5EF4-FFF2-40B4-BE49-F238E27FC236}">
-                <a16:creationId xmlns:a16="http://schemas.microsoft.com/office/drawing/2014/main" id="{0BB27B2B-3BF3-3D6E-0A76-5CD15CA9498B}"/>
-              </a:ext>
-            </a:extLst>
-          </p:cNvPr>
-          <p:cNvSpPr txBox="1"/>
-          <p:nvPr/>
-        </p:nvSpPr>
-        <p:spPr>
-          <a:xfrm>
-            <a:off x="587767" y="2139267"/>
-            <a:ext cx="3834704" cy="2246769"/>
-          </a:xfrm>
-          <a:prstGeom prst="rect">
-            <a:avLst/>
-          </a:prstGeom>
-          <a:noFill/>
-        </p:spPr>
-        <p:txBody>
-          <a:bodyPr wrap="none" rtlCol="0">
-            <a:spAutoFit/>
-          </a:bodyPr>
-          <a:lstStyle/>
-          <a:p>
-            <a:r>
-              <a:rPr lang="en-US" sz="1400" dirty="0"/>
-              <a:t>.node</a:t>
-            </a:r>
-          </a:p>
-          <a:p>
-            <a:r>
-              <a:rPr lang="en-US" sz="1400" dirty="0"/>
-              <a:t>I1	1	0	2</a:t>
-            </a:r>
-          </a:p>
-          <a:p>
-            <a:r>
-              <a:rPr lang="en-US" sz="1400" dirty="0"/>
-              <a:t>R1	1	0	1000</a:t>
-            </a:r>
-          </a:p>
-          <a:p>
-            <a:r>
-              <a:rPr lang="en-US" sz="1400" dirty="0"/>
-              <a:t>C1	1	0	0.00001</a:t>
-            </a:r>
-          </a:p>
-          <a:p>
-            <a:r>
-              <a:rPr lang="en-US" sz="1400" dirty="0"/>
-              <a:t>.branch</a:t>
-            </a:r>
-          </a:p>
-          <a:p>
-            <a:r>
-              <a:rPr lang="en-US" sz="1400" dirty="0"/>
-              <a:t>R2	1	2	1000</a:t>
-            </a:r>
-          </a:p>
-          <a:p>
-            <a:r>
-              <a:rPr lang="en-US" sz="1400" dirty="0"/>
-              <a:t>L1	2	3	1</a:t>
-            </a:r>
-          </a:p>
-          <a:p>
-            <a:r>
-              <a:rPr lang="en-US" sz="1400" dirty="0"/>
-              <a:t>.node</a:t>
-            </a:r>
-          </a:p>
-          <a:p>
-            <a:r>
-              <a:rPr lang="en-US" sz="1400" dirty="0"/>
-              <a:t>R3	3	0	1000</a:t>
-            </a:r>
-          </a:p>
-          <a:p>
-            <a:r>
-              <a:rPr lang="en-US" sz="1400" dirty="0"/>
-              <a:t>C2	3	0	0.0000001</a:t>
-            </a:r>
-          </a:p>
-        </p:txBody>
-      </p:sp>
       <p:pic>
         <p:nvPicPr>
-          <p:cNvPr id="6" name="Picture 5">
-            <a:extLst>
-              <a:ext uri="{FF2B5EF4-FFF2-40B4-BE49-F238E27FC236}">
-                <a16:creationId xmlns:a16="http://schemas.microsoft.com/office/drawing/2014/main" id="{F0595E92-8FFA-DB6B-0092-8B1B1471379D}"/>
+          <p:cNvPr id="18" name="Picture 17">
+            <a:extLst>
+              <a:ext uri="{FF2B5EF4-FFF2-40B4-BE49-F238E27FC236}">
+                <a16:creationId xmlns:a16="http://schemas.microsoft.com/office/drawing/2014/main" id="{1C4CE6D2-6C7D-BAB9-9082-E325BF314174}"/>
               </a:ext>
             </a:extLst>
           </p:cNvPr>
@@ -8059,8 +8951,168 @@
         </p:blipFill>
         <p:spPr>
           <a:xfrm>
-            <a:off x="241403" y="4679618"/>
-            <a:ext cx="4899598" cy="2104168"/>
+            <a:off x="1468190" y="3949308"/>
+            <a:ext cx="679072" cy="2908692"/>
+          </a:xfrm>
+          <a:prstGeom prst="rect">
+            <a:avLst/>
+          </a:prstGeom>
+        </p:spPr>
+      </p:pic>
+      <p:sp>
+        <p:nvSpPr>
+          <p:cNvPr id="19" name="TextBox 18">
+            <a:extLst>
+              <a:ext uri="{FF2B5EF4-FFF2-40B4-BE49-F238E27FC236}">
+                <a16:creationId xmlns:a16="http://schemas.microsoft.com/office/drawing/2014/main" id="{9EB62826-E8C0-8C6F-2CFB-AC3C73276191}"/>
+              </a:ext>
+            </a:extLst>
+          </p:cNvPr>
+          <p:cNvSpPr txBox="1"/>
+          <p:nvPr/>
+        </p:nvSpPr>
+        <p:spPr>
+          <a:xfrm rot="16200000">
+            <a:off x="267286" y="4951829"/>
+            <a:ext cx="1244251" cy="369332"/>
+          </a:xfrm>
+          <a:prstGeom prst="rect">
+            <a:avLst/>
+          </a:prstGeom>
+          <a:noFill/>
+        </p:spPr>
+        <p:txBody>
+          <a:bodyPr wrap="none" rtlCol="0">
+            <a:spAutoFit/>
+          </a:bodyPr>
+          <a:lstStyle/>
+          <a:p>
+            <a:r>
+              <a:rPr lang="en-US" dirty="0"/>
+              <a:t>Algorithm</a:t>
+            </a:r>
+          </a:p>
+        </p:txBody>
+      </p:sp>
+      <p:sp>
+        <p:nvSpPr>
+          <p:cNvPr id="20" name="TextBox 19">
+            <a:extLst>
+              <a:ext uri="{FF2B5EF4-FFF2-40B4-BE49-F238E27FC236}">
+                <a16:creationId xmlns:a16="http://schemas.microsoft.com/office/drawing/2014/main" id="{15AC9F08-315E-D092-2DBB-EB3EBD9D7226}"/>
+              </a:ext>
+            </a:extLst>
+          </p:cNvPr>
+          <p:cNvSpPr txBox="1"/>
+          <p:nvPr/>
+        </p:nvSpPr>
+        <p:spPr>
+          <a:xfrm rot="16200000">
+            <a:off x="412871" y="2543013"/>
+            <a:ext cx="953081" cy="369332"/>
+          </a:xfrm>
+          <a:prstGeom prst="rect">
+            <a:avLst/>
+          </a:prstGeom>
+          <a:noFill/>
+        </p:spPr>
+        <p:txBody>
+          <a:bodyPr wrap="none" rtlCol="0">
+            <a:spAutoFit/>
+          </a:bodyPr>
+          <a:lstStyle/>
+          <a:p>
+            <a:r>
+              <a:rPr lang="en-US" dirty="0"/>
+              <a:t>Parsing</a:t>
+            </a:r>
+          </a:p>
+        </p:txBody>
+      </p:sp>
+      <p:pic>
+        <p:nvPicPr>
+          <p:cNvPr id="21" name="Picture 20">
+            <a:extLst>
+              <a:ext uri="{FF2B5EF4-FFF2-40B4-BE49-F238E27FC236}">
+                <a16:creationId xmlns:a16="http://schemas.microsoft.com/office/drawing/2014/main" id="{2A37952E-F4AC-ED3F-A04C-B9FB42F1A714}"/>
+              </a:ext>
+            </a:extLst>
+          </p:cNvPr>
+          <p:cNvPicPr>
+            <a:picLocks noChangeAspect="1"/>
+          </p:cNvPicPr>
+          <p:nvPr/>
+        </p:nvPicPr>
+        <p:blipFill>
+          <a:blip r:embed="rId6"/>
+          <a:stretch>
+            <a:fillRect/>
+          </a:stretch>
+        </p:blipFill>
+        <p:spPr>
+          <a:xfrm>
+            <a:off x="3194539" y="2026060"/>
+            <a:ext cx="2237869" cy="1923248"/>
+          </a:xfrm>
+          <a:prstGeom prst="rect">
+            <a:avLst/>
+          </a:prstGeom>
+        </p:spPr>
+      </p:pic>
+      <p:pic>
+        <p:nvPicPr>
+          <p:cNvPr id="22" name="Picture 21">
+            <a:extLst>
+              <a:ext uri="{FF2B5EF4-FFF2-40B4-BE49-F238E27FC236}">
+                <a16:creationId xmlns:a16="http://schemas.microsoft.com/office/drawing/2014/main" id="{726489B7-1097-5B1A-09DE-345880EEBA92}"/>
+              </a:ext>
+            </a:extLst>
+          </p:cNvPr>
+          <p:cNvPicPr>
+            <a:picLocks noChangeAspect="1"/>
+          </p:cNvPicPr>
+          <p:nvPr/>
+        </p:nvPicPr>
+        <p:blipFill>
+          <a:blip r:embed="rId7"/>
+          <a:stretch>
+            <a:fillRect/>
+          </a:stretch>
+        </p:blipFill>
+        <p:spPr>
+          <a:xfrm>
+            <a:off x="9228746" y="2593984"/>
+            <a:ext cx="2857500" cy="787400"/>
+          </a:xfrm>
+          <a:prstGeom prst="rect">
+            <a:avLst/>
+          </a:prstGeom>
+        </p:spPr>
+      </p:pic>
+      <p:pic>
+        <p:nvPicPr>
+          <p:cNvPr id="23" name="Picture 22">
+            <a:extLst>
+              <a:ext uri="{FF2B5EF4-FFF2-40B4-BE49-F238E27FC236}">
+                <a16:creationId xmlns:a16="http://schemas.microsoft.com/office/drawing/2014/main" id="{80D194D9-4E35-DF94-3605-F29DA2E76420}"/>
+              </a:ext>
+            </a:extLst>
+          </p:cNvPr>
+          <p:cNvPicPr>
+            <a:picLocks noChangeAspect="1"/>
+          </p:cNvPicPr>
+          <p:nvPr/>
+        </p:nvPicPr>
+        <p:blipFill>
+          <a:blip r:embed="rId8"/>
+          <a:stretch>
+            <a:fillRect/>
+          </a:stretch>
+        </p:blipFill>
+        <p:spPr>
+          <a:xfrm>
+            <a:off x="5628777" y="2073284"/>
+            <a:ext cx="3403600" cy="1828800"/>
           </a:xfrm>
           <a:prstGeom prst="rect">
             <a:avLst/>
@@ -8070,7 +9122,7 @@
     </p:spTree>
     <p:extLst>
       <p:ext uri="{BB962C8B-B14F-4D97-AF65-F5344CB8AC3E}">
-        <p14:creationId xmlns:p14="http://schemas.microsoft.com/office/powerpoint/2010/main" val="1701272158"/>
+        <p14:creationId xmlns:p14="http://schemas.microsoft.com/office/powerpoint/2010/main" val="3603275320"/>
       </p:ext>
     </p:extLst>
   </p:cSld>
@@ -8120,6 +9172,273 @@
           <a:p>
             <a:r>
               <a:rPr lang="en-US" dirty="0"/>
+              <a:t>LIM - Example</a:t>
+            </a:r>
+          </a:p>
+        </p:txBody>
+      </p:sp>
+      <p:pic>
+        <p:nvPicPr>
+          <p:cNvPr id="3" name="Picture 2">
+            <a:extLst>
+              <a:ext uri="{FF2B5EF4-FFF2-40B4-BE49-F238E27FC236}">
+                <a16:creationId xmlns:a16="http://schemas.microsoft.com/office/drawing/2014/main" id="{CC569F81-B14B-C802-1FFD-9DC4411A7117}"/>
+              </a:ext>
+            </a:extLst>
+          </p:cNvPr>
+          <p:cNvPicPr>
+            <a:picLocks noChangeAspect="1"/>
+          </p:cNvPicPr>
+          <p:nvPr/>
+        </p:nvPicPr>
+        <p:blipFill>
+          <a:blip r:embed="rId2"/>
+          <a:stretch>
+            <a:fillRect/>
+          </a:stretch>
+        </p:blipFill>
+        <p:spPr>
+          <a:xfrm>
+            <a:off x="4969874" y="2503891"/>
+            <a:ext cx="3201571" cy="2625894"/>
+          </a:xfrm>
+          <a:prstGeom prst="rect">
+            <a:avLst/>
+          </a:prstGeom>
+        </p:spPr>
+      </p:pic>
+      <p:pic>
+        <p:nvPicPr>
+          <p:cNvPr id="7" name="Picture 6">
+            <a:extLst>
+              <a:ext uri="{FF2B5EF4-FFF2-40B4-BE49-F238E27FC236}">
+                <a16:creationId xmlns:a16="http://schemas.microsoft.com/office/drawing/2014/main" id="{AE9B00A6-F705-8FE5-679F-217FC55C62D9}"/>
+              </a:ext>
+            </a:extLst>
+          </p:cNvPr>
+          <p:cNvPicPr>
+            <a:picLocks noChangeAspect="1"/>
+          </p:cNvPicPr>
+          <p:nvPr/>
+        </p:nvPicPr>
+        <p:blipFill>
+          <a:blip r:embed="rId3"/>
+          <a:stretch>
+            <a:fillRect/>
+          </a:stretch>
+        </p:blipFill>
+        <p:spPr>
+          <a:xfrm>
+            <a:off x="8242337" y="826320"/>
+            <a:ext cx="3432577" cy="2625894"/>
+          </a:xfrm>
+          <a:prstGeom prst="rect">
+            <a:avLst/>
+          </a:prstGeom>
+        </p:spPr>
+      </p:pic>
+      <p:pic>
+        <p:nvPicPr>
+          <p:cNvPr id="11" name="Picture 10">
+            <a:extLst>
+              <a:ext uri="{FF2B5EF4-FFF2-40B4-BE49-F238E27FC236}">
+                <a16:creationId xmlns:a16="http://schemas.microsoft.com/office/drawing/2014/main" id="{7EBFD2FF-4389-D16B-6245-2CDA3E82F269}"/>
+              </a:ext>
+            </a:extLst>
+          </p:cNvPr>
+          <p:cNvPicPr>
+            <a:picLocks noChangeAspect="1"/>
+          </p:cNvPicPr>
+          <p:nvPr/>
+        </p:nvPicPr>
+        <p:blipFill>
+          <a:blip r:embed="rId4"/>
+          <a:stretch>
+            <a:fillRect/>
+          </a:stretch>
+        </p:blipFill>
+        <p:spPr>
+          <a:xfrm>
+            <a:off x="8262467" y="3696836"/>
+            <a:ext cx="3412447" cy="2705156"/>
+          </a:xfrm>
+          <a:prstGeom prst="rect">
+            <a:avLst/>
+          </a:prstGeom>
+        </p:spPr>
+      </p:pic>
+      <p:sp>
+        <p:nvSpPr>
+          <p:cNvPr id="5" name="TextBox 4">
+            <a:extLst>
+              <a:ext uri="{FF2B5EF4-FFF2-40B4-BE49-F238E27FC236}">
+                <a16:creationId xmlns:a16="http://schemas.microsoft.com/office/drawing/2014/main" id="{0BB27B2B-3BF3-3D6E-0A76-5CD15CA9498B}"/>
+              </a:ext>
+            </a:extLst>
+          </p:cNvPr>
+          <p:cNvSpPr txBox="1"/>
+          <p:nvPr/>
+        </p:nvSpPr>
+        <p:spPr>
+          <a:xfrm>
+            <a:off x="587767" y="2139267"/>
+            <a:ext cx="3834704" cy="2246769"/>
+          </a:xfrm>
+          <a:prstGeom prst="rect">
+            <a:avLst/>
+          </a:prstGeom>
+          <a:noFill/>
+        </p:spPr>
+        <p:txBody>
+          <a:bodyPr wrap="none" rtlCol="0">
+            <a:spAutoFit/>
+          </a:bodyPr>
+          <a:lstStyle/>
+          <a:p>
+            <a:r>
+              <a:rPr lang="en-US" sz="1400" dirty="0"/>
+              <a:t>.node</a:t>
+            </a:r>
+          </a:p>
+          <a:p>
+            <a:r>
+              <a:rPr lang="en-US" sz="1400" dirty="0"/>
+              <a:t>I1	1	0	2</a:t>
+            </a:r>
+          </a:p>
+          <a:p>
+            <a:r>
+              <a:rPr lang="en-US" sz="1400" dirty="0"/>
+              <a:t>R1	1	0	1000</a:t>
+            </a:r>
+          </a:p>
+          <a:p>
+            <a:r>
+              <a:rPr lang="en-US" sz="1400" dirty="0"/>
+              <a:t>C1	1	0	0.00001</a:t>
+            </a:r>
+          </a:p>
+          <a:p>
+            <a:r>
+              <a:rPr lang="en-US" sz="1400" dirty="0"/>
+              <a:t>.branch</a:t>
+            </a:r>
+          </a:p>
+          <a:p>
+            <a:r>
+              <a:rPr lang="en-US" sz="1400" dirty="0"/>
+              <a:t>R2	1	2	1000</a:t>
+            </a:r>
+          </a:p>
+          <a:p>
+            <a:r>
+              <a:rPr lang="en-US" sz="1400" dirty="0"/>
+              <a:t>L1	2	3	1</a:t>
+            </a:r>
+          </a:p>
+          <a:p>
+            <a:r>
+              <a:rPr lang="en-US" sz="1400" dirty="0"/>
+              <a:t>.node</a:t>
+            </a:r>
+          </a:p>
+          <a:p>
+            <a:r>
+              <a:rPr lang="en-US" sz="1400" dirty="0"/>
+              <a:t>R3	3	0	1000</a:t>
+            </a:r>
+          </a:p>
+          <a:p>
+            <a:r>
+              <a:rPr lang="en-US" sz="1400" dirty="0"/>
+              <a:t>C2	3	0	0.0000001</a:t>
+            </a:r>
+          </a:p>
+        </p:txBody>
+      </p:sp>
+      <p:pic>
+        <p:nvPicPr>
+          <p:cNvPr id="6" name="Picture 5">
+            <a:extLst>
+              <a:ext uri="{FF2B5EF4-FFF2-40B4-BE49-F238E27FC236}">
+                <a16:creationId xmlns:a16="http://schemas.microsoft.com/office/drawing/2014/main" id="{F0595E92-8FFA-DB6B-0092-8B1B1471379D}"/>
+              </a:ext>
+            </a:extLst>
+          </p:cNvPr>
+          <p:cNvPicPr>
+            <a:picLocks noChangeAspect="1"/>
+          </p:cNvPicPr>
+          <p:nvPr/>
+        </p:nvPicPr>
+        <p:blipFill>
+          <a:blip r:embed="rId5"/>
+          <a:stretch>
+            <a:fillRect/>
+          </a:stretch>
+        </p:blipFill>
+        <p:spPr>
+          <a:xfrm>
+            <a:off x="241403" y="4679618"/>
+            <a:ext cx="4899598" cy="2104168"/>
+          </a:xfrm>
+          <a:prstGeom prst="rect">
+            <a:avLst/>
+          </a:prstGeom>
+        </p:spPr>
+      </p:pic>
+    </p:spTree>
+    <p:extLst>
+      <p:ext uri="{BB962C8B-B14F-4D97-AF65-F5344CB8AC3E}">
+        <p14:creationId xmlns:p14="http://schemas.microsoft.com/office/powerpoint/2010/main" val="1701272158"/>
+      </p:ext>
+    </p:extLst>
+  </p:cSld>
+  <p:clrMapOvr>
+    <a:masterClrMapping/>
+  </p:clrMapOvr>
+</p:sld>
+</file>
+
+<file path=ppt/slides/slide6.xml><?xml version="1.0" encoding="utf-8"?>
+<p:sld xmlns:a="http://schemas.openxmlformats.org/drawingml/2006/main" xmlns:r="http://schemas.openxmlformats.org/officeDocument/2006/relationships" xmlns:p="http://schemas.openxmlformats.org/presentationml/2006/main">
+  <p:cSld>
+    <p:spTree>
+      <p:nvGrpSpPr>
+        <p:cNvPr id="1" name=""/>
+        <p:cNvGrpSpPr/>
+        <p:nvPr/>
+      </p:nvGrpSpPr>
+      <p:grpSpPr>
+        <a:xfrm>
+          <a:off x="0" y="0"/>
+          <a:ext cx="0" cy="0"/>
+          <a:chOff x="0" y="0"/>
+          <a:chExt cx="0" cy="0"/>
+        </a:xfrm>
+      </p:grpSpPr>
+      <p:sp>
+        <p:nvSpPr>
+          <p:cNvPr id="2" name="Title 1">
+            <a:extLst>
+              <a:ext uri="{FF2B5EF4-FFF2-40B4-BE49-F238E27FC236}">
+                <a16:creationId xmlns:a16="http://schemas.microsoft.com/office/drawing/2014/main" id="{17427281-9830-2FB5-E037-4213FEBE2BEF}"/>
+              </a:ext>
+            </a:extLst>
+          </p:cNvPr>
+          <p:cNvSpPr>
+            <a:spLocks noGrp="1"/>
+          </p:cNvSpPr>
+          <p:nvPr>
+            <p:ph type="title"/>
+          </p:nvPr>
+        </p:nvSpPr>
+        <p:spPr/>
+        <p:txBody>
+          <a:bodyPr/>
+          <a:lstStyle/>
+          <a:p>
+            <a:r>
+              <a:rPr lang="en-US" dirty="0"/>
               <a:t>LIM – Instability Example</a:t>
             </a:r>
           </a:p>
@@ -8353,7 +9672,7 @@
 </p:sld>
 </file>
 
-<file path=ppt/slides/slide6.xml><?xml version="1.0" encoding="utf-8"?>
+<file path=ppt/slides/slide7.xml><?xml version="1.0" encoding="utf-8"?>
 <p:sld xmlns:a="http://schemas.openxmlformats.org/drawingml/2006/main" xmlns:r="http://schemas.openxmlformats.org/officeDocument/2006/relationships" xmlns:p="http://schemas.openxmlformats.org/presentationml/2006/main">
   <p:cSld>
     <p:spTree>

</xml_diff>

<commit_message>
ok this time finished HW3.pptx
</commit_message>
<xml_diff>
--- a/HW3.pptx
+++ b/HW3.pptx
@@ -156,7 +156,7 @@
             </a:pPr>
             <a:r>
               <a:rPr lang="en-US"/>
-              <a:t>LIM vs. MNA Execution Time</a:t>
+              <a:t>LIM vs. MNA Factored vs. MNA Nonfactored Execution Time</a:t>
             </a:r>
           </a:p>
         </c:rich>
@@ -193,38 +193,50 @@
     <c:autoTitleDeleted val="0"/>
     <c:plotArea>
       <c:layout/>
-      <c:lineChart>
-        <c:grouping val="standard"/>
+      <c:scatterChart>
+        <c:scatterStyle val="lineMarker"/>
         <c:varyColors val="0"/>
         <c:ser>
           <c:idx val="0"/>
           <c:order val="0"/>
           <c:tx>
             <c:strRef>
-              <c:f>Sheet1!$A$2</c:f>
+              <c:f>Sheet1!$B$1</c:f>
               <c:strCache>
                 <c:ptCount val="1"/>
                 <c:pt idx="0">
-                  <c:v>LIM</c:v>
+                  <c:v>LIM (sec)</c:v>
                 </c:pt>
               </c:strCache>
             </c:strRef>
           </c:tx>
           <c:spPr>
-            <a:ln w="28575" cap="rnd">
+            <a:ln w="19050" cap="rnd">
               <a:solidFill>
-                <a:schemeClr val="accent5"/>
+                <a:srgbClr val="FFC000"/>
               </a:solidFill>
               <a:round/>
             </a:ln>
             <a:effectLst/>
           </c:spPr>
           <c:marker>
-            <c:symbol val="none"/>
+            <c:symbol val="circle"/>
+            <c:size val="5"/>
+            <c:spPr>
+              <a:solidFill>
+                <a:srgbClr val="FFC000"/>
+              </a:solidFill>
+              <a:ln w="9525">
+                <a:solidFill>
+                  <a:schemeClr val="accent1"/>
+                </a:solidFill>
+              </a:ln>
+              <a:effectLst/>
+            </c:spPr>
           </c:marker>
-          <c:cat>
+          <c:xVal>
             <c:numRef>
-              <c:f>Sheet1!$B$1:$H$1</c:f>
+              <c:f>Sheet1!$A$2:$A$8</c:f>
               <c:numCache>
                 <c:formatCode>General</c:formatCode>
                 <c:ptCount val="7"/>
@@ -251,10 +263,10 @@
                 </c:pt>
               </c:numCache>
             </c:numRef>
-          </c:cat>
-          <c:val>
+          </c:xVal>
+          <c:yVal>
             <c:numRef>
-              <c:f>Sheet1!$B$2:$H$2</c:f>
+              <c:f>Sheet1!$B$2:$B$8</c:f>
               <c:numCache>
                 <c:formatCode>General</c:formatCode>
                 <c:ptCount val="7"/>
@@ -281,11 +293,11 @@
                 </c:pt>
               </c:numCache>
             </c:numRef>
-          </c:val>
+          </c:yVal>
           <c:smooth val="0"/>
           <c:extLst>
             <c:ext xmlns:c16="http://schemas.microsoft.com/office/drawing/2014/chart" uri="{C3380CC4-5D6E-409C-BE32-E72D297353CC}">
-              <c16:uniqueId val="{00000000-5C96-E142-92DA-2F3D4F4FA77D}"/>
+              <c16:uniqueId val="{00000000-0678-244A-8409-A6CD37DE4AA8}"/>
             </c:ext>
           </c:extLst>
         </c:ser>
@@ -294,30 +306,42 @@
           <c:order val="1"/>
           <c:tx>
             <c:strRef>
-              <c:f>Sheet1!$A$3</c:f>
+              <c:f>Sheet1!$C$1</c:f>
               <c:strCache>
                 <c:ptCount val="1"/>
                 <c:pt idx="0">
-                  <c:v>MNA</c:v>
+                  <c:v>MNA Factored (sec)</c:v>
                 </c:pt>
               </c:strCache>
             </c:strRef>
           </c:tx>
           <c:spPr>
-            <a:ln w="28575" cap="rnd">
+            <a:ln w="19050" cap="rnd">
               <a:solidFill>
-                <a:srgbClr val="FFC000"/>
+                <a:srgbClr val="00B050"/>
               </a:solidFill>
               <a:round/>
             </a:ln>
             <a:effectLst/>
           </c:spPr>
           <c:marker>
-            <c:symbol val="none"/>
+            <c:symbol val="circle"/>
+            <c:size val="5"/>
+            <c:spPr>
+              <a:solidFill>
+                <a:srgbClr val="00B050"/>
+              </a:solidFill>
+              <a:ln w="9525">
+                <a:solidFill>
+                  <a:schemeClr val="accent2"/>
+                </a:solidFill>
+              </a:ln>
+              <a:effectLst/>
+            </c:spPr>
           </c:marker>
-          <c:cat>
+          <c:xVal>
             <c:numRef>
-              <c:f>Sheet1!$B$1:$H$1</c:f>
+              <c:f>Sheet1!$A$2:$A$8</c:f>
               <c:numCache>
                 <c:formatCode>General</c:formatCode>
                 <c:ptCount val="7"/>
@@ -344,41 +368,146 @@
                 </c:pt>
               </c:numCache>
             </c:numRef>
-          </c:cat>
-          <c:val>
+          </c:xVal>
+          <c:yVal>
             <c:numRef>
-              <c:f>Sheet1!$B$3:$H$3</c:f>
+              <c:f>Sheet1!$C$2:$C$8</c:f>
               <c:numCache>
                 <c:formatCode>General</c:formatCode>
                 <c:ptCount val="7"/>
                 <c:pt idx="0">
-                  <c:v>6.6779999999999999E-3</c:v>
+                  <c:v>2.6510000000000001E-3</c:v>
                 </c:pt>
                 <c:pt idx="1">
-                  <c:v>3.0329999999999999E-2</c:v>
+                  <c:v>3.9779999999999998E-3</c:v>
                 </c:pt>
                 <c:pt idx="2">
-                  <c:v>4.8860000000000001E-2</c:v>
+                  <c:v>7.8729999999999998E-3</c:v>
                 </c:pt>
                 <c:pt idx="3">
-                  <c:v>0.25380000000000003</c:v>
+                  <c:v>3.0720000000000001E-2</c:v>
                 </c:pt>
                 <c:pt idx="4">
-                  <c:v>0.60540000000000005</c:v>
+                  <c:v>5.9670000000000001E-2</c:v>
                 </c:pt>
                 <c:pt idx="5">
-                  <c:v>2.7342</c:v>
+                  <c:v>0.29010000000000002</c:v>
                 </c:pt>
                 <c:pt idx="6">
-                  <c:v>5.1824000000000003</c:v>
+                  <c:v>0.59050000000000002</c:v>
                 </c:pt>
               </c:numCache>
             </c:numRef>
-          </c:val>
+          </c:yVal>
           <c:smooth val="0"/>
           <c:extLst>
             <c:ext xmlns:c16="http://schemas.microsoft.com/office/drawing/2014/chart" uri="{C3380CC4-5D6E-409C-BE32-E72D297353CC}">
-              <c16:uniqueId val="{00000001-5C96-E142-92DA-2F3D4F4FA77D}"/>
+              <c16:uniqueId val="{00000001-0678-244A-8409-A6CD37DE4AA8}"/>
+            </c:ext>
+          </c:extLst>
+        </c:ser>
+        <c:ser>
+          <c:idx val="2"/>
+          <c:order val="2"/>
+          <c:tx>
+            <c:strRef>
+              <c:f>Sheet1!$D$1</c:f>
+              <c:strCache>
+                <c:ptCount val="1"/>
+                <c:pt idx="0">
+                  <c:v>MNA Nonfactored (sec)</c:v>
+                </c:pt>
+              </c:strCache>
+            </c:strRef>
+          </c:tx>
+          <c:spPr>
+            <a:ln w="19050" cap="rnd">
+              <a:solidFill>
+                <a:schemeClr val="accent5"/>
+              </a:solidFill>
+              <a:round/>
+            </a:ln>
+            <a:effectLst/>
+          </c:spPr>
+          <c:marker>
+            <c:symbol val="circle"/>
+            <c:size val="5"/>
+            <c:spPr>
+              <a:solidFill>
+                <a:schemeClr val="accent5"/>
+              </a:solidFill>
+              <a:ln w="9525">
+                <a:solidFill>
+                  <a:schemeClr val="accent3"/>
+                </a:solidFill>
+              </a:ln>
+              <a:effectLst/>
+            </c:spPr>
+          </c:marker>
+          <c:xVal>
+            <c:numRef>
+              <c:f>Sheet1!$A$2:$A$8</c:f>
+              <c:numCache>
+                <c:formatCode>General</c:formatCode>
+                <c:ptCount val="7"/>
+                <c:pt idx="0">
+                  <c:v>100</c:v>
+                </c:pt>
+                <c:pt idx="1">
+                  <c:v>500</c:v>
+                </c:pt>
+                <c:pt idx="2">
+                  <c:v>1000</c:v>
+                </c:pt>
+                <c:pt idx="3">
+                  <c:v>5000</c:v>
+                </c:pt>
+                <c:pt idx="4">
+                  <c:v>10000</c:v>
+                </c:pt>
+                <c:pt idx="5">
+                  <c:v>50000</c:v>
+                </c:pt>
+                <c:pt idx="6">
+                  <c:v>100000</c:v>
+                </c:pt>
+              </c:numCache>
+            </c:numRef>
+          </c:xVal>
+          <c:yVal>
+            <c:numRef>
+              <c:f>Sheet1!$D$2:$D$8</c:f>
+              <c:numCache>
+                <c:formatCode>General</c:formatCode>
+                <c:ptCount val="7"/>
+                <c:pt idx="0">
+                  <c:v>2.6689999999999999E-3</c:v>
+                </c:pt>
+                <c:pt idx="1">
+                  <c:v>4.8329999999999996E-3</c:v>
+                </c:pt>
+                <c:pt idx="2">
+                  <c:v>1.1039999999999999E-2</c:v>
+                </c:pt>
+                <c:pt idx="3">
+                  <c:v>4.6170000000000003E-2</c:v>
+                </c:pt>
+                <c:pt idx="4">
+                  <c:v>8.7520000000000001E-2</c:v>
+                </c:pt>
+                <c:pt idx="5">
+                  <c:v>0.43099999999999999</c:v>
+                </c:pt>
+                <c:pt idx="6">
+                  <c:v>0.84130000000000005</c:v>
+                </c:pt>
+              </c:numCache>
+            </c:numRef>
+          </c:yVal>
+          <c:smooth val="0"/>
+          <c:extLst>
+            <c:ext xmlns:c16="http://schemas.microsoft.com/office/drawing/2014/chart" uri="{C3380CC4-5D6E-409C-BE32-E72D297353CC}">
+              <c16:uniqueId val="{00000002-0678-244A-8409-A6CD37DE4AA8}"/>
             </c:ext>
           </c:extLst>
         </c:ser>
@@ -390,17 +519,30 @@
           <c:showPercent val="0"/>
           <c:showBubbleSize val="0"/>
         </c:dLbls>
-        <c:smooth val="0"/>
-        <c:axId val="1891387200"/>
-        <c:axId val="1956194368"/>
-      </c:lineChart>
-      <c:catAx>
-        <c:axId val="1891387200"/>
+        <c:axId val="2015658256"/>
+        <c:axId val="2015806944"/>
+      </c:scatterChart>
+      <c:valAx>
+        <c:axId val="2015658256"/>
         <c:scaling>
           <c:orientation val="minMax"/>
         </c:scaling>
         <c:delete val="0"/>
         <c:axPos val="b"/>
+        <c:majorGridlines>
+          <c:spPr>
+            <a:ln w="9525" cap="flat" cmpd="sng" algn="ctr">
+              <a:solidFill>
+                <a:schemeClr val="tx1">
+                  <a:lumMod val="15000"/>
+                  <a:lumOff val="85000"/>
+                </a:schemeClr>
+              </a:solidFill>
+              <a:round/>
+            </a:ln>
+            <a:effectLst/>
+          </c:spPr>
+        </c:majorGridlines>
         <c:title>
           <c:tx>
             <c:rich>
@@ -422,8 +564,13 @@
                 </a:pPr>
                 <a:r>
                   <a:rPr lang="en-US"/>
-                  <a:t>Number of Loops</a:t>
+                  <a:t>Number of</a:t>
                 </a:r>
+                <a:r>
+                  <a:rPr lang="en-US" baseline="0"/>
+                  <a:t> Iterations</a:t>
+                </a:r>
+                <a:endParaRPr lang="en-US"/>
               </a:p>
             </c:rich>
           </c:tx>
@@ -465,8 +612,8 @@
           <a:ln w="9525" cap="flat" cmpd="sng" algn="ctr">
             <a:solidFill>
               <a:schemeClr val="tx1">
-                <a:lumMod val="15000"/>
-                <a:lumOff val="85000"/>
+                <a:lumMod val="25000"/>
+                <a:lumOff val="75000"/>
               </a:schemeClr>
             </a:solidFill>
             <a:round/>
@@ -493,15 +640,12 @@
             <a:endParaRPr lang="en-US"/>
           </a:p>
         </c:txPr>
-        <c:crossAx val="1956194368"/>
+        <c:crossAx val="2015806944"/>
         <c:crosses val="autoZero"/>
-        <c:auto val="1"/>
-        <c:lblAlgn val="ctr"/>
-        <c:lblOffset val="100"/>
-        <c:noMultiLvlLbl val="0"/>
-      </c:catAx>
+        <c:crossBetween val="midCat"/>
+      </c:valAx>
       <c:valAx>
-        <c:axId val="1956194368"/>
+        <c:axId val="2015806944"/>
         <c:scaling>
           <c:orientation val="minMax"/>
         </c:scaling>
@@ -582,8 +726,14 @@
         <c:tickLblPos val="nextTo"/>
         <c:spPr>
           <a:noFill/>
-          <a:ln>
-            <a:noFill/>
+          <a:ln w="9525" cap="flat" cmpd="sng" algn="ctr">
+            <a:solidFill>
+              <a:schemeClr val="tx1">
+                <a:lumMod val="25000"/>
+                <a:lumOff val="75000"/>
+              </a:schemeClr>
+            </a:solidFill>
+            <a:round/>
           </a:ln>
           <a:effectLst/>
         </c:spPr>
@@ -607,9 +757,9 @@
             <a:endParaRPr lang="en-US"/>
           </a:p>
         </c:txPr>
-        <c:crossAx val="1891387200"/>
+        <c:crossAx val="2015658256"/>
         <c:crosses val="autoZero"/>
-        <c:crossBetween val="between"/>
+        <c:crossBetween val="midCat"/>
       </c:valAx>
       <c:spPr>
         <a:noFill/>
@@ -652,13 +802,6 @@
     </c:legend>
     <c:plotVisOnly val="1"/>
     <c:dispBlanksAs val="gap"/>
-    <c:extLst>
-      <c:ext xmlns:c16r3="http://schemas.microsoft.com/office/drawing/2017/03/chart" uri="{56B9EC1D-385E-4148-901F-78D8002777C0}">
-        <c16r3:dataDisplayOptions16>
-          <c16r3:dispNaAsBlank val="1"/>
-        </c16r3:dataDisplayOptions16>
-      </c:ext>
-    </c:extLst>
     <c:showDLblsOverMax val="0"/>
   </c:chart>
   <c:spPr>
@@ -725,7 +868,7 @@
 </file>
 
 <file path=ppt/charts/style1.xml><?xml version="1.0" encoding="utf-8"?>
-<cs:chartStyle xmlns:cs="http://schemas.microsoft.com/office/drawing/2012/chartStyle" xmlns:a="http://schemas.openxmlformats.org/drawingml/2006/main" id="227">
+<cs:chartStyle xmlns:cs="http://schemas.microsoft.com/office/drawing/2012/chartStyle" xmlns:a="http://schemas.openxmlformats.org/drawingml/2006/main" id="240">
   <cs:axisTitle>
     <cs:lnRef idx="0"/>
     <cs:fillRef idx="0"/>
@@ -752,8 +895,8 @@
       <a:ln w="9525" cap="flat" cmpd="sng" algn="ctr">
         <a:solidFill>
           <a:schemeClr val="tx1">
-            <a:lumMod val="15000"/>
-            <a:lumOff val="85000"/>
+            <a:lumMod val="25000"/>
+            <a:lumOff val="75000"/>
           </a:schemeClr>
         </a:solidFill>
         <a:round/>
@@ -833,11 +976,6 @@
     <cs:fontRef idx="minor">
       <a:schemeClr val="tx1"/>
     </cs:fontRef>
-    <cs:spPr>
-      <a:solidFill>
-        <a:schemeClr val="phClr"/>
-      </a:solidFill>
-    </cs:spPr>
   </cs:dataPoint>
   <cs:dataPoint3D>
     <cs:lnRef idx="0"/>
@@ -848,11 +986,6 @@
     <cs:fontRef idx="minor">
       <a:schemeClr val="tx1"/>
     </cs:fontRef>
-    <cs:spPr>
-      <a:solidFill>
-        <a:schemeClr val="phClr"/>
-      </a:solidFill>
-    </cs:spPr>
   </cs:dataPoint3D>
   <cs:dataPointLine>
     <cs:lnRef idx="0">
@@ -864,7 +997,7 @@
       <a:schemeClr val="tx1"/>
     </cs:fontRef>
     <cs:spPr>
-      <a:ln w="28575" cap="rnd">
+      <a:ln w="19050" cap="rnd">
         <a:solidFill>
           <a:schemeClr val="phClr"/>
         </a:solidFill>
@@ -884,9 +1017,6 @@
       <a:schemeClr val="tx1"/>
     </cs:fontRef>
     <cs:spPr>
-      <a:solidFill>
-        <a:schemeClr val="phClr"/>
-      </a:solidFill>
       <a:ln w="9525">
         <a:solidFill>
           <a:schemeClr val="phClr"/>
@@ -899,10 +1029,10 @@
     <cs:lnRef idx="0">
       <cs:styleClr val="auto"/>
     </cs:lnRef>
-    <cs:fillRef idx="1"/>
+    <cs:fillRef idx="0"/>
     <cs:effectRef idx="0"/>
     <cs:fontRef idx="minor">
-      <a:schemeClr val="tx1"/>
+      <a:schemeClr val="dk1"/>
     </cs:fontRef>
     <cs:spPr>
       <a:ln w="9525" cap="rnd">
@@ -942,22 +1072,23 @@
     <cs:fillRef idx="0"/>
     <cs:effectRef idx="0"/>
     <cs:fontRef idx="minor">
-      <a:schemeClr val="dk1"/>
+      <a:schemeClr val="tx1"/>
     </cs:fontRef>
     <cs:spPr>
       <a:solidFill>
         <a:schemeClr val="dk1">
-          <a:lumMod val="65000"/>
-          <a:lumOff val="35000"/>
+          <a:lumMod val="75000"/>
+          <a:lumOff val="25000"/>
         </a:schemeClr>
       </a:solidFill>
-      <a:ln w="9525">
+      <a:ln w="9525" cap="flat" cmpd="sng" algn="ctr">
         <a:solidFill>
           <a:schemeClr val="tx1">
             <a:lumMod val="65000"/>
             <a:lumOff val="35000"/>
           </a:schemeClr>
         </a:solidFill>
+        <a:round/>
       </a:ln>
     </cs:spPr>
   </cs:downBar>
@@ -1062,8 +1193,8 @@
       <a:ln w="9525" cap="flat" cmpd="sng" algn="ctr">
         <a:solidFill>
           <a:schemeClr val="tx1">
-            <a:lumMod val="75000"/>
-            <a:lumOff val="25000"/>
+            <a:lumMod val="50000"/>
+            <a:lumOff val="50000"/>
           </a:schemeClr>
         </a:solidFill>
         <a:round/>
@@ -1195,19 +1326,20 @@
     <cs:fillRef idx="0"/>
     <cs:effectRef idx="0"/>
     <cs:fontRef idx="minor">
-      <a:schemeClr val="dk1"/>
+      <a:schemeClr val="tx1"/>
     </cs:fontRef>
     <cs:spPr>
       <a:solidFill>
         <a:schemeClr val="lt1"/>
       </a:solidFill>
-      <a:ln w="9525">
+      <a:ln w="9525" cap="flat" cmpd="sng" algn="ctr">
         <a:solidFill>
           <a:schemeClr val="tx1">
-            <a:lumMod val="15000"/>
-            <a:lumOff val="85000"/>
+            <a:lumMod val="65000"/>
+            <a:lumOff val="35000"/>
           </a:schemeClr>
         </a:solidFill>
+        <a:round/>
       </a:ln>
     </cs:spPr>
   </cs:upBar>
@@ -1221,6 +1353,17 @@
         <a:lumOff val="35000"/>
       </a:schemeClr>
     </cs:fontRef>
+    <cs:spPr>
+      <a:ln w="9525" cap="flat" cmpd="sng" algn="ctr">
+        <a:solidFill>
+          <a:schemeClr val="tx1">
+            <a:lumMod val="25000"/>
+            <a:lumOff val="75000"/>
+          </a:schemeClr>
+        </a:solidFill>
+        <a:round/>
+      </a:ln>
+    </cs:spPr>
     <cs:defRPr sz="900" kern="1200"/>
   </cs:valueAxis>
   <cs:wall>
@@ -1322,7 +1465,7 @@
           <a:p>
             <a:fld id="{2747D2AE-6F0F-1942-B8BE-938C97736A66}" type="datetimeFigureOut">
               <a:rPr lang="en-US" smtClean="0"/>
-              <a:t>5/16/23</a:t>
+              <a:t>5/18/23</a:t>
             </a:fld>
             <a:endParaRPr lang="en-US"/>
           </a:p>
@@ -1745,7 +1888,7 @@
           <a:p>
             <a:fld id="{02AC24A9-CCB6-4F8D-B8DB-C2F3692CFA5A}" type="datetimeFigureOut">
               <a:rPr lang="en-US" smtClean="0"/>
-              <a:t>5/16/23</a:t>
+              <a:t>5/18/23</a:t>
             </a:fld>
             <a:endParaRPr lang="en-US" dirty="0"/>
           </a:p>
@@ -2115,7 +2258,7 @@
           <a:p>
             <a:fld id="{02AC24A9-CCB6-4F8D-B8DB-C2F3692CFA5A}" type="datetimeFigureOut">
               <a:rPr lang="en-US" smtClean="0"/>
-              <a:t>5/16/23</a:t>
+              <a:t>5/18/23</a:t>
             </a:fld>
             <a:endParaRPr lang="en-US"/>
           </a:p>
@@ -2324,7 +2467,7 @@
           <a:p>
             <a:fld id="{02AC24A9-CCB6-4F8D-B8DB-C2F3692CFA5A}" type="datetimeFigureOut">
               <a:rPr lang="en-US" smtClean="0"/>
-              <a:t>5/16/23</a:t>
+              <a:t>5/18/23</a:t>
             </a:fld>
             <a:endParaRPr lang="en-US"/>
           </a:p>
@@ -2794,7 +2937,7 @@
           <a:p>
             <a:fld id="{02AC24A9-CCB6-4F8D-B8DB-C2F3692CFA5A}" type="datetimeFigureOut">
               <a:rPr lang="en-US" smtClean="0"/>
-              <a:t>5/16/23</a:t>
+              <a:t>5/18/23</a:t>
             </a:fld>
             <a:endParaRPr lang="en-US"/>
           </a:p>
@@ -3248,7 +3391,7 @@
           <a:p>
             <a:fld id="{02AC24A9-CCB6-4F8D-B8DB-C2F3692CFA5A}" type="datetimeFigureOut">
               <a:rPr lang="en-US" smtClean="0"/>
-              <a:t>5/16/23</a:t>
+              <a:t>5/18/23</a:t>
             </a:fld>
             <a:endParaRPr lang="en-US"/>
           </a:p>
@@ -3780,7 +3923,7 @@
           <a:p>
             <a:fld id="{02AC24A9-CCB6-4F8D-B8DB-C2F3692CFA5A}" type="datetimeFigureOut">
               <a:rPr lang="en-US" smtClean="0"/>
-              <a:t>5/16/23</a:t>
+              <a:t>5/18/23</a:t>
             </a:fld>
             <a:endParaRPr lang="en-US"/>
           </a:p>
@@ -4479,7 +4622,7 @@
           <a:p>
             <a:fld id="{02AC24A9-CCB6-4F8D-B8DB-C2F3692CFA5A}" type="datetimeFigureOut">
               <a:rPr lang="en-US" smtClean="0"/>
-              <a:t>5/16/23</a:t>
+              <a:t>5/18/23</a:t>
             </a:fld>
             <a:endParaRPr lang="en-US"/>
           </a:p>
@@ -4808,7 +4951,7 @@
           <a:p>
             <a:fld id="{02AC24A9-CCB6-4F8D-B8DB-C2F3692CFA5A}" type="datetimeFigureOut">
               <a:rPr lang="en-US" smtClean="0"/>
-              <a:t>5/16/23</a:t>
+              <a:t>5/18/23</a:t>
             </a:fld>
             <a:endParaRPr lang="en-US"/>
           </a:p>
@@ -4921,7 +5064,7 @@
           <a:p>
             <a:fld id="{02AC24A9-CCB6-4F8D-B8DB-C2F3692CFA5A}" type="datetimeFigureOut">
               <a:rPr lang="en-US" smtClean="0"/>
-              <a:t>5/16/23</a:t>
+              <a:t>5/18/23</a:t>
             </a:fld>
             <a:endParaRPr lang="en-US"/>
           </a:p>
@@ -5416,7 +5559,7 @@
           <a:p>
             <a:fld id="{02AC24A9-CCB6-4F8D-B8DB-C2F3692CFA5A}" type="datetimeFigureOut">
               <a:rPr lang="en-US" smtClean="0"/>
-              <a:t>5/16/23</a:t>
+              <a:t>5/18/23</a:t>
             </a:fld>
             <a:endParaRPr lang="en-US" dirty="0"/>
           </a:p>
@@ -5893,7 +6036,7 @@
           <a:p>
             <a:fld id="{02AC24A9-CCB6-4F8D-B8DB-C2F3692CFA5A}" type="datetimeFigureOut">
               <a:rPr lang="en-US" smtClean="0"/>
-              <a:t>5/16/23</a:t>
+              <a:t>5/18/23</a:t>
             </a:fld>
             <a:endParaRPr lang="en-US"/>
           </a:p>
@@ -6136,7 +6279,7 @@
           <a:p>
             <a:fld id="{02AC24A9-CCB6-4F8D-B8DB-C2F3692CFA5A}" type="datetimeFigureOut">
               <a:rPr lang="en-US" smtClean="0"/>
-              <a:t>5/16/23</a:t>
+              <a:t>5/18/23</a:t>
             </a:fld>
             <a:endParaRPr lang="en-US"/>
           </a:p>
@@ -9732,14 +9875,14 @@
           <p:nvPr>
             <p:extLst>
               <p:ext uri="{D42A27DB-BD31-4B8C-83A1-F6EECF244321}">
-                <p14:modId xmlns:p14="http://schemas.microsoft.com/office/powerpoint/2010/main" val="4059192093"/>
+                <p14:modId xmlns:p14="http://schemas.microsoft.com/office/powerpoint/2010/main" val="4195867228"/>
               </p:ext>
             </p:extLst>
           </p:nvPr>
         </p:nvGraphicFramePr>
         <p:xfrm>
-          <a:off x="1115568" y="2891366"/>
-          <a:ext cx="4382261" cy="3235960"/>
+          <a:off x="532638" y="2592662"/>
+          <a:ext cx="5776722" cy="3510280"/>
         </p:xfrm>
         <a:graphic>
           <a:graphicData uri="http://schemas.openxmlformats.org/drawingml/2006/table">
@@ -9748,24 +9891,31 @@
                 <a:tableStyleId>{7DF18680-E054-41AD-8BC1-D1AEF772440D}</a:tableStyleId>
               </a:tblPr>
               <a:tblGrid>
-                <a:gridCol w="1759177">
+                <a:gridCol w="1477105">
                   <a:extLst>
                     <a:ext uri="{9D8B030D-6E8A-4147-A177-3AD203B41FA5}">
                       <a16:colId xmlns:a16="http://schemas.microsoft.com/office/drawing/2014/main" val="305159656"/>
                     </a:ext>
                   </a:extLst>
                 </a:gridCol>
-                <a:gridCol w="1325798">
+                <a:gridCol w="1420294">
                   <a:extLst>
                     <a:ext uri="{9D8B030D-6E8A-4147-A177-3AD203B41FA5}">
                       <a16:colId xmlns:a16="http://schemas.microsoft.com/office/drawing/2014/main" val="4066692876"/>
                     </a:ext>
                   </a:extLst>
                 </a:gridCol>
-                <a:gridCol w="1297286">
+                <a:gridCol w="1252441">
                   <a:extLst>
                     <a:ext uri="{9D8B030D-6E8A-4147-A177-3AD203B41FA5}">
                       <a16:colId xmlns:a16="http://schemas.microsoft.com/office/drawing/2014/main" val="24275476"/>
+                    </a:ext>
+                  </a:extLst>
+                </a:gridCol>
+                <a:gridCol w="1626882">
+                  <a:extLst>
+                    <a:ext uri="{9D8B030D-6E8A-4147-A177-3AD203B41FA5}">
+                      <a16:colId xmlns:a16="http://schemas.microsoft.com/office/drawing/2014/main" val="1308641327"/>
                     </a:ext>
                   </a:extLst>
                 </a:gridCol>
@@ -9804,7 +9954,28 @@
                     <a:p>
                       <a:r>
                         <a:rPr lang="en-US" dirty="0"/>
-                        <a:t>MNA (sec)</a:t>
+                        <a:t>MNA Factored (sec)</a:t>
+                      </a:r>
+                    </a:p>
+                  </a:txBody>
+                  <a:tcPr/>
+                </a:tc>
+                <a:tc>
+                  <a:txBody>
+                    <a:bodyPr/>
+                    <a:lstStyle/>
+                    <a:p>
+                      <a:r>
+                        <a:rPr lang="en-US" dirty="0"/>
+                        <a:t>MNA </a:t>
+                      </a:r>
+                      <a:r>
+                        <a:rPr lang="en-US" dirty="0" err="1"/>
+                        <a:t>Nonfactored</a:t>
+                      </a:r>
+                      <a:r>
+                        <a:rPr lang="en-US" dirty="0"/>
+                        <a:t> (sec)</a:t>
                       </a:r>
                     </a:p>
                   </a:txBody>
@@ -9823,7 +9994,7 @@
                     <a:lstStyle/>
                     <a:p>
                       <a:r>
-                        <a:rPr lang="en-US" dirty="0"/>
+                        <a:rPr lang="en-US" sz="1600" dirty="0"/>
                         <a:t>100</a:t>
                       </a:r>
                     </a:p>
@@ -9836,7 +10007,7 @@
                     <a:lstStyle/>
                     <a:p>
                       <a:r>
-                        <a:rPr lang="en-US" dirty="0"/>
+                        <a:rPr lang="en-US" sz="1600" dirty="0"/>
                         <a:t>0.0004999</a:t>
                       </a:r>
                     </a:p>
@@ -9849,8 +10020,21 @@
                     <a:lstStyle/>
                     <a:p>
                       <a:r>
-                        <a:rPr lang="en-US" dirty="0"/>
-                        <a:t>0.006678</a:t>
+                        <a:rPr lang="en-US" sz="1600" dirty="0"/>
+                        <a:t>0.002651</a:t>
+                      </a:r>
+                    </a:p>
+                  </a:txBody>
+                  <a:tcPr/>
+                </a:tc>
+                <a:tc>
+                  <a:txBody>
+                    <a:bodyPr/>
+                    <a:lstStyle/>
+                    <a:p>
+                      <a:r>
+                        <a:rPr lang="en-US" sz="1600" dirty="0"/>
+                        <a:t>0.002669</a:t>
                       </a:r>
                     </a:p>
                   </a:txBody>
@@ -9869,7 +10053,7 @@
                     <a:lstStyle/>
                     <a:p>
                       <a:r>
-                        <a:rPr lang="en-US" dirty="0"/>
+                        <a:rPr lang="en-US" sz="1600" dirty="0"/>
                         <a:t>500</a:t>
                       </a:r>
                     </a:p>
@@ -9882,7 +10066,7 @@
                     <a:lstStyle/>
                     <a:p>
                       <a:r>
-                        <a:rPr lang="en-US" dirty="0"/>
+                        <a:rPr lang="en-US" sz="1600" dirty="0"/>
                         <a:t>0.002037</a:t>
                       </a:r>
                     </a:p>
@@ -9895,8 +10079,21 @@
                     <a:lstStyle/>
                     <a:p>
                       <a:r>
-                        <a:rPr lang="en-US" dirty="0"/>
-                        <a:t>0.03033</a:t>
+                        <a:rPr lang="en-US" sz="1600" dirty="0"/>
+                        <a:t>0.003978</a:t>
+                      </a:r>
+                    </a:p>
+                  </a:txBody>
+                  <a:tcPr/>
+                </a:tc>
+                <a:tc>
+                  <a:txBody>
+                    <a:bodyPr/>
+                    <a:lstStyle/>
+                    <a:p>
+                      <a:r>
+                        <a:rPr lang="en-US" sz="1600" dirty="0"/>
+                        <a:t>0.004833</a:t>
                       </a:r>
                     </a:p>
                   </a:txBody>
@@ -9915,7 +10112,7 @@
                     <a:lstStyle/>
                     <a:p>
                       <a:r>
-                        <a:rPr lang="en-US" dirty="0"/>
+                        <a:rPr lang="en-US" sz="1600" dirty="0"/>
                         <a:t>1000</a:t>
                       </a:r>
                     </a:p>
@@ -9928,7 +10125,7 @@
                     <a:lstStyle/>
                     <a:p>
                       <a:r>
-                        <a:rPr lang="en-US" dirty="0"/>
+                        <a:rPr lang="en-US" sz="1600" dirty="0"/>
                         <a:t>0.004136</a:t>
                       </a:r>
                     </a:p>
@@ -9941,8 +10138,21 @@
                     <a:lstStyle/>
                     <a:p>
                       <a:r>
-                        <a:rPr lang="en-US" dirty="0"/>
-                        <a:t>0.04886</a:t>
+                        <a:rPr lang="en-US" sz="1600" dirty="0"/>
+                        <a:t>0.007873</a:t>
+                      </a:r>
+                    </a:p>
+                  </a:txBody>
+                  <a:tcPr/>
+                </a:tc>
+                <a:tc>
+                  <a:txBody>
+                    <a:bodyPr/>
+                    <a:lstStyle/>
+                    <a:p>
+                      <a:r>
+                        <a:rPr lang="en-US" sz="1600" dirty="0"/>
+                        <a:t>0.01104</a:t>
                       </a:r>
                     </a:p>
                   </a:txBody>
@@ -9961,7 +10171,7 @@
                     <a:lstStyle/>
                     <a:p>
                       <a:r>
-                        <a:rPr lang="en-US" dirty="0"/>
+                        <a:rPr lang="en-US" sz="1600" dirty="0"/>
                         <a:t>5000</a:t>
                       </a:r>
                     </a:p>
@@ -9974,7 +10184,7 @@
                     <a:lstStyle/>
                     <a:p>
                       <a:r>
-                        <a:rPr lang="en-US" dirty="0"/>
+                        <a:rPr lang="en-US" sz="1600" dirty="0"/>
                         <a:t>0.02173</a:t>
                       </a:r>
                     </a:p>
@@ -9987,8 +10197,21 @@
                     <a:lstStyle/>
                     <a:p>
                       <a:r>
-                        <a:rPr lang="en-US" dirty="0"/>
-                        <a:t>0.2538</a:t>
+                        <a:rPr lang="en-US" sz="1600" dirty="0"/>
+                        <a:t>0.03072</a:t>
+                      </a:r>
+                    </a:p>
+                  </a:txBody>
+                  <a:tcPr/>
+                </a:tc>
+                <a:tc>
+                  <a:txBody>
+                    <a:bodyPr/>
+                    <a:lstStyle/>
+                    <a:p>
+                      <a:r>
+                        <a:rPr lang="en-US" sz="1600" dirty="0"/>
+                        <a:t>0.04617</a:t>
                       </a:r>
                     </a:p>
                   </a:txBody>
@@ -10007,7 +10230,7 @@
                     <a:lstStyle/>
                     <a:p>
                       <a:r>
-                        <a:rPr lang="en-US" dirty="0"/>
+                        <a:rPr lang="en-US" sz="1600" dirty="0"/>
                         <a:t>10000</a:t>
                       </a:r>
                     </a:p>
@@ -10020,7 +10243,7 @@
                     <a:lstStyle/>
                     <a:p>
                       <a:r>
-                        <a:rPr lang="en-US" dirty="0"/>
+                        <a:rPr lang="en-US" sz="1600" dirty="0"/>
                         <a:t>0.03926</a:t>
                       </a:r>
                     </a:p>
@@ -10033,8 +10256,21 @@
                     <a:lstStyle/>
                     <a:p>
                       <a:r>
-                        <a:rPr lang="en-US" dirty="0"/>
-                        <a:t>0.6054</a:t>
+                        <a:rPr lang="en-US" sz="1600" dirty="0"/>
+                        <a:t>0.05967</a:t>
+                      </a:r>
+                    </a:p>
+                  </a:txBody>
+                  <a:tcPr/>
+                </a:tc>
+                <a:tc>
+                  <a:txBody>
+                    <a:bodyPr/>
+                    <a:lstStyle/>
+                    <a:p>
+                      <a:r>
+                        <a:rPr lang="en-US" sz="1600" dirty="0"/>
+                        <a:t>0.08752</a:t>
                       </a:r>
                     </a:p>
                   </a:txBody>
@@ -10053,7 +10289,7 @@
                     <a:lstStyle/>
                     <a:p>
                       <a:r>
-                        <a:rPr lang="en-US" dirty="0"/>
+                        <a:rPr lang="en-US" sz="1600" dirty="0"/>
                         <a:t>50000</a:t>
                       </a:r>
                     </a:p>
@@ -10066,7 +10302,7 @@
                     <a:lstStyle/>
                     <a:p>
                       <a:r>
-                        <a:rPr lang="en-US" dirty="0"/>
+                        <a:rPr lang="en-US" sz="1600" dirty="0"/>
                         <a:t>0.1936</a:t>
                       </a:r>
                     </a:p>
@@ -10079,8 +10315,21 @@
                     <a:lstStyle/>
                     <a:p>
                       <a:r>
-                        <a:rPr lang="en-US" dirty="0"/>
-                        <a:t>2.7342</a:t>
+                        <a:rPr lang="en-US" sz="1600" dirty="0"/>
+                        <a:t>0.2901</a:t>
+                      </a:r>
+                    </a:p>
+                  </a:txBody>
+                  <a:tcPr/>
+                </a:tc>
+                <a:tc>
+                  <a:txBody>
+                    <a:bodyPr/>
+                    <a:lstStyle/>
+                    <a:p>
+                      <a:r>
+                        <a:rPr lang="en-US" sz="1600" dirty="0"/>
+                        <a:t>0.4310</a:t>
                       </a:r>
                     </a:p>
                   </a:txBody>
@@ -10099,7 +10348,7 @@
                     <a:lstStyle/>
                     <a:p>
                       <a:r>
-                        <a:rPr lang="en-US" dirty="0"/>
+                        <a:rPr lang="en-US" sz="1600" dirty="0"/>
                         <a:t>100000</a:t>
                       </a:r>
                     </a:p>
@@ -10112,7 +10361,7 @@
                     <a:lstStyle/>
                     <a:p>
                       <a:r>
-                        <a:rPr lang="en-US" dirty="0"/>
+                        <a:rPr lang="en-US" sz="1600" dirty="0"/>
                         <a:t>0.3854</a:t>
                       </a:r>
                     </a:p>
@@ -10125,8 +10374,21 @@
                     <a:lstStyle/>
                     <a:p>
                       <a:r>
-                        <a:rPr lang="en-US" dirty="0"/>
-                        <a:t>5.1824</a:t>
+                        <a:rPr lang="en-US" sz="1600" dirty="0"/>
+                        <a:t>0.5905</a:t>
+                      </a:r>
+                    </a:p>
+                  </a:txBody>
+                  <a:tcPr/>
+                </a:tc>
+                <a:tc>
+                  <a:txBody>
+                    <a:bodyPr/>
+                    <a:lstStyle/>
+                    <a:p>
+                      <a:r>
+                        <a:rPr lang="en-US" sz="1600" dirty="0"/>
+                        <a:t>0.8413</a:t>
                       </a:r>
                     </a:p>
                   </a:txBody>
@@ -10144,10 +10406,10 @@
       </p:graphicFrame>
       <p:graphicFrame>
         <p:nvGraphicFramePr>
-          <p:cNvPr id="7" name="Chart 6">
-            <a:extLst>
-              <a:ext uri="{FF2B5EF4-FFF2-40B4-BE49-F238E27FC236}">
-                <a16:creationId xmlns:a16="http://schemas.microsoft.com/office/drawing/2014/main" id="{A1B3342F-662F-5049-4A5B-6592FA978A37}"/>
+          <p:cNvPr id="5" name="Chart 4">
+            <a:extLst>
+              <a:ext uri="{FF2B5EF4-FFF2-40B4-BE49-F238E27FC236}">
+                <a16:creationId xmlns:a16="http://schemas.microsoft.com/office/drawing/2014/main" id="{584631FC-F830-943F-9F94-7089591E6F09}"/>
               </a:ext>
             </a:extLst>
           </p:cNvPr>
@@ -10157,14 +10419,14 @@
           <p:nvPr>
             <p:extLst>
               <p:ext uri="{D42A27DB-BD31-4B8C-83A1-F6EECF244321}">
-                <p14:modId xmlns:p14="http://schemas.microsoft.com/office/powerpoint/2010/main" val="239272003"/>
+                <p14:modId xmlns:p14="http://schemas.microsoft.com/office/powerpoint/2010/main" val="3526472377"/>
               </p:ext>
             </p:extLst>
           </p:nvPr>
         </p:nvGraphicFramePr>
         <p:xfrm>
-          <a:off x="5917946" y="2573612"/>
-          <a:ext cx="5365750" cy="3498850"/>
+          <a:off x="6412229" y="2320290"/>
+          <a:ext cx="5334635" cy="4112260"/>
         </p:xfrm>
         <a:graphic>
           <a:graphicData uri="http://schemas.openxmlformats.org/drawingml/2006/chart">
@@ -10172,6 +10434,72 @@
           </a:graphicData>
         </a:graphic>
       </p:graphicFrame>
+      <p:sp>
+        <p:nvSpPr>
+          <p:cNvPr id="6" name="TextBox 5">
+            <a:extLst>
+              <a:ext uri="{FF2B5EF4-FFF2-40B4-BE49-F238E27FC236}">
+                <a16:creationId xmlns:a16="http://schemas.microsoft.com/office/drawing/2014/main" id="{6E4C9560-1388-099C-C53D-CD11EA980DFF}"/>
+              </a:ext>
+            </a:extLst>
+          </p:cNvPr>
+          <p:cNvSpPr txBox="1"/>
+          <p:nvPr/>
+        </p:nvSpPr>
+        <p:spPr>
+          <a:xfrm>
+            <a:off x="253218" y="6211669"/>
+            <a:ext cx="5233740" cy="646331"/>
+          </a:xfrm>
+          <a:prstGeom prst="rect">
+            <a:avLst/>
+          </a:prstGeom>
+          <a:noFill/>
+        </p:spPr>
+        <p:txBody>
+          <a:bodyPr wrap="none" rtlCol="0">
+            <a:spAutoFit/>
+          </a:bodyPr>
+          <a:lstStyle/>
+          <a:p>
+            <a:r>
+              <a:rPr lang="en-US" dirty="0"/>
+              <a:t>*MNA Factored = </a:t>
+            </a:r>
+            <a:r>
+              <a:rPr lang="en-US" dirty="0" err="1"/>
+              <a:t>LU_factor</a:t>
+            </a:r>
+            <a:r>
+              <a:rPr lang="en-US" dirty="0"/>
+              <a:t> taken outside loop</a:t>
+            </a:r>
+            <a:br>
+              <a:rPr lang="en-US" dirty="0"/>
+            </a:br>
+            <a:r>
+              <a:rPr lang="en-US" dirty="0"/>
+              <a:t>*MNA </a:t>
+            </a:r>
+            <a:r>
+              <a:rPr lang="en-US" dirty="0" err="1"/>
+              <a:t>Nonfactored</a:t>
+            </a:r>
+            <a:r>
+              <a:rPr lang="en-US" dirty="0"/>
+              <a:t> = </a:t>
+            </a:r>
+            <a:r>
+              <a:rPr lang="en-US" dirty="0" err="1"/>
+              <a:t>LU_factor</a:t>
+            </a:r>
+            <a:r>
+              <a:rPr lang="en-US" dirty="0"/>
+              <a:t> kept inside loop</a:t>
+            </a:r>
+          </a:p>
+        </p:txBody>
+      </p:sp>
     </p:spTree>
     <p:extLst>
       <p:ext uri="{BB962C8B-B14F-4D97-AF65-F5344CB8AC3E}">

</xml_diff>

<commit_message>
finished (potentially) HW4 pptx
</commit_message>
<xml_diff>
--- a/HW3.pptx
+++ b/HW3.pptx
@@ -5,16 +5,18 @@
     <p:sldMasterId id="2147483673" r:id="rId1"/>
   </p:sldMasterIdLst>
   <p:notesMasterIdLst>
-    <p:notesMasterId r:id="rId9"/>
+    <p:notesMasterId r:id="rId11"/>
   </p:notesMasterIdLst>
   <p:sldIdLst>
     <p:sldId id="256" r:id="rId2"/>
     <p:sldId id="265" r:id="rId3"/>
     <p:sldId id="266" r:id="rId4"/>
-    <p:sldId id="270" r:id="rId5"/>
-    <p:sldId id="267" r:id="rId6"/>
-    <p:sldId id="268" r:id="rId7"/>
-    <p:sldId id="269" r:id="rId8"/>
+    <p:sldId id="271" r:id="rId5"/>
+    <p:sldId id="270" r:id="rId6"/>
+    <p:sldId id="267" r:id="rId7"/>
+    <p:sldId id="272" r:id="rId8"/>
+    <p:sldId id="268" r:id="rId9"/>
+    <p:sldId id="269" r:id="rId10"/>
   </p:sldIdLst>
   <p:sldSz cx="12192000" cy="6858000"/>
   <p:notesSz cx="6858000" cy="9144000"/>
@@ -228,7 +230,7 @@
               </a:solidFill>
               <a:ln w="9525">
                 <a:solidFill>
-                  <a:schemeClr val="accent1"/>
+                  <a:srgbClr val="FFC000"/>
                 </a:solidFill>
               </a:ln>
               <a:effectLst/>
@@ -333,7 +335,7 @@
               </a:solidFill>
               <a:ln w="9525">
                 <a:solidFill>
-                  <a:schemeClr val="accent2"/>
+                  <a:srgbClr val="00B050"/>
                 </a:solidFill>
               </a:ln>
               <a:effectLst/>
@@ -438,7 +440,7 @@
               </a:solidFill>
               <a:ln w="9525">
                 <a:solidFill>
-                  <a:schemeClr val="accent3"/>
+                  <a:schemeClr val="accent5"/>
                 </a:solidFill>
               </a:ln>
               <a:effectLst/>
@@ -525,7 +527,9 @@
       <c:valAx>
         <c:axId val="2015658256"/>
         <c:scaling>
+          <c:logBase val="10"/>
           <c:orientation val="minMax"/>
+          <c:min val="100"/>
         </c:scaling>
         <c:delete val="0"/>
         <c:axPos val="b"/>
@@ -1465,7 +1469,7 @@
           <a:p>
             <a:fld id="{2747D2AE-6F0F-1942-B8BE-938C97736A66}" type="datetimeFigureOut">
               <a:rPr lang="en-US" smtClean="0"/>
-              <a:t>5/18/23</a:t>
+              <a:t>5/29/23</a:t>
             </a:fld>
             <a:endParaRPr lang="en-US"/>
           </a:p>
@@ -1888,7 +1892,7 @@
           <a:p>
             <a:fld id="{02AC24A9-CCB6-4F8D-B8DB-C2F3692CFA5A}" type="datetimeFigureOut">
               <a:rPr lang="en-US" smtClean="0"/>
-              <a:t>5/18/23</a:t>
+              <a:t>5/29/23</a:t>
             </a:fld>
             <a:endParaRPr lang="en-US" dirty="0"/>
           </a:p>
@@ -2258,7 +2262,7 @@
           <a:p>
             <a:fld id="{02AC24A9-CCB6-4F8D-B8DB-C2F3692CFA5A}" type="datetimeFigureOut">
               <a:rPr lang="en-US" smtClean="0"/>
-              <a:t>5/18/23</a:t>
+              <a:t>5/29/23</a:t>
             </a:fld>
             <a:endParaRPr lang="en-US"/>
           </a:p>
@@ -2467,7 +2471,7 @@
           <a:p>
             <a:fld id="{02AC24A9-CCB6-4F8D-B8DB-C2F3692CFA5A}" type="datetimeFigureOut">
               <a:rPr lang="en-US" smtClean="0"/>
-              <a:t>5/18/23</a:t>
+              <a:t>5/29/23</a:t>
             </a:fld>
             <a:endParaRPr lang="en-US"/>
           </a:p>
@@ -2937,7 +2941,7 @@
           <a:p>
             <a:fld id="{02AC24A9-CCB6-4F8D-B8DB-C2F3692CFA5A}" type="datetimeFigureOut">
               <a:rPr lang="en-US" smtClean="0"/>
-              <a:t>5/18/23</a:t>
+              <a:t>5/29/23</a:t>
             </a:fld>
             <a:endParaRPr lang="en-US"/>
           </a:p>
@@ -3391,7 +3395,7 @@
           <a:p>
             <a:fld id="{02AC24A9-CCB6-4F8D-B8DB-C2F3692CFA5A}" type="datetimeFigureOut">
               <a:rPr lang="en-US" smtClean="0"/>
-              <a:t>5/18/23</a:t>
+              <a:t>5/29/23</a:t>
             </a:fld>
             <a:endParaRPr lang="en-US"/>
           </a:p>
@@ -3923,7 +3927,7 @@
           <a:p>
             <a:fld id="{02AC24A9-CCB6-4F8D-B8DB-C2F3692CFA5A}" type="datetimeFigureOut">
               <a:rPr lang="en-US" smtClean="0"/>
-              <a:t>5/18/23</a:t>
+              <a:t>5/29/23</a:t>
             </a:fld>
             <a:endParaRPr lang="en-US"/>
           </a:p>
@@ -4622,7 +4626,7 @@
           <a:p>
             <a:fld id="{02AC24A9-CCB6-4F8D-B8DB-C2F3692CFA5A}" type="datetimeFigureOut">
               <a:rPr lang="en-US" smtClean="0"/>
-              <a:t>5/18/23</a:t>
+              <a:t>5/29/23</a:t>
             </a:fld>
             <a:endParaRPr lang="en-US"/>
           </a:p>
@@ -4951,7 +4955,7 @@
           <a:p>
             <a:fld id="{02AC24A9-CCB6-4F8D-B8DB-C2F3692CFA5A}" type="datetimeFigureOut">
               <a:rPr lang="en-US" smtClean="0"/>
-              <a:t>5/18/23</a:t>
+              <a:t>5/29/23</a:t>
             </a:fld>
             <a:endParaRPr lang="en-US"/>
           </a:p>
@@ -5064,7 +5068,7 @@
           <a:p>
             <a:fld id="{02AC24A9-CCB6-4F8D-B8DB-C2F3692CFA5A}" type="datetimeFigureOut">
               <a:rPr lang="en-US" smtClean="0"/>
-              <a:t>5/18/23</a:t>
+              <a:t>5/29/23</a:t>
             </a:fld>
             <a:endParaRPr lang="en-US"/>
           </a:p>
@@ -5559,7 +5563,7 @@
           <a:p>
             <a:fld id="{02AC24A9-CCB6-4F8D-B8DB-C2F3692CFA5A}" type="datetimeFigureOut">
               <a:rPr lang="en-US" smtClean="0"/>
-              <a:t>5/18/23</a:t>
+              <a:t>5/29/23</a:t>
             </a:fld>
             <a:endParaRPr lang="en-US" dirty="0"/>
           </a:p>
@@ -6036,7 +6040,7 @@
           <a:p>
             <a:fld id="{02AC24A9-CCB6-4F8D-B8DB-C2F3692CFA5A}" type="datetimeFigureOut">
               <a:rPr lang="en-US" smtClean="0"/>
-              <a:t>5/18/23</a:t>
+              <a:t>5/29/23</a:t>
             </a:fld>
             <a:endParaRPr lang="en-US"/>
           </a:p>
@@ -6279,7 +6283,7 @@
           <a:p>
             <a:fld id="{02AC24A9-CCB6-4F8D-B8DB-C2F3692CFA5A}" type="datetimeFigureOut">
               <a:rPr lang="en-US" smtClean="0"/>
-              <a:t>5/18/23</a:t>
+              <a:t>5/29/23</a:t>
             </a:fld>
             <a:endParaRPr lang="en-US"/>
           </a:p>
@@ -8924,6 +8928,186 @@
           </a:p>
         </p:txBody>
       </p:sp>
+      <p:sp>
+        <p:nvSpPr>
+          <p:cNvPr id="3" name="Frame 2">
+            <a:extLst>
+              <a:ext uri="{FF2B5EF4-FFF2-40B4-BE49-F238E27FC236}">
+                <a16:creationId xmlns:a16="http://schemas.microsoft.com/office/drawing/2014/main" id="{C264539C-4E82-A87B-9097-2BCBE4BCA757}"/>
+              </a:ext>
+            </a:extLst>
+          </p:cNvPr>
+          <p:cNvSpPr/>
+          <p:nvPr/>
+        </p:nvSpPr>
+        <p:spPr>
+          <a:xfrm rot="18730279">
+            <a:off x="1158529" y="2313388"/>
+            <a:ext cx="916458" cy="1720701"/>
+          </a:xfrm>
+          <a:prstGeom prst="frame">
+            <a:avLst>
+              <a:gd name="adj1" fmla="val 5000"/>
+            </a:avLst>
+          </a:prstGeom>
+          <a:solidFill>
+            <a:srgbClr val="FFC000"/>
+          </a:solidFill>
+          <a:ln>
+            <a:solidFill>
+              <a:srgbClr val="FFC000"/>
+            </a:solidFill>
+          </a:ln>
+        </p:spPr>
+        <p:style>
+          <a:lnRef idx="2">
+            <a:schemeClr val="accent1">
+              <a:shade val="50000"/>
+            </a:schemeClr>
+          </a:lnRef>
+          <a:fillRef idx="1">
+            <a:schemeClr val="accent1"/>
+          </a:fillRef>
+          <a:effectRef idx="0">
+            <a:schemeClr val="accent1"/>
+          </a:effectRef>
+          <a:fontRef idx="minor">
+            <a:schemeClr val="lt1"/>
+          </a:fontRef>
+        </p:style>
+        <p:txBody>
+          <a:bodyPr rtlCol="0" anchor="ctr"/>
+          <a:lstStyle/>
+          <a:p>
+            <a:pPr algn="ctr"/>
+            <a:endParaRPr lang="en-US">
+              <a:solidFill>
+                <a:schemeClr val="tx1"/>
+              </a:solidFill>
+            </a:endParaRPr>
+          </a:p>
+        </p:txBody>
+      </p:sp>
+      <p:sp>
+        <p:nvSpPr>
+          <p:cNvPr id="4" name="Frame 3">
+            <a:extLst>
+              <a:ext uri="{FF2B5EF4-FFF2-40B4-BE49-F238E27FC236}">
+                <a16:creationId xmlns:a16="http://schemas.microsoft.com/office/drawing/2014/main" id="{10E804A7-9978-B033-A96D-7674B12B3B06}"/>
+              </a:ext>
+            </a:extLst>
+          </p:cNvPr>
+          <p:cNvSpPr/>
+          <p:nvPr/>
+        </p:nvSpPr>
+        <p:spPr>
+          <a:xfrm rot="18730279">
+            <a:off x="2687407" y="2308776"/>
+            <a:ext cx="916458" cy="1720701"/>
+          </a:xfrm>
+          <a:prstGeom prst="frame">
+            <a:avLst>
+              <a:gd name="adj1" fmla="val 5000"/>
+            </a:avLst>
+          </a:prstGeom>
+          <a:solidFill>
+            <a:srgbClr val="FFC000"/>
+          </a:solidFill>
+          <a:ln>
+            <a:solidFill>
+              <a:srgbClr val="FFC000"/>
+            </a:solidFill>
+          </a:ln>
+        </p:spPr>
+        <p:style>
+          <a:lnRef idx="2">
+            <a:schemeClr val="accent1">
+              <a:shade val="50000"/>
+            </a:schemeClr>
+          </a:lnRef>
+          <a:fillRef idx="1">
+            <a:schemeClr val="accent1"/>
+          </a:fillRef>
+          <a:effectRef idx="0">
+            <a:schemeClr val="accent1"/>
+          </a:effectRef>
+          <a:fontRef idx="minor">
+            <a:schemeClr val="lt1"/>
+          </a:fontRef>
+        </p:style>
+        <p:txBody>
+          <a:bodyPr rtlCol="0" anchor="ctr"/>
+          <a:lstStyle/>
+          <a:p>
+            <a:pPr algn="ctr"/>
+            <a:endParaRPr lang="en-US">
+              <a:solidFill>
+                <a:schemeClr val="tx1"/>
+              </a:solidFill>
+            </a:endParaRPr>
+          </a:p>
+        </p:txBody>
+      </p:sp>
+      <p:sp>
+        <p:nvSpPr>
+          <p:cNvPr id="5" name="Frame 4">
+            <a:extLst>
+              <a:ext uri="{FF2B5EF4-FFF2-40B4-BE49-F238E27FC236}">
+                <a16:creationId xmlns:a16="http://schemas.microsoft.com/office/drawing/2014/main" id="{AB6BAC11-A22A-1583-EEA8-3D908274B5A6}"/>
+              </a:ext>
+            </a:extLst>
+          </p:cNvPr>
+          <p:cNvSpPr/>
+          <p:nvPr/>
+        </p:nvSpPr>
+        <p:spPr>
+          <a:xfrm rot="18730279">
+            <a:off x="4226535" y="2256758"/>
+            <a:ext cx="916458" cy="1720701"/>
+          </a:xfrm>
+          <a:prstGeom prst="frame">
+            <a:avLst>
+              <a:gd name="adj1" fmla="val 5000"/>
+            </a:avLst>
+          </a:prstGeom>
+          <a:solidFill>
+            <a:srgbClr val="FFC000"/>
+          </a:solidFill>
+          <a:ln>
+            <a:solidFill>
+              <a:srgbClr val="FFC000"/>
+            </a:solidFill>
+          </a:ln>
+        </p:spPr>
+        <p:style>
+          <a:lnRef idx="2">
+            <a:schemeClr val="accent1">
+              <a:shade val="50000"/>
+            </a:schemeClr>
+          </a:lnRef>
+          <a:fillRef idx="1">
+            <a:schemeClr val="accent1"/>
+          </a:fillRef>
+          <a:effectRef idx="0">
+            <a:schemeClr val="accent1"/>
+          </a:effectRef>
+          <a:fontRef idx="minor">
+            <a:schemeClr val="lt1"/>
+          </a:fontRef>
+        </p:style>
+        <p:txBody>
+          <a:bodyPr rtlCol="0" anchor="ctr"/>
+          <a:lstStyle/>
+          <a:p>
+            <a:pPr algn="ctr"/>
+            <a:endParaRPr lang="en-US">
+              <a:solidFill>
+                <a:schemeClr val="tx1"/>
+              </a:solidFill>
+            </a:endParaRPr>
+          </a:p>
+        </p:txBody>
+      </p:sp>
     </p:spTree>
     <p:extLst>
       <p:ext uri="{BB962C8B-B14F-4D97-AF65-F5344CB8AC3E}">
@@ -8977,17 +9161,17 @@
           <a:p>
             <a:r>
               <a:rPr lang="en-US" dirty="0"/>
-              <a:t>LIM - Implementation</a:t>
+              <a:t>LIM - Concept</a:t>
             </a:r>
           </a:p>
         </p:txBody>
       </p:sp>
       <p:pic>
         <p:nvPicPr>
-          <p:cNvPr id="12" name="Picture 11">
-            <a:extLst>
-              <a:ext uri="{FF2B5EF4-FFF2-40B4-BE49-F238E27FC236}">
-                <a16:creationId xmlns:a16="http://schemas.microsoft.com/office/drawing/2014/main" id="{525DE596-D5AA-36BC-0D14-F0FE888B0864}"/>
+          <p:cNvPr id="24" name="Picture 23">
+            <a:extLst>
+              <a:ext uri="{FF2B5EF4-FFF2-40B4-BE49-F238E27FC236}">
+                <a16:creationId xmlns:a16="http://schemas.microsoft.com/office/drawing/2014/main" id="{B6951466-36EF-D772-23EC-1149F6225753}"/>
               </a:ext>
             </a:extLst>
           </p:cNvPr>
@@ -9004,8 +9188,8 @@
         </p:blipFill>
         <p:spPr>
           <a:xfrm>
-            <a:off x="3194539" y="4171915"/>
-            <a:ext cx="7772400" cy="2228239"/>
+            <a:off x="855469" y="2602781"/>
+            <a:ext cx="4659884" cy="1483555"/>
           </a:xfrm>
           <a:prstGeom prst="rect">
             <a:avLst/>
@@ -9014,10 +9198,10 @@
       </p:pic>
       <p:pic>
         <p:nvPicPr>
-          <p:cNvPr id="15" name="Picture 14">
-            <a:extLst>
-              <a:ext uri="{FF2B5EF4-FFF2-40B4-BE49-F238E27FC236}">
-                <a16:creationId xmlns:a16="http://schemas.microsoft.com/office/drawing/2014/main" id="{0C3C5EE6-1A92-4514-D141-7E0F91352F62}"/>
+          <p:cNvPr id="25" name="Picture 24">
+            <a:extLst>
+              <a:ext uri="{FF2B5EF4-FFF2-40B4-BE49-F238E27FC236}">
+                <a16:creationId xmlns:a16="http://schemas.microsoft.com/office/drawing/2014/main" id="{412AD11C-14C9-DA1D-1F88-DAE7AEC9B41E}"/>
               </a:ext>
             </a:extLst>
           </p:cNvPr>
@@ -9034,8 +9218,8 @@
         </p:blipFill>
         <p:spPr>
           <a:xfrm>
-            <a:off x="2232617" y="5571859"/>
-            <a:ext cx="765950" cy="828295"/>
+            <a:off x="534921" y="4582954"/>
+            <a:ext cx="4606703" cy="809772"/>
           </a:xfrm>
           <a:prstGeom prst="rect">
             <a:avLst/>
@@ -9044,10 +9228,10 @@
       </p:pic>
       <p:pic>
         <p:nvPicPr>
-          <p:cNvPr id="17" name="Picture 16">
-            <a:extLst>
-              <a:ext uri="{FF2B5EF4-FFF2-40B4-BE49-F238E27FC236}">
-                <a16:creationId xmlns:a16="http://schemas.microsoft.com/office/drawing/2014/main" id="{988F83AD-2F78-6A2E-EECB-8B83E34DA8B6}"/>
+          <p:cNvPr id="26" name="Picture 25">
+            <a:extLst>
+              <a:ext uri="{FF2B5EF4-FFF2-40B4-BE49-F238E27FC236}">
+                <a16:creationId xmlns:a16="http://schemas.microsoft.com/office/drawing/2014/main" id="{CE7B3BF3-2F7D-76ED-6FDC-BC9EFB1EB3E1}"/>
               </a:ext>
             </a:extLst>
           </p:cNvPr>
@@ -9064,8 +9248,8 @@
         </p:blipFill>
         <p:spPr>
           <a:xfrm>
-            <a:off x="2262825" y="4514635"/>
-            <a:ext cx="705533" cy="1029916"/>
+            <a:off x="2044833" y="5476594"/>
+            <a:ext cx="3096791" cy="1112107"/>
           </a:xfrm>
           <a:prstGeom prst="rect">
             <a:avLst/>
@@ -9074,10 +9258,10 @@
       </p:pic>
       <p:pic>
         <p:nvPicPr>
-          <p:cNvPr id="18" name="Picture 17">
-            <a:extLst>
-              <a:ext uri="{FF2B5EF4-FFF2-40B4-BE49-F238E27FC236}">
-                <a16:creationId xmlns:a16="http://schemas.microsoft.com/office/drawing/2014/main" id="{1C4CE6D2-6C7D-BAB9-9082-E325BF314174}"/>
+          <p:cNvPr id="27" name="Picture 26">
+            <a:extLst>
+              <a:ext uri="{FF2B5EF4-FFF2-40B4-BE49-F238E27FC236}">
+                <a16:creationId xmlns:a16="http://schemas.microsoft.com/office/drawing/2014/main" id="{833072F7-FB12-D82E-7959-902A1A866CE2}"/>
               </a:ext>
             </a:extLst>
           </p:cNvPr>
@@ -9094,20 +9278,226 @@
         </p:blipFill>
         <p:spPr>
           <a:xfrm>
-            <a:off x="1468190" y="3949308"/>
-            <a:ext cx="679072" cy="2908692"/>
+            <a:off x="828220" y="5722779"/>
+            <a:ext cx="1216613" cy="559642"/>
           </a:xfrm>
           <a:prstGeom prst="rect">
             <a:avLst/>
           </a:prstGeom>
         </p:spPr>
       </p:pic>
-      <p:sp>
-        <p:nvSpPr>
-          <p:cNvPr id="19" name="TextBox 18">
-            <a:extLst>
-              <a:ext uri="{FF2B5EF4-FFF2-40B4-BE49-F238E27FC236}">
-                <a16:creationId xmlns:a16="http://schemas.microsoft.com/office/drawing/2014/main" id="{9EB62826-E8C0-8C6F-2CFB-AC3C73276191}"/>
+      <p:graphicFrame>
+        <p:nvGraphicFramePr>
+          <p:cNvPr id="28" name="Table 28">
+            <a:extLst>
+              <a:ext uri="{FF2B5EF4-FFF2-40B4-BE49-F238E27FC236}">
+                <a16:creationId xmlns:a16="http://schemas.microsoft.com/office/drawing/2014/main" id="{D730CC76-E501-92B8-40E2-D1EFE3F77521}"/>
+              </a:ext>
+            </a:extLst>
+          </p:cNvPr>
+          <p:cNvGraphicFramePr>
+            <a:graphicFrameLocks noGrp="1"/>
+          </p:cNvGraphicFramePr>
+          <p:nvPr/>
+        </p:nvGraphicFramePr>
+        <p:xfrm>
+          <a:off x="6471137" y="2602652"/>
+          <a:ext cx="4243752" cy="741680"/>
+        </p:xfrm>
+        <a:graphic>
+          <a:graphicData uri="http://schemas.openxmlformats.org/drawingml/2006/table">
+            <a:tbl>
+              <a:tblPr firstRow="1" bandRow="1">
+                <a:tableStyleId>{7DF18680-E054-41AD-8BC1-D1AEF772440D}</a:tableStyleId>
+              </a:tblPr>
+              <a:tblGrid>
+                <a:gridCol w="707292">
+                  <a:extLst>
+                    <a:ext uri="{9D8B030D-6E8A-4147-A177-3AD203B41FA5}">
+                      <a16:colId xmlns:a16="http://schemas.microsoft.com/office/drawing/2014/main" val="1477033119"/>
+                    </a:ext>
+                  </a:extLst>
+                </a:gridCol>
+                <a:gridCol w="707292">
+                  <a:extLst>
+                    <a:ext uri="{9D8B030D-6E8A-4147-A177-3AD203B41FA5}">
+                      <a16:colId xmlns:a16="http://schemas.microsoft.com/office/drawing/2014/main" val="351217100"/>
+                    </a:ext>
+                  </a:extLst>
+                </a:gridCol>
+                <a:gridCol w="707292">
+                  <a:extLst>
+                    <a:ext uri="{9D8B030D-6E8A-4147-A177-3AD203B41FA5}">
+                      <a16:colId xmlns:a16="http://schemas.microsoft.com/office/drawing/2014/main" val="3783675637"/>
+                    </a:ext>
+                  </a:extLst>
+                </a:gridCol>
+                <a:gridCol w="707292">
+                  <a:extLst>
+                    <a:ext uri="{9D8B030D-6E8A-4147-A177-3AD203B41FA5}">
+                      <a16:colId xmlns:a16="http://schemas.microsoft.com/office/drawing/2014/main" val="295156759"/>
+                    </a:ext>
+                  </a:extLst>
+                </a:gridCol>
+                <a:gridCol w="707292">
+                  <a:extLst>
+                    <a:ext uri="{9D8B030D-6E8A-4147-A177-3AD203B41FA5}">
+                      <a16:colId xmlns:a16="http://schemas.microsoft.com/office/drawing/2014/main" val="3564346508"/>
+                    </a:ext>
+                  </a:extLst>
+                </a:gridCol>
+                <a:gridCol w="707292">
+                  <a:extLst>
+                    <a:ext uri="{9D8B030D-6E8A-4147-A177-3AD203B41FA5}">
+                      <a16:colId xmlns:a16="http://schemas.microsoft.com/office/drawing/2014/main" val="3625321702"/>
+                    </a:ext>
+                  </a:extLst>
+                </a:gridCol>
+              </a:tblGrid>
+              <a:tr h="370840">
+                <a:tc>
+                  <a:txBody>
+                    <a:bodyPr/>
+                    <a:lstStyle/>
+                    <a:p>
+                      <a:endParaRPr lang="en-US"/>
+                    </a:p>
+                  </a:txBody>
+                  <a:tcPr/>
+                </a:tc>
+                <a:tc>
+                  <a:txBody>
+                    <a:bodyPr/>
+                    <a:lstStyle/>
+                    <a:p>
+                      <a:endParaRPr lang="en-US"/>
+                    </a:p>
+                  </a:txBody>
+                  <a:tcPr/>
+                </a:tc>
+                <a:tc>
+                  <a:txBody>
+                    <a:bodyPr/>
+                    <a:lstStyle/>
+                    <a:p>
+                      <a:endParaRPr lang="en-US"/>
+                    </a:p>
+                  </a:txBody>
+                  <a:tcPr/>
+                </a:tc>
+                <a:tc>
+                  <a:txBody>
+                    <a:bodyPr/>
+                    <a:lstStyle/>
+                    <a:p>
+                      <a:endParaRPr lang="en-US" dirty="0"/>
+                    </a:p>
+                  </a:txBody>
+                  <a:tcPr/>
+                </a:tc>
+                <a:tc>
+                  <a:txBody>
+                    <a:bodyPr/>
+                    <a:lstStyle/>
+                    <a:p>
+                      <a:endParaRPr lang="en-US"/>
+                    </a:p>
+                  </a:txBody>
+                  <a:tcPr/>
+                </a:tc>
+                <a:tc>
+                  <a:txBody>
+                    <a:bodyPr/>
+                    <a:lstStyle/>
+                    <a:p>
+                      <a:endParaRPr lang="en-US"/>
+                    </a:p>
+                  </a:txBody>
+                  <a:tcPr/>
+                </a:tc>
+                <a:extLst>
+                  <a:ext uri="{0D108BD9-81ED-4DB2-BD59-A6C34878D82A}">
+                    <a16:rowId xmlns:a16="http://schemas.microsoft.com/office/drawing/2014/main" val="2608423520"/>
+                  </a:ext>
+                </a:extLst>
+              </a:tr>
+              <a:tr h="370840">
+                <a:tc>
+                  <a:txBody>
+                    <a:bodyPr/>
+                    <a:lstStyle/>
+                    <a:p>
+                      <a:endParaRPr lang="en-US"/>
+                    </a:p>
+                  </a:txBody>
+                  <a:tcPr/>
+                </a:tc>
+                <a:tc>
+                  <a:txBody>
+                    <a:bodyPr/>
+                    <a:lstStyle/>
+                    <a:p>
+                      <a:endParaRPr lang="en-US"/>
+                    </a:p>
+                  </a:txBody>
+                  <a:tcPr/>
+                </a:tc>
+                <a:tc>
+                  <a:txBody>
+                    <a:bodyPr/>
+                    <a:lstStyle/>
+                    <a:p>
+                      <a:endParaRPr lang="en-US"/>
+                    </a:p>
+                  </a:txBody>
+                  <a:tcPr/>
+                </a:tc>
+                <a:tc>
+                  <a:txBody>
+                    <a:bodyPr/>
+                    <a:lstStyle/>
+                    <a:p>
+                      <a:endParaRPr lang="en-US"/>
+                    </a:p>
+                  </a:txBody>
+                  <a:tcPr/>
+                </a:tc>
+                <a:tc>
+                  <a:txBody>
+                    <a:bodyPr/>
+                    <a:lstStyle/>
+                    <a:p>
+                      <a:endParaRPr lang="en-US"/>
+                    </a:p>
+                  </a:txBody>
+                  <a:tcPr/>
+                </a:tc>
+                <a:tc>
+                  <a:txBody>
+                    <a:bodyPr/>
+                    <a:lstStyle/>
+                    <a:p>
+                      <a:endParaRPr lang="en-US" dirty="0"/>
+                    </a:p>
+                  </a:txBody>
+                  <a:tcPr/>
+                </a:tc>
+                <a:extLst>
+                  <a:ext uri="{0D108BD9-81ED-4DB2-BD59-A6C34878D82A}">
+                    <a16:rowId xmlns:a16="http://schemas.microsoft.com/office/drawing/2014/main" val="2917907720"/>
+                  </a:ext>
+                </a:extLst>
+              </a:tr>
+            </a:tbl>
+          </a:graphicData>
+        </a:graphic>
+      </p:graphicFrame>
+      <p:sp>
+        <p:nvSpPr>
+          <p:cNvPr id="29" name="TextBox 28">
+            <a:extLst>
+              <a:ext uri="{FF2B5EF4-FFF2-40B4-BE49-F238E27FC236}">
+                <a16:creationId xmlns:a16="http://schemas.microsoft.com/office/drawing/2014/main" id="{12A9F548-4AD8-D65F-C44E-F2B5E24AFDAB}"/>
               </a:ext>
             </a:extLst>
           </p:cNvPr>
@@ -9115,9 +9505,9 @@
           <p:nvPr/>
         </p:nvSpPr>
         <p:spPr>
-          <a:xfrm rot="16200000">
-            <a:off x="267286" y="4951829"/>
-            <a:ext cx="1244251" cy="369332"/>
+          <a:xfrm>
+            <a:off x="5641826" y="2171311"/>
+            <a:ext cx="1953805" cy="369332"/>
           </a:xfrm>
           <a:prstGeom prst="rect">
             <a:avLst/>
@@ -9132,17 +9522,17 @@
           <a:p>
             <a:r>
               <a:rPr lang="en-US" dirty="0"/>
-              <a:t>Algorithm</a:t>
-            </a:r>
-          </a:p>
-        </p:txBody>
-      </p:sp>
-      <p:sp>
-        <p:nvSpPr>
-          <p:cNvPr id="20" name="TextBox 19">
-            <a:extLst>
-              <a:ext uri="{FF2B5EF4-FFF2-40B4-BE49-F238E27FC236}">
-                <a16:creationId xmlns:a16="http://schemas.microsoft.com/office/drawing/2014/main" id="{15AC9F08-315E-D092-2DBB-EB3EBD9D7226}"/>
+              <a:t>Branch Currents:</a:t>
+            </a:r>
+          </a:p>
+        </p:txBody>
+      </p:sp>
+      <p:sp>
+        <p:nvSpPr>
+          <p:cNvPr id="30" name="TextBox 29">
+            <a:extLst>
+              <a:ext uri="{FF2B5EF4-FFF2-40B4-BE49-F238E27FC236}">
+                <a16:creationId xmlns:a16="http://schemas.microsoft.com/office/drawing/2014/main" id="{AE27974C-B3AD-900B-9272-82CBE7E3A1D1}"/>
               </a:ext>
             </a:extLst>
           </p:cNvPr>
@@ -9150,9 +9540,9 @@
           <p:nvPr/>
         </p:nvSpPr>
         <p:spPr>
-          <a:xfrm rot="16200000">
-            <a:off x="412871" y="2543013"/>
-            <a:ext cx="953081" cy="369332"/>
+          <a:xfrm>
+            <a:off x="5641826" y="4679493"/>
+            <a:ext cx="1813895" cy="369332"/>
           </a:xfrm>
           <a:prstGeom prst="rect">
             <a:avLst/>
@@ -9166,106 +9556,1036 @@
           <a:lstStyle/>
           <a:p>
             <a:r>
-              <a:rPr lang="en-US" dirty="0"/>
-              <a:t>Parsing</a:t>
-            </a:r>
-          </a:p>
-        </p:txBody>
-      </p:sp>
-      <p:pic>
-        <p:nvPicPr>
-          <p:cNvPr id="21" name="Picture 20">
-            <a:extLst>
-              <a:ext uri="{FF2B5EF4-FFF2-40B4-BE49-F238E27FC236}">
-                <a16:creationId xmlns:a16="http://schemas.microsoft.com/office/drawing/2014/main" id="{2A37952E-F4AC-ED3F-A04C-B9FB42F1A714}"/>
-              </a:ext>
-            </a:extLst>
-          </p:cNvPr>
-          <p:cNvPicPr>
-            <a:picLocks noChangeAspect="1"/>
-          </p:cNvPicPr>
+              <a:rPr lang="en-US"/>
+              <a:t>Node Voltages:</a:t>
+            </a:r>
+            <a:endParaRPr lang="en-US" dirty="0"/>
+          </a:p>
+        </p:txBody>
+      </p:sp>
+      <p:sp>
+        <p:nvSpPr>
+          <p:cNvPr id="31" name="TextBox 30">
+            <a:extLst>
+              <a:ext uri="{FF2B5EF4-FFF2-40B4-BE49-F238E27FC236}">
+                <a16:creationId xmlns:a16="http://schemas.microsoft.com/office/drawing/2014/main" id="{294C8484-54F1-3635-6159-A5C96ACB7F62}"/>
+              </a:ext>
+            </a:extLst>
+          </p:cNvPr>
+          <p:cNvSpPr txBox="1"/>
           <p:nvPr/>
-        </p:nvPicPr>
-        <p:blipFill>
-          <a:blip r:embed="rId6"/>
-          <a:stretch>
-            <a:fillRect/>
-          </a:stretch>
-        </p:blipFill>
-        <p:spPr>
-          <a:xfrm>
-            <a:off x="3194539" y="2026060"/>
-            <a:ext cx="2237869" cy="1923248"/>
+        </p:nvSpPr>
+        <p:spPr>
+          <a:xfrm>
+            <a:off x="8385264" y="3307826"/>
+            <a:ext cx="415498" cy="369332"/>
           </a:xfrm>
           <a:prstGeom prst="rect">
             <a:avLst/>
           </a:prstGeom>
-        </p:spPr>
-      </p:pic>
-      <p:pic>
-        <p:nvPicPr>
-          <p:cNvPr id="22" name="Picture 21">
-            <a:extLst>
-              <a:ext uri="{FF2B5EF4-FFF2-40B4-BE49-F238E27FC236}">
-                <a16:creationId xmlns:a16="http://schemas.microsoft.com/office/drawing/2014/main" id="{726489B7-1097-5B1A-09DE-345880EEBA92}"/>
-              </a:ext>
-            </a:extLst>
-          </p:cNvPr>
-          <p:cNvPicPr>
-            <a:picLocks noChangeAspect="1"/>
-          </p:cNvPicPr>
+          <a:noFill/>
+        </p:spPr>
+        <p:txBody>
+          <a:bodyPr wrap="none" rtlCol="0">
+            <a:spAutoFit/>
+          </a:bodyPr>
+          <a:lstStyle/>
+          <a:p>
+            <a:r>
+              <a:rPr lang="en-US" dirty="0"/>
+              <a:t>…</a:t>
+            </a:r>
+          </a:p>
+        </p:txBody>
+      </p:sp>
+      <p:graphicFrame>
+        <p:nvGraphicFramePr>
+          <p:cNvPr id="33" name="Table 28">
+            <a:extLst>
+              <a:ext uri="{FF2B5EF4-FFF2-40B4-BE49-F238E27FC236}">
+                <a16:creationId xmlns:a16="http://schemas.microsoft.com/office/drawing/2014/main" id="{0C558E78-EEFF-6E40-12FF-99B7B8C39854}"/>
+              </a:ext>
+            </a:extLst>
+          </p:cNvPr>
+          <p:cNvGraphicFramePr>
+            <a:graphicFrameLocks noGrp="1"/>
+          </p:cNvGraphicFramePr>
           <p:nvPr/>
-        </p:nvPicPr>
-        <p:blipFill>
-          <a:blip r:embed="rId7"/>
-          <a:stretch>
-            <a:fillRect/>
-          </a:stretch>
-        </p:blipFill>
-        <p:spPr>
-          <a:xfrm>
-            <a:off x="9228746" y="2593984"/>
-            <a:ext cx="2857500" cy="787400"/>
+        </p:nvGraphicFramePr>
+        <p:xfrm>
+          <a:off x="6471137" y="3802908"/>
+          <a:ext cx="4243752" cy="370840"/>
+        </p:xfrm>
+        <a:graphic>
+          <a:graphicData uri="http://schemas.openxmlformats.org/drawingml/2006/table">
+            <a:tbl>
+              <a:tblPr firstRow="1" bandRow="1">
+                <a:tableStyleId>{7DF18680-E054-41AD-8BC1-D1AEF772440D}</a:tableStyleId>
+              </a:tblPr>
+              <a:tblGrid>
+                <a:gridCol w="707292">
+                  <a:extLst>
+                    <a:ext uri="{9D8B030D-6E8A-4147-A177-3AD203B41FA5}">
+                      <a16:colId xmlns:a16="http://schemas.microsoft.com/office/drawing/2014/main" val="1477033119"/>
+                    </a:ext>
+                  </a:extLst>
+                </a:gridCol>
+                <a:gridCol w="707292">
+                  <a:extLst>
+                    <a:ext uri="{9D8B030D-6E8A-4147-A177-3AD203B41FA5}">
+                      <a16:colId xmlns:a16="http://schemas.microsoft.com/office/drawing/2014/main" val="351217100"/>
+                    </a:ext>
+                  </a:extLst>
+                </a:gridCol>
+                <a:gridCol w="707292">
+                  <a:extLst>
+                    <a:ext uri="{9D8B030D-6E8A-4147-A177-3AD203B41FA5}">
+                      <a16:colId xmlns:a16="http://schemas.microsoft.com/office/drawing/2014/main" val="3783675637"/>
+                    </a:ext>
+                  </a:extLst>
+                </a:gridCol>
+                <a:gridCol w="707292">
+                  <a:extLst>
+                    <a:ext uri="{9D8B030D-6E8A-4147-A177-3AD203B41FA5}">
+                      <a16:colId xmlns:a16="http://schemas.microsoft.com/office/drawing/2014/main" val="295156759"/>
+                    </a:ext>
+                  </a:extLst>
+                </a:gridCol>
+                <a:gridCol w="707292">
+                  <a:extLst>
+                    <a:ext uri="{9D8B030D-6E8A-4147-A177-3AD203B41FA5}">
+                      <a16:colId xmlns:a16="http://schemas.microsoft.com/office/drawing/2014/main" val="3564346508"/>
+                    </a:ext>
+                  </a:extLst>
+                </a:gridCol>
+                <a:gridCol w="707292">
+                  <a:extLst>
+                    <a:ext uri="{9D8B030D-6E8A-4147-A177-3AD203B41FA5}">
+                      <a16:colId xmlns:a16="http://schemas.microsoft.com/office/drawing/2014/main" val="3625321702"/>
+                    </a:ext>
+                  </a:extLst>
+                </a:gridCol>
+              </a:tblGrid>
+              <a:tr h="370840">
+                <a:tc>
+                  <a:txBody>
+                    <a:bodyPr/>
+                    <a:lstStyle/>
+                    <a:p>
+                      <a:endParaRPr lang="en-US" dirty="0"/>
+                    </a:p>
+                  </a:txBody>
+                  <a:tcPr/>
+                </a:tc>
+                <a:tc>
+                  <a:txBody>
+                    <a:bodyPr/>
+                    <a:lstStyle/>
+                    <a:p>
+                      <a:endParaRPr lang="en-US" dirty="0"/>
+                    </a:p>
+                  </a:txBody>
+                  <a:tcPr/>
+                </a:tc>
+                <a:tc>
+                  <a:txBody>
+                    <a:bodyPr/>
+                    <a:lstStyle/>
+                    <a:p>
+                      <a:endParaRPr lang="en-US" dirty="0"/>
+                    </a:p>
+                  </a:txBody>
+                  <a:tcPr/>
+                </a:tc>
+                <a:tc>
+                  <a:txBody>
+                    <a:bodyPr/>
+                    <a:lstStyle/>
+                    <a:p>
+                      <a:endParaRPr lang="en-US" dirty="0"/>
+                    </a:p>
+                  </a:txBody>
+                  <a:tcPr/>
+                </a:tc>
+                <a:tc>
+                  <a:txBody>
+                    <a:bodyPr/>
+                    <a:lstStyle/>
+                    <a:p>
+                      <a:endParaRPr lang="en-US" dirty="0"/>
+                    </a:p>
+                  </a:txBody>
+                  <a:tcPr/>
+                </a:tc>
+                <a:tc>
+                  <a:txBody>
+                    <a:bodyPr/>
+                    <a:lstStyle/>
+                    <a:p>
+                      <a:endParaRPr lang="en-US" dirty="0"/>
+                    </a:p>
+                  </a:txBody>
+                  <a:tcPr/>
+                </a:tc>
+                <a:extLst>
+                  <a:ext uri="{0D108BD9-81ED-4DB2-BD59-A6C34878D82A}">
+                    <a16:rowId xmlns:a16="http://schemas.microsoft.com/office/drawing/2014/main" val="2917907720"/>
+                  </a:ext>
+                </a:extLst>
+              </a:tr>
+            </a:tbl>
+          </a:graphicData>
+        </a:graphic>
+      </p:graphicFrame>
+      <p:graphicFrame>
+        <p:nvGraphicFramePr>
+          <p:cNvPr id="34" name="Table 28">
+            <a:extLst>
+              <a:ext uri="{FF2B5EF4-FFF2-40B4-BE49-F238E27FC236}">
+                <a16:creationId xmlns:a16="http://schemas.microsoft.com/office/drawing/2014/main" id="{02DDD11A-787E-F04D-C7E1-6C27535B0E00}"/>
+              </a:ext>
+            </a:extLst>
+          </p:cNvPr>
+          <p:cNvGraphicFramePr>
+            <a:graphicFrameLocks noGrp="1"/>
+          </p:cNvGraphicFramePr>
+          <p:nvPr/>
+        </p:nvGraphicFramePr>
+        <p:xfrm>
+          <a:off x="6471137" y="5048825"/>
+          <a:ext cx="4243752" cy="741680"/>
+        </p:xfrm>
+        <a:graphic>
+          <a:graphicData uri="http://schemas.openxmlformats.org/drawingml/2006/table">
+            <a:tbl>
+              <a:tblPr firstRow="1" bandRow="1">
+                <a:tableStyleId>{7DF18680-E054-41AD-8BC1-D1AEF772440D}</a:tableStyleId>
+              </a:tblPr>
+              <a:tblGrid>
+                <a:gridCol w="707292">
+                  <a:extLst>
+                    <a:ext uri="{9D8B030D-6E8A-4147-A177-3AD203B41FA5}">
+                      <a16:colId xmlns:a16="http://schemas.microsoft.com/office/drawing/2014/main" val="1477033119"/>
+                    </a:ext>
+                  </a:extLst>
+                </a:gridCol>
+                <a:gridCol w="707292">
+                  <a:extLst>
+                    <a:ext uri="{9D8B030D-6E8A-4147-A177-3AD203B41FA5}">
+                      <a16:colId xmlns:a16="http://schemas.microsoft.com/office/drawing/2014/main" val="351217100"/>
+                    </a:ext>
+                  </a:extLst>
+                </a:gridCol>
+                <a:gridCol w="707292">
+                  <a:extLst>
+                    <a:ext uri="{9D8B030D-6E8A-4147-A177-3AD203B41FA5}">
+                      <a16:colId xmlns:a16="http://schemas.microsoft.com/office/drawing/2014/main" val="3783675637"/>
+                    </a:ext>
+                  </a:extLst>
+                </a:gridCol>
+                <a:gridCol w="707292">
+                  <a:extLst>
+                    <a:ext uri="{9D8B030D-6E8A-4147-A177-3AD203B41FA5}">
+                      <a16:colId xmlns:a16="http://schemas.microsoft.com/office/drawing/2014/main" val="295156759"/>
+                    </a:ext>
+                  </a:extLst>
+                </a:gridCol>
+                <a:gridCol w="707292">
+                  <a:extLst>
+                    <a:ext uri="{9D8B030D-6E8A-4147-A177-3AD203B41FA5}">
+                      <a16:colId xmlns:a16="http://schemas.microsoft.com/office/drawing/2014/main" val="3564346508"/>
+                    </a:ext>
+                  </a:extLst>
+                </a:gridCol>
+                <a:gridCol w="707292">
+                  <a:extLst>
+                    <a:ext uri="{9D8B030D-6E8A-4147-A177-3AD203B41FA5}">
+                      <a16:colId xmlns:a16="http://schemas.microsoft.com/office/drawing/2014/main" val="3625321702"/>
+                    </a:ext>
+                  </a:extLst>
+                </a:gridCol>
+              </a:tblGrid>
+              <a:tr h="370840">
+                <a:tc>
+                  <a:txBody>
+                    <a:bodyPr/>
+                    <a:lstStyle/>
+                    <a:p>
+                      <a:endParaRPr lang="en-US"/>
+                    </a:p>
+                  </a:txBody>
+                  <a:tcPr/>
+                </a:tc>
+                <a:tc>
+                  <a:txBody>
+                    <a:bodyPr/>
+                    <a:lstStyle/>
+                    <a:p>
+                      <a:endParaRPr lang="en-US"/>
+                    </a:p>
+                  </a:txBody>
+                  <a:tcPr/>
+                </a:tc>
+                <a:tc>
+                  <a:txBody>
+                    <a:bodyPr/>
+                    <a:lstStyle/>
+                    <a:p>
+                      <a:endParaRPr lang="en-US"/>
+                    </a:p>
+                  </a:txBody>
+                  <a:tcPr/>
+                </a:tc>
+                <a:tc>
+                  <a:txBody>
+                    <a:bodyPr/>
+                    <a:lstStyle/>
+                    <a:p>
+                      <a:endParaRPr lang="en-US" dirty="0"/>
+                    </a:p>
+                  </a:txBody>
+                  <a:tcPr/>
+                </a:tc>
+                <a:tc>
+                  <a:txBody>
+                    <a:bodyPr/>
+                    <a:lstStyle/>
+                    <a:p>
+                      <a:endParaRPr lang="en-US"/>
+                    </a:p>
+                  </a:txBody>
+                  <a:tcPr/>
+                </a:tc>
+                <a:tc>
+                  <a:txBody>
+                    <a:bodyPr/>
+                    <a:lstStyle/>
+                    <a:p>
+                      <a:endParaRPr lang="en-US"/>
+                    </a:p>
+                  </a:txBody>
+                  <a:tcPr/>
+                </a:tc>
+                <a:extLst>
+                  <a:ext uri="{0D108BD9-81ED-4DB2-BD59-A6C34878D82A}">
+                    <a16:rowId xmlns:a16="http://schemas.microsoft.com/office/drawing/2014/main" val="2608423520"/>
+                  </a:ext>
+                </a:extLst>
+              </a:tr>
+              <a:tr h="370840">
+                <a:tc>
+                  <a:txBody>
+                    <a:bodyPr/>
+                    <a:lstStyle/>
+                    <a:p>
+                      <a:endParaRPr lang="en-US"/>
+                    </a:p>
+                  </a:txBody>
+                  <a:tcPr/>
+                </a:tc>
+                <a:tc>
+                  <a:txBody>
+                    <a:bodyPr/>
+                    <a:lstStyle/>
+                    <a:p>
+                      <a:endParaRPr lang="en-US"/>
+                    </a:p>
+                  </a:txBody>
+                  <a:tcPr/>
+                </a:tc>
+                <a:tc>
+                  <a:txBody>
+                    <a:bodyPr/>
+                    <a:lstStyle/>
+                    <a:p>
+                      <a:endParaRPr lang="en-US"/>
+                    </a:p>
+                  </a:txBody>
+                  <a:tcPr/>
+                </a:tc>
+                <a:tc>
+                  <a:txBody>
+                    <a:bodyPr/>
+                    <a:lstStyle/>
+                    <a:p>
+                      <a:endParaRPr lang="en-US"/>
+                    </a:p>
+                  </a:txBody>
+                  <a:tcPr/>
+                </a:tc>
+                <a:tc>
+                  <a:txBody>
+                    <a:bodyPr/>
+                    <a:lstStyle/>
+                    <a:p>
+                      <a:endParaRPr lang="en-US"/>
+                    </a:p>
+                  </a:txBody>
+                  <a:tcPr/>
+                </a:tc>
+                <a:tc>
+                  <a:txBody>
+                    <a:bodyPr/>
+                    <a:lstStyle/>
+                    <a:p>
+                      <a:endParaRPr lang="en-US" dirty="0"/>
+                    </a:p>
+                  </a:txBody>
+                  <a:tcPr/>
+                </a:tc>
+                <a:extLst>
+                  <a:ext uri="{0D108BD9-81ED-4DB2-BD59-A6C34878D82A}">
+                    <a16:rowId xmlns:a16="http://schemas.microsoft.com/office/drawing/2014/main" val="2917907720"/>
+                  </a:ext>
+                </a:extLst>
+              </a:tr>
+            </a:tbl>
+          </a:graphicData>
+        </a:graphic>
+      </p:graphicFrame>
+      <p:sp>
+        <p:nvSpPr>
+          <p:cNvPr id="35" name="TextBox 34">
+            <a:extLst>
+              <a:ext uri="{FF2B5EF4-FFF2-40B4-BE49-F238E27FC236}">
+                <a16:creationId xmlns:a16="http://schemas.microsoft.com/office/drawing/2014/main" id="{5A765B4D-10D5-3381-AD03-05D3C98AE29F}"/>
+              </a:ext>
+            </a:extLst>
+          </p:cNvPr>
+          <p:cNvSpPr txBox="1"/>
+          <p:nvPr/>
+        </p:nvSpPr>
+        <p:spPr>
+          <a:xfrm>
+            <a:off x="8385264" y="5903727"/>
+            <a:ext cx="415498" cy="369332"/>
           </a:xfrm>
           <a:prstGeom prst="rect">
             <a:avLst/>
           </a:prstGeom>
-        </p:spPr>
-      </p:pic>
-      <p:pic>
-        <p:nvPicPr>
-          <p:cNvPr id="23" name="Picture 22">
-            <a:extLst>
-              <a:ext uri="{FF2B5EF4-FFF2-40B4-BE49-F238E27FC236}">
-                <a16:creationId xmlns:a16="http://schemas.microsoft.com/office/drawing/2014/main" id="{80D194D9-4E35-DF94-3605-F29DA2E76420}"/>
-              </a:ext>
-            </a:extLst>
-          </p:cNvPr>
-          <p:cNvPicPr>
-            <a:picLocks noChangeAspect="1"/>
-          </p:cNvPicPr>
+          <a:noFill/>
+        </p:spPr>
+        <p:txBody>
+          <a:bodyPr wrap="none" rtlCol="0">
+            <a:spAutoFit/>
+          </a:bodyPr>
+          <a:lstStyle/>
+          <a:p>
+            <a:r>
+              <a:rPr lang="en-US" dirty="0"/>
+              <a:t>…</a:t>
+            </a:r>
+          </a:p>
+        </p:txBody>
+      </p:sp>
+      <p:graphicFrame>
+        <p:nvGraphicFramePr>
+          <p:cNvPr id="36" name="Table 28">
+            <a:extLst>
+              <a:ext uri="{FF2B5EF4-FFF2-40B4-BE49-F238E27FC236}">
+                <a16:creationId xmlns:a16="http://schemas.microsoft.com/office/drawing/2014/main" id="{914B302B-616A-5D4E-6E1B-60A1B0B1291E}"/>
+              </a:ext>
+            </a:extLst>
+          </p:cNvPr>
+          <p:cNvGraphicFramePr>
+            <a:graphicFrameLocks noGrp="1"/>
+          </p:cNvGraphicFramePr>
           <p:nvPr/>
-        </p:nvPicPr>
-        <p:blipFill>
-          <a:blip r:embed="rId8"/>
-          <a:stretch>
-            <a:fillRect/>
-          </a:stretch>
-        </p:blipFill>
-        <p:spPr>
-          <a:xfrm>
-            <a:off x="5628777" y="2073284"/>
-            <a:ext cx="3403600" cy="1828800"/>
+        </p:nvGraphicFramePr>
+        <p:xfrm>
+          <a:off x="6471137" y="6462467"/>
+          <a:ext cx="4243752" cy="370840"/>
+        </p:xfrm>
+        <a:graphic>
+          <a:graphicData uri="http://schemas.openxmlformats.org/drawingml/2006/table">
+            <a:tbl>
+              <a:tblPr firstRow="1" bandRow="1">
+                <a:tableStyleId>{7DF18680-E054-41AD-8BC1-D1AEF772440D}</a:tableStyleId>
+              </a:tblPr>
+              <a:tblGrid>
+                <a:gridCol w="707292">
+                  <a:extLst>
+                    <a:ext uri="{9D8B030D-6E8A-4147-A177-3AD203B41FA5}">
+                      <a16:colId xmlns:a16="http://schemas.microsoft.com/office/drawing/2014/main" val="1477033119"/>
+                    </a:ext>
+                  </a:extLst>
+                </a:gridCol>
+                <a:gridCol w="707292">
+                  <a:extLst>
+                    <a:ext uri="{9D8B030D-6E8A-4147-A177-3AD203B41FA5}">
+                      <a16:colId xmlns:a16="http://schemas.microsoft.com/office/drawing/2014/main" val="351217100"/>
+                    </a:ext>
+                  </a:extLst>
+                </a:gridCol>
+                <a:gridCol w="707292">
+                  <a:extLst>
+                    <a:ext uri="{9D8B030D-6E8A-4147-A177-3AD203B41FA5}">
+                      <a16:colId xmlns:a16="http://schemas.microsoft.com/office/drawing/2014/main" val="3783675637"/>
+                    </a:ext>
+                  </a:extLst>
+                </a:gridCol>
+                <a:gridCol w="707292">
+                  <a:extLst>
+                    <a:ext uri="{9D8B030D-6E8A-4147-A177-3AD203B41FA5}">
+                      <a16:colId xmlns:a16="http://schemas.microsoft.com/office/drawing/2014/main" val="295156759"/>
+                    </a:ext>
+                  </a:extLst>
+                </a:gridCol>
+                <a:gridCol w="707292">
+                  <a:extLst>
+                    <a:ext uri="{9D8B030D-6E8A-4147-A177-3AD203B41FA5}">
+                      <a16:colId xmlns:a16="http://schemas.microsoft.com/office/drawing/2014/main" val="3564346508"/>
+                    </a:ext>
+                  </a:extLst>
+                </a:gridCol>
+                <a:gridCol w="707292">
+                  <a:extLst>
+                    <a:ext uri="{9D8B030D-6E8A-4147-A177-3AD203B41FA5}">
+                      <a16:colId xmlns:a16="http://schemas.microsoft.com/office/drawing/2014/main" val="3625321702"/>
+                    </a:ext>
+                  </a:extLst>
+                </a:gridCol>
+              </a:tblGrid>
+              <a:tr h="370840">
+                <a:tc>
+                  <a:txBody>
+                    <a:bodyPr/>
+                    <a:lstStyle/>
+                    <a:p>
+                      <a:endParaRPr lang="en-US" dirty="0"/>
+                    </a:p>
+                  </a:txBody>
+                  <a:tcPr/>
+                </a:tc>
+                <a:tc>
+                  <a:txBody>
+                    <a:bodyPr/>
+                    <a:lstStyle/>
+                    <a:p>
+                      <a:endParaRPr lang="en-US" dirty="0"/>
+                    </a:p>
+                  </a:txBody>
+                  <a:tcPr/>
+                </a:tc>
+                <a:tc>
+                  <a:txBody>
+                    <a:bodyPr/>
+                    <a:lstStyle/>
+                    <a:p>
+                      <a:endParaRPr lang="en-US" dirty="0"/>
+                    </a:p>
+                  </a:txBody>
+                  <a:tcPr/>
+                </a:tc>
+                <a:tc>
+                  <a:txBody>
+                    <a:bodyPr/>
+                    <a:lstStyle/>
+                    <a:p>
+                      <a:endParaRPr lang="en-US" dirty="0"/>
+                    </a:p>
+                  </a:txBody>
+                  <a:tcPr/>
+                </a:tc>
+                <a:tc>
+                  <a:txBody>
+                    <a:bodyPr/>
+                    <a:lstStyle/>
+                    <a:p>
+                      <a:endParaRPr lang="en-US" dirty="0"/>
+                    </a:p>
+                  </a:txBody>
+                  <a:tcPr/>
+                </a:tc>
+                <a:tc>
+                  <a:txBody>
+                    <a:bodyPr/>
+                    <a:lstStyle/>
+                    <a:p>
+                      <a:endParaRPr lang="en-US" dirty="0"/>
+                    </a:p>
+                  </a:txBody>
+                  <a:tcPr/>
+                </a:tc>
+                <a:extLst>
+                  <a:ext uri="{0D108BD9-81ED-4DB2-BD59-A6C34878D82A}">
+                    <a16:rowId xmlns:a16="http://schemas.microsoft.com/office/drawing/2014/main" val="2917907720"/>
+                  </a:ext>
+                </a:extLst>
+              </a:tr>
+            </a:tbl>
+          </a:graphicData>
+        </a:graphic>
+      </p:graphicFrame>
+      <p:sp>
+        <p:nvSpPr>
+          <p:cNvPr id="37" name="TextBox 36">
+            <a:extLst>
+              <a:ext uri="{FF2B5EF4-FFF2-40B4-BE49-F238E27FC236}">
+                <a16:creationId xmlns:a16="http://schemas.microsoft.com/office/drawing/2014/main" id="{458F679B-8F11-DD1D-61B8-8CC930F89F69}"/>
+              </a:ext>
+            </a:extLst>
+          </p:cNvPr>
+          <p:cNvSpPr txBox="1"/>
+          <p:nvPr/>
+        </p:nvSpPr>
+        <p:spPr>
+          <a:xfrm>
+            <a:off x="7971368" y="2186792"/>
+            <a:ext cx="1243289" cy="369332"/>
           </a:xfrm>
           <a:prstGeom prst="rect">
             <a:avLst/>
           </a:prstGeom>
-        </p:spPr>
-      </p:pic>
+          <a:noFill/>
+        </p:spPr>
+        <p:txBody>
+          <a:bodyPr wrap="none" rtlCol="0">
+            <a:spAutoFit/>
+          </a:bodyPr>
+          <a:lstStyle/>
+          <a:p>
+            <a:r>
+              <a:rPr lang="en-US" dirty="0"/>
+              <a:t>Time Step</a:t>
+            </a:r>
+          </a:p>
+        </p:txBody>
+      </p:sp>
+      <p:sp>
+        <p:nvSpPr>
+          <p:cNvPr id="38" name="TextBox 37">
+            <a:extLst>
+              <a:ext uri="{FF2B5EF4-FFF2-40B4-BE49-F238E27FC236}">
+                <a16:creationId xmlns:a16="http://schemas.microsoft.com/office/drawing/2014/main" id="{28B6D4EC-BE58-70AA-E837-212FD73BB642}"/>
+              </a:ext>
+            </a:extLst>
+          </p:cNvPr>
+          <p:cNvSpPr txBox="1"/>
+          <p:nvPr/>
+        </p:nvSpPr>
+        <p:spPr>
+          <a:xfrm>
+            <a:off x="7971367" y="4661044"/>
+            <a:ext cx="1243289" cy="369332"/>
+          </a:xfrm>
+          <a:prstGeom prst="rect">
+            <a:avLst/>
+          </a:prstGeom>
+          <a:noFill/>
+        </p:spPr>
+        <p:txBody>
+          <a:bodyPr wrap="none" rtlCol="0">
+            <a:spAutoFit/>
+          </a:bodyPr>
+          <a:lstStyle/>
+          <a:p>
+            <a:r>
+              <a:rPr lang="en-US" dirty="0"/>
+              <a:t>Time Step</a:t>
+            </a:r>
+          </a:p>
+        </p:txBody>
+      </p:sp>
+      <p:sp>
+        <p:nvSpPr>
+          <p:cNvPr id="39" name="TextBox 38">
+            <a:extLst>
+              <a:ext uri="{FF2B5EF4-FFF2-40B4-BE49-F238E27FC236}">
+                <a16:creationId xmlns:a16="http://schemas.microsoft.com/office/drawing/2014/main" id="{E2E92FF9-C8CC-8433-C8E0-488FEA82F905}"/>
+              </a:ext>
+            </a:extLst>
+          </p:cNvPr>
+          <p:cNvSpPr txBox="1"/>
+          <p:nvPr/>
+        </p:nvSpPr>
+        <p:spPr>
+          <a:xfrm>
+            <a:off x="10832123" y="2602652"/>
+            <a:ext cx="1113190" cy="369332"/>
+          </a:xfrm>
+          <a:prstGeom prst="rect">
+            <a:avLst/>
+          </a:prstGeom>
+          <a:noFill/>
+        </p:spPr>
+        <p:txBody>
+          <a:bodyPr wrap="none" rtlCol="0">
+            <a:spAutoFit/>
+          </a:bodyPr>
+          <a:lstStyle/>
+          <a:p>
+            <a:r>
+              <a:rPr lang="en-US" dirty="0"/>
+              <a:t>Branch 1</a:t>
+            </a:r>
+          </a:p>
+        </p:txBody>
+      </p:sp>
+      <p:sp>
+        <p:nvSpPr>
+          <p:cNvPr id="40" name="TextBox 39">
+            <a:extLst>
+              <a:ext uri="{FF2B5EF4-FFF2-40B4-BE49-F238E27FC236}">
+                <a16:creationId xmlns:a16="http://schemas.microsoft.com/office/drawing/2014/main" id="{14805981-3409-DFE5-EB0E-F8372044B325}"/>
+              </a:ext>
+            </a:extLst>
+          </p:cNvPr>
+          <p:cNvSpPr txBox="1"/>
+          <p:nvPr/>
+        </p:nvSpPr>
+        <p:spPr>
+          <a:xfrm>
+            <a:off x="10832123" y="2971984"/>
+            <a:ext cx="1113190" cy="369332"/>
+          </a:xfrm>
+          <a:prstGeom prst="rect">
+            <a:avLst/>
+          </a:prstGeom>
+          <a:noFill/>
+        </p:spPr>
+        <p:txBody>
+          <a:bodyPr wrap="none" rtlCol="0">
+            <a:spAutoFit/>
+          </a:bodyPr>
+          <a:lstStyle/>
+          <a:p>
+            <a:r>
+              <a:rPr lang="en-US" dirty="0"/>
+              <a:t>Branch 2</a:t>
+            </a:r>
+          </a:p>
+        </p:txBody>
+      </p:sp>
+      <p:sp>
+        <p:nvSpPr>
+          <p:cNvPr id="41" name="TextBox 40">
+            <a:extLst>
+              <a:ext uri="{FF2B5EF4-FFF2-40B4-BE49-F238E27FC236}">
+                <a16:creationId xmlns:a16="http://schemas.microsoft.com/office/drawing/2014/main" id="{08DFCB0B-9267-67F4-14F0-7AABDB2C371B}"/>
+              </a:ext>
+            </a:extLst>
+          </p:cNvPr>
+          <p:cNvSpPr txBox="1"/>
+          <p:nvPr/>
+        </p:nvSpPr>
+        <p:spPr>
+          <a:xfrm>
+            <a:off x="10832123" y="3766920"/>
+            <a:ext cx="1302344" cy="369332"/>
+          </a:xfrm>
+          <a:prstGeom prst="rect">
+            <a:avLst/>
+          </a:prstGeom>
+          <a:noFill/>
+        </p:spPr>
+        <p:txBody>
+          <a:bodyPr wrap="none" rtlCol="0">
+            <a:spAutoFit/>
+          </a:bodyPr>
+          <a:lstStyle/>
+          <a:p>
+            <a:r>
+              <a:rPr lang="en-US" dirty="0"/>
+              <a:t>Branch Nb</a:t>
+            </a:r>
+          </a:p>
+        </p:txBody>
+      </p:sp>
+      <p:sp>
+        <p:nvSpPr>
+          <p:cNvPr id="42" name="TextBox 41">
+            <a:extLst>
+              <a:ext uri="{FF2B5EF4-FFF2-40B4-BE49-F238E27FC236}">
+                <a16:creationId xmlns:a16="http://schemas.microsoft.com/office/drawing/2014/main" id="{D672B421-EF6D-60A4-7D59-4F3A9BB05ED1}"/>
+              </a:ext>
+            </a:extLst>
+          </p:cNvPr>
+          <p:cNvSpPr txBox="1"/>
+          <p:nvPr/>
+        </p:nvSpPr>
+        <p:spPr>
+          <a:xfrm>
+            <a:off x="10832123" y="5060426"/>
+            <a:ext cx="973343" cy="369332"/>
+          </a:xfrm>
+          <a:prstGeom prst="rect">
+            <a:avLst/>
+          </a:prstGeom>
+          <a:noFill/>
+        </p:spPr>
+        <p:txBody>
+          <a:bodyPr wrap="none" rtlCol="0">
+            <a:spAutoFit/>
+          </a:bodyPr>
+          <a:lstStyle/>
+          <a:p>
+            <a:r>
+              <a:rPr lang="en-US" dirty="0"/>
+              <a:t>Node 1</a:t>
+            </a:r>
+          </a:p>
+        </p:txBody>
+      </p:sp>
+      <p:sp>
+        <p:nvSpPr>
+          <p:cNvPr id="43" name="TextBox 42">
+            <a:extLst>
+              <a:ext uri="{FF2B5EF4-FFF2-40B4-BE49-F238E27FC236}">
+                <a16:creationId xmlns:a16="http://schemas.microsoft.com/office/drawing/2014/main" id="{FB9AC736-D1C9-93BD-592C-08BFABA9AD4A}"/>
+              </a:ext>
+            </a:extLst>
+          </p:cNvPr>
+          <p:cNvSpPr txBox="1"/>
+          <p:nvPr/>
+        </p:nvSpPr>
+        <p:spPr>
+          <a:xfrm>
+            <a:off x="10832123" y="5429758"/>
+            <a:ext cx="973343" cy="369332"/>
+          </a:xfrm>
+          <a:prstGeom prst="rect">
+            <a:avLst/>
+          </a:prstGeom>
+          <a:noFill/>
+        </p:spPr>
+        <p:txBody>
+          <a:bodyPr wrap="none" rtlCol="0">
+            <a:spAutoFit/>
+          </a:bodyPr>
+          <a:lstStyle/>
+          <a:p>
+            <a:r>
+              <a:rPr lang="en-US" dirty="0"/>
+              <a:t>Node 2</a:t>
+            </a:r>
+          </a:p>
+        </p:txBody>
+      </p:sp>
+      <p:sp>
+        <p:nvSpPr>
+          <p:cNvPr id="44" name="TextBox 43">
+            <a:extLst>
+              <a:ext uri="{FF2B5EF4-FFF2-40B4-BE49-F238E27FC236}">
+                <a16:creationId xmlns:a16="http://schemas.microsoft.com/office/drawing/2014/main" id="{ECEF7767-6865-3879-B7FC-9248AF3ECD44}"/>
+              </a:ext>
+            </a:extLst>
+          </p:cNvPr>
+          <p:cNvSpPr txBox="1"/>
+          <p:nvPr/>
+        </p:nvSpPr>
+        <p:spPr>
+          <a:xfrm>
+            <a:off x="10832123" y="6404035"/>
+            <a:ext cx="1149674" cy="369332"/>
+          </a:xfrm>
+          <a:prstGeom prst="rect">
+            <a:avLst/>
+          </a:prstGeom>
+          <a:noFill/>
+        </p:spPr>
+        <p:txBody>
+          <a:bodyPr wrap="none" rtlCol="0">
+            <a:spAutoFit/>
+          </a:bodyPr>
+          <a:lstStyle/>
+          <a:p>
+            <a:r>
+              <a:rPr lang="en-US" dirty="0"/>
+              <a:t>Node </a:t>
+            </a:r>
+            <a:r>
+              <a:rPr lang="en-US" dirty="0" err="1"/>
+              <a:t>Nn</a:t>
+            </a:r>
+            <a:endParaRPr lang="en-US" dirty="0"/>
+          </a:p>
+        </p:txBody>
+      </p:sp>
+      <p:sp>
+        <p:nvSpPr>
+          <p:cNvPr id="3" name="Frame 2">
+            <a:extLst>
+              <a:ext uri="{FF2B5EF4-FFF2-40B4-BE49-F238E27FC236}">
+                <a16:creationId xmlns:a16="http://schemas.microsoft.com/office/drawing/2014/main" id="{C264539C-4E82-A87B-9097-2BCBE4BCA757}"/>
+              </a:ext>
+            </a:extLst>
+          </p:cNvPr>
+          <p:cNvSpPr/>
+          <p:nvPr/>
+        </p:nvSpPr>
+        <p:spPr>
+          <a:xfrm rot="18730279">
+            <a:off x="1158529" y="2313388"/>
+            <a:ext cx="916458" cy="1720701"/>
+          </a:xfrm>
+          <a:prstGeom prst="frame">
+            <a:avLst>
+              <a:gd name="adj1" fmla="val 5000"/>
+            </a:avLst>
+          </a:prstGeom>
+          <a:solidFill>
+            <a:srgbClr val="FFC000"/>
+          </a:solidFill>
+          <a:ln>
+            <a:solidFill>
+              <a:srgbClr val="FFC000"/>
+            </a:solidFill>
+          </a:ln>
+        </p:spPr>
+        <p:style>
+          <a:lnRef idx="2">
+            <a:schemeClr val="accent1">
+              <a:shade val="50000"/>
+            </a:schemeClr>
+          </a:lnRef>
+          <a:fillRef idx="1">
+            <a:schemeClr val="accent1"/>
+          </a:fillRef>
+          <a:effectRef idx="0">
+            <a:schemeClr val="accent1"/>
+          </a:effectRef>
+          <a:fontRef idx="minor">
+            <a:schemeClr val="lt1"/>
+          </a:fontRef>
+        </p:style>
+        <p:txBody>
+          <a:bodyPr rtlCol="0" anchor="ctr"/>
+          <a:lstStyle/>
+          <a:p>
+            <a:pPr algn="ctr"/>
+            <a:endParaRPr lang="en-US">
+              <a:solidFill>
+                <a:schemeClr val="tx1"/>
+              </a:solidFill>
+            </a:endParaRPr>
+          </a:p>
+        </p:txBody>
+      </p:sp>
+      <p:sp>
+        <p:nvSpPr>
+          <p:cNvPr id="4" name="Frame 3">
+            <a:extLst>
+              <a:ext uri="{FF2B5EF4-FFF2-40B4-BE49-F238E27FC236}">
+                <a16:creationId xmlns:a16="http://schemas.microsoft.com/office/drawing/2014/main" id="{10E804A7-9978-B033-A96D-7674B12B3B06}"/>
+              </a:ext>
+            </a:extLst>
+          </p:cNvPr>
+          <p:cNvSpPr/>
+          <p:nvPr/>
+        </p:nvSpPr>
+        <p:spPr>
+          <a:xfrm rot="18730279">
+            <a:off x="2687407" y="2308776"/>
+            <a:ext cx="916458" cy="1720701"/>
+          </a:xfrm>
+          <a:prstGeom prst="frame">
+            <a:avLst>
+              <a:gd name="adj1" fmla="val 5000"/>
+            </a:avLst>
+          </a:prstGeom>
+          <a:solidFill>
+            <a:srgbClr val="FFC000"/>
+          </a:solidFill>
+          <a:ln>
+            <a:solidFill>
+              <a:srgbClr val="FFC000"/>
+            </a:solidFill>
+          </a:ln>
+        </p:spPr>
+        <p:style>
+          <a:lnRef idx="2">
+            <a:schemeClr val="accent1">
+              <a:shade val="50000"/>
+            </a:schemeClr>
+          </a:lnRef>
+          <a:fillRef idx="1">
+            <a:schemeClr val="accent1"/>
+          </a:fillRef>
+          <a:effectRef idx="0">
+            <a:schemeClr val="accent1"/>
+          </a:effectRef>
+          <a:fontRef idx="minor">
+            <a:schemeClr val="lt1"/>
+          </a:fontRef>
+        </p:style>
+        <p:txBody>
+          <a:bodyPr rtlCol="0" anchor="ctr"/>
+          <a:lstStyle/>
+          <a:p>
+            <a:pPr algn="ctr"/>
+            <a:endParaRPr lang="en-US">
+              <a:solidFill>
+                <a:schemeClr val="tx1"/>
+              </a:solidFill>
+            </a:endParaRPr>
+          </a:p>
+        </p:txBody>
+      </p:sp>
+      <p:sp>
+        <p:nvSpPr>
+          <p:cNvPr id="5" name="Frame 4">
+            <a:extLst>
+              <a:ext uri="{FF2B5EF4-FFF2-40B4-BE49-F238E27FC236}">
+                <a16:creationId xmlns:a16="http://schemas.microsoft.com/office/drawing/2014/main" id="{AB6BAC11-A22A-1583-EEA8-3D908274B5A6}"/>
+              </a:ext>
+            </a:extLst>
+          </p:cNvPr>
+          <p:cNvSpPr/>
+          <p:nvPr/>
+        </p:nvSpPr>
+        <p:spPr>
+          <a:xfrm rot="18730279">
+            <a:off x="4226535" y="2256758"/>
+            <a:ext cx="916458" cy="1720701"/>
+          </a:xfrm>
+          <a:prstGeom prst="frame">
+            <a:avLst>
+              <a:gd name="adj1" fmla="val 5000"/>
+            </a:avLst>
+          </a:prstGeom>
+          <a:solidFill>
+            <a:srgbClr val="FFC000"/>
+          </a:solidFill>
+          <a:ln>
+            <a:solidFill>
+              <a:srgbClr val="FFC000"/>
+            </a:solidFill>
+          </a:ln>
+        </p:spPr>
+        <p:style>
+          <a:lnRef idx="2">
+            <a:schemeClr val="accent1">
+              <a:shade val="50000"/>
+            </a:schemeClr>
+          </a:lnRef>
+          <a:fillRef idx="1">
+            <a:schemeClr val="accent1"/>
+          </a:fillRef>
+          <a:effectRef idx="0">
+            <a:schemeClr val="accent1"/>
+          </a:effectRef>
+          <a:fontRef idx="minor">
+            <a:schemeClr val="lt1"/>
+          </a:fontRef>
+        </p:style>
+        <p:txBody>
+          <a:bodyPr rtlCol="0" anchor="ctr"/>
+          <a:lstStyle/>
+          <a:p>
+            <a:pPr algn="ctr"/>
+            <a:endParaRPr lang="en-US">
+              <a:solidFill>
+                <a:schemeClr val="tx1"/>
+              </a:solidFill>
+            </a:endParaRPr>
+          </a:p>
+        </p:txBody>
+      </p:sp>
     </p:spTree>
     <p:extLst>
       <p:ext uri="{BB962C8B-B14F-4D97-AF65-F5344CB8AC3E}">
-        <p14:creationId xmlns:p14="http://schemas.microsoft.com/office/powerpoint/2010/main" val="3603275320"/>
+        <p14:creationId xmlns:p14="http://schemas.microsoft.com/office/powerpoint/2010/main" val="927106061"/>
       </p:ext>
     </p:extLst>
   </p:cSld>
@@ -9315,17 +10635,17 @@
           <a:p>
             <a:r>
               <a:rPr lang="en-US" dirty="0"/>
-              <a:t>LIM - Example</a:t>
+              <a:t>LIM - Implementation</a:t>
             </a:r>
           </a:p>
         </p:txBody>
       </p:sp>
       <p:pic>
         <p:nvPicPr>
-          <p:cNvPr id="3" name="Picture 2">
-            <a:extLst>
-              <a:ext uri="{FF2B5EF4-FFF2-40B4-BE49-F238E27FC236}">
-                <a16:creationId xmlns:a16="http://schemas.microsoft.com/office/drawing/2014/main" id="{CC569F81-B14B-C802-1FFD-9DC4411A7117}"/>
+          <p:cNvPr id="12" name="Picture 11">
+            <a:extLst>
+              <a:ext uri="{FF2B5EF4-FFF2-40B4-BE49-F238E27FC236}">
+                <a16:creationId xmlns:a16="http://schemas.microsoft.com/office/drawing/2014/main" id="{525DE596-D5AA-36BC-0D14-F0FE888B0864}"/>
               </a:ext>
             </a:extLst>
           </p:cNvPr>
@@ -9342,8 +10662,8 @@
         </p:blipFill>
         <p:spPr>
           <a:xfrm>
-            <a:off x="4969874" y="2503891"/>
-            <a:ext cx="3201571" cy="2625894"/>
+            <a:off x="3194539" y="4171915"/>
+            <a:ext cx="7772400" cy="2228239"/>
           </a:xfrm>
           <a:prstGeom prst="rect">
             <a:avLst/>
@@ -9352,10 +10672,10 @@
       </p:pic>
       <p:pic>
         <p:nvPicPr>
-          <p:cNvPr id="7" name="Picture 6">
-            <a:extLst>
-              <a:ext uri="{FF2B5EF4-FFF2-40B4-BE49-F238E27FC236}">
-                <a16:creationId xmlns:a16="http://schemas.microsoft.com/office/drawing/2014/main" id="{AE9B00A6-F705-8FE5-679F-217FC55C62D9}"/>
+          <p:cNvPr id="15" name="Picture 14">
+            <a:extLst>
+              <a:ext uri="{FF2B5EF4-FFF2-40B4-BE49-F238E27FC236}">
+                <a16:creationId xmlns:a16="http://schemas.microsoft.com/office/drawing/2014/main" id="{0C3C5EE6-1A92-4514-D141-7E0F91352F62}"/>
               </a:ext>
             </a:extLst>
           </p:cNvPr>
@@ -9372,8 +10692,8 @@
         </p:blipFill>
         <p:spPr>
           <a:xfrm>
-            <a:off x="8242337" y="826320"/>
-            <a:ext cx="3432577" cy="2625894"/>
+            <a:off x="2232617" y="5571859"/>
+            <a:ext cx="765950" cy="828295"/>
           </a:xfrm>
           <a:prstGeom prst="rect">
             <a:avLst/>
@@ -9382,10 +10702,10 @@
       </p:pic>
       <p:pic>
         <p:nvPicPr>
-          <p:cNvPr id="11" name="Picture 10">
-            <a:extLst>
-              <a:ext uri="{FF2B5EF4-FFF2-40B4-BE49-F238E27FC236}">
-                <a16:creationId xmlns:a16="http://schemas.microsoft.com/office/drawing/2014/main" id="{7EBFD2FF-4389-D16B-6245-2CDA3E82F269}"/>
+          <p:cNvPr id="17" name="Picture 16">
+            <a:extLst>
+              <a:ext uri="{FF2B5EF4-FFF2-40B4-BE49-F238E27FC236}">
+                <a16:creationId xmlns:a16="http://schemas.microsoft.com/office/drawing/2014/main" id="{988F83AD-2F78-6A2E-EECB-8B83E34DA8B6}"/>
               </a:ext>
             </a:extLst>
           </p:cNvPr>
@@ -9402,109 +10722,20 @@
         </p:blipFill>
         <p:spPr>
           <a:xfrm>
-            <a:off x="8262467" y="3696836"/>
-            <a:ext cx="3412447" cy="2705156"/>
+            <a:off x="2262825" y="4514635"/>
+            <a:ext cx="705533" cy="1029916"/>
           </a:xfrm>
           <a:prstGeom prst="rect">
             <a:avLst/>
           </a:prstGeom>
         </p:spPr>
       </p:pic>
-      <p:sp>
-        <p:nvSpPr>
-          <p:cNvPr id="5" name="TextBox 4">
-            <a:extLst>
-              <a:ext uri="{FF2B5EF4-FFF2-40B4-BE49-F238E27FC236}">
-                <a16:creationId xmlns:a16="http://schemas.microsoft.com/office/drawing/2014/main" id="{0BB27B2B-3BF3-3D6E-0A76-5CD15CA9498B}"/>
-              </a:ext>
-            </a:extLst>
-          </p:cNvPr>
-          <p:cNvSpPr txBox="1"/>
-          <p:nvPr/>
-        </p:nvSpPr>
-        <p:spPr>
-          <a:xfrm>
-            <a:off x="587767" y="2139267"/>
-            <a:ext cx="3834704" cy="2246769"/>
-          </a:xfrm>
-          <a:prstGeom prst="rect">
-            <a:avLst/>
-          </a:prstGeom>
-          <a:noFill/>
-        </p:spPr>
-        <p:txBody>
-          <a:bodyPr wrap="none" rtlCol="0">
-            <a:spAutoFit/>
-          </a:bodyPr>
-          <a:lstStyle/>
-          <a:p>
-            <a:r>
-              <a:rPr lang="en-US" sz="1400" dirty="0"/>
-              <a:t>.node</a:t>
-            </a:r>
-          </a:p>
-          <a:p>
-            <a:r>
-              <a:rPr lang="en-US" sz="1400" dirty="0"/>
-              <a:t>I1	1	0	2</a:t>
-            </a:r>
-          </a:p>
-          <a:p>
-            <a:r>
-              <a:rPr lang="en-US" sz="1400" dirty="0"/>
-              <a:t>R1	1	0	1000</a:t>
-            </a:r>
-          </a:p>
-          <a:p>
-            <a:r>
-              <a:rPr lang="en-US" sz="1400" dirty="0"/>
-              <a:t>C1	1	0	0.00001</a:t>
-            </a:r>
-          </a:p>
-          <a:p>
-            <a:r>
-              <a:rPr lang="en-US" sz="1400" dirty="0"/>
-              <a:t>.branch</a:t>
-            </a:r>
-          </a:p>
-          <a:p>
-            <a:r>
-              <a:rPr lang="en-US" sz="1400" dirty="0"/>
-              <a:t>R2	1	2	1000</a:t>
-            </a:r>
-          </a:p>
-          <a:p>
-            <a:r>
-              <a:rPr lang="en-US" sz="1400" dirty="0"/>
-              <a:t>L1	2	3	1</a:t>
-            </a:r>
-          </a:p>
-          <a:p>
-            <a:r>
-              <a:rPr lang="en-US" sz="1400" dirty="0"/>
-              <a:t>.node</a:t>
-            </a:r>
-          </a:p>
-          <a:p>
-            <a:r>
-              <a:rPr lang="en-US" sz="1400" dirty="0"/>
-              <a:t>R3	3	0	1000</a:t>
-            </a:r>
-          </a:p>
-          <a:p>
-            <a:r>
-              <a:rPr lang="en-US" sz="1400" dirty="0"/>
-              <a:t>C2	3	0	0.0000001</a:t>
-            </a:r>
-          </a:p>
-        </p:txBody>
-      </p:sp>
       <p:pic>
         <p:nvPicPr>
-          <p:cNvPr id="6" name="Picture 5">
-            <a:extLst>
-              <a:ext uri="{FF2B5EF4-FFF2-40B4-BE49-F238E27FC236}">
-                <a16:creationId xmlns:a16="http://schemas.microsoft.com/office/drawing/2014/main" id="{F0595E92-8FFA-DB6B-0092-8B1B1471379D}"/>
+          <p:cNvPr id="18" name="Picture 17">
+            <a:extLst>
+              <a:ext uri="{FF2B5EF4-FFF2-40B4-BE49-F238E27FC236}">
+                <a16:creationId xmlns:a16="http://schemas.microsoft.com/office/drawing/2014/main" id="{1C4CE6D2-6C7D-BAB9-9082-E325BF314174}"/>
               </a:ext>
             </a:extLst>
           </p:cNvPr>
@@ -9521,8 +10752,168 @@
         </p:blipFill>
         <p:spPr>
           <a:xfrm>
-            <a:off x="241403" y="4679618"/>
-            <a:ext cx="4899598" cy="2104168"/>
+            <a:off x="1468190" y="3949308"/>
+            <a:ext cx="679072" cy="2908692"/>
+          </a:xfrm>
+          <a:prstGeom prst="rect">
+            <a:avLst/>
+          </a:prstGeom>
+        </p:spPr>
+      </p:pic>
+      <p:sp>
+        <p:nvSpPr>
+          <p:cNvPr id="19" name="TextBox 18">
+            <a:extLst>
+              <a:ext uri="{FF2B5EF4-FFF2-40B4-BE49-F238E27FC236}">
+                <a16:creationId xmlns:a16="http://schemas.microsoft.com/office/drawing/2014/main" id="{9EB62826-E8C0-8C6F-2CFB-AC3C73276191}"/>
+              </a:ext>
+            </a:extLst>
+          </p:cNvPr>
+          <p:cNvSpPr txBox="1"/>
+          <p:nvPr/>
+        </p:nvSpPr>
+        <p:spPr>
+          <a:xfrm rot="16200000">
+            <a:off x="267286" y="4951829"/>
+            <a:ext cx="1244251" cy="369332"/>
+          </a:xfrm>
+          <a:prstGeom prst="rect">
+            <a:avLst/>
+          </a:prstGeom>
+          <a:noFill/>
+        </p:spPr>
+        <p:txBody>
+          <a:bodyPr wrap="none" rtlCol="0">
+            <a:spAutoFit/>
+          </a:bodyPr>
+          <a:lstStyle/>
+          <a:p>
+            <a:r>
+              <a:rPr lang="en-US" dirty="0"/>
+              <a:t>Algorithm</a:t>
+            </a:r>
+          </a:p>
+        </p:txBody>
+      </p:sp>
+      <p:sp>
+        <p:nvSpPr>
+          <p:cNvPr id="20" name="TextBox 19">
+            <a:extLst>
+              <a:ext uri="{FF2B5EF4-FFF2-40B4-BE49-F238E27FC236}">
+                <a16:creationId xmlns:a16="http://schemas.microsoft.com/office/drawing/2014/main" id="{15AC9F08-315E-D092-2DBB-EB3EBD9D7226}"/>
+              </a:ext>
+            </a:extLst>
+          </p:cNvPr>
+          <p:cNvSpPr txBox="1"/>
+          <p:nvPr/>
+        </p:nvSpPr>
+        <p:spPr>
+          <a:xfrm rot="16200000">
+            <a:off x="412871" y="2543013"/>
+            <a:ext cx="953081" cy="369332"/>
+          </a:xfrm>
+          <a:prstGeom prst="rect">
+            <a:avLst/>
+          </a:prstGeom>
+          <a:noFill/>
+        </p:spPr>
+        <p:txBody>
+          <a:bodyPr wrap="none" rtlCol="0">
+            <a:spAutoFit/>
+          </a:bodyPr>
+          <a:lstStyle/>
+          <a:p>
+            <a:r>
+              <a:rPr lang="en-US" dirty="0"/>
+              <a:t>Parsing</a:t>
+            </a:r>
+          </a:p>
+        </p:txBody>
+      </p:sp>
+      <p:pic>
+        <p:nvPicPr>
+          <p:cNvPr id="21" name="Picture 20">
+            <a:extLst>
+              <a:ext uri="{FF2B5EF4-FFF2-40B4-BE49-F238E27FC236}">
+                <a16:creationId xmlns:a16="http://schemas.microsoft.com/office/drawing/2014/main" id="{2A37952E-F4AC-ED3F-A04C-B9FB42F1A714}"/>
+              </a:ext>
+            </a:extLst>
+          </p:cNvPr>
+          <p:cNvPicPr>
+            <a:picLocks noChangeAspect="1"/>
+          </p:cNvPicPr>
+          <p:nvPr/>
+        </p:nvPicPr>
+        <p:blipFill>
+          <a:blip r:embed="rId6"/>
+          <a:stretch>
+            <a:fillRect/>
+          </a:stretch>
+        </p:blipFill>
+        <p:spPr>
+          <a:xfrm>
+            <a:off x="3194539" y="2026060"/>
+            <a:ext cx="2237869" cy="1923248"/>
+          </a:xfrm>
+          <a:prstGeom prst="rect">
+            <a:avLst/>
+          </a:prstGeom>
+        </p:spPr>
+      </p:pic>
+      <p:pic>
+        <p:nvPicPr>
+          <p:cNvPr id="22" name="Picture 21">
+            <a:extLst>
+              <a:ext uri="{FF2B5EF4-FFF2-40B4-BE49-F238E27FC236}">
+                <a16:creationId xmlns:a16="http://schemas.microsoft.com/office/drawing/2014/main" id="{726489B7-1097-5B1A-09DE-345880EEBA92}"/>
+              </a:ext>
+            </a:extLst>
+          </p:cNvPr>
+          <p:cNvPicPr>
+            <a:picLocks noChangeAspect="1"/>
+          </p:cNvPicPr>
+          <p:nvPr/>
+        </p:nvPicPr>
+        <p:blipFill>
+          <a:blip r:embed="rId7"/>
+          <a:stretch>
+            <a:fillRect/>
+          </a:stretch>
+        </p:blipFill>
+        <p:spPr>
+          <a:xfrm>
+            <a:off x="9228746" y="2593984"/>
+            <a:ext cx="2857500" cy="787400"/>
+          </a:xfrm>
+          <a:prstGeom prst="rect">
+            <a:avLst/>
+          </a:prstGeom>
+        </p:spPr>
+      </p:pic>
+      <p:pic>
+        <p:nvPicPr>
+          <p:cNvPr id="23" name="Picture 22">
+            <a:extLst>
+              <a:ext uri="{FF2B5EF4-FFF2-40B4-BE49-F238E27FC236}">
+                <a16:creationId xmlns:a16="http://schemas.microsoft.com/office/drawing/2014/main" id="{80D194D9-4E35-DF94-3605-F29DA2E76420}"/>
+              </a:ext>
+            </a:extLst>
+          </p:cNvPr>
+          <p:cNvPicPr>
+            <a:picLocks noChangeAspect="1"/>
+          </p:cNvPicPr>
+          <p:nvPr/>
+        </p:nvPicPr>
+        <p:blipFill>
+          <a:blip r:embed="rId8"/>
+          <a:stretch>
+            <a:fillRect/>
+          </a:stretch>
+        </p:blipFill>
+        <p:spPr>
+          <a:xfrm>
+            <a:off x="5628777" y="2073284"/>
+            <a:ext cx="3403600" cy="1828800"/>
           </a:xfrm>
           <a:prstGeom prst="rect">
             <a:avLst/>
@@ -9532,7 +10923,7 @@
     </p:spTree>
     <p:extLst>
       <p:ext uri="{BB962C8B-B14F-4D97-AF65-F5344CB8AC3E}">
-        <p14:creationId xmlns:p14="http://schemas.microsoft.com/office/powerpoint/2010/main" val="1701272158"/>
+        <p14:creationId xmlns:p14="http://schemas.microsoft.com/office/powerpoint/2010/main" val="3603275320"/>
       </p:ext>
     </p:extLst>
   </p:cSld>
@@ -9582,6 +10973,540 @@
           <a:p>
             <a:r>
               <a:rPr lang="en-US" dirty="0"/>
+              <a:t>LIM - Example</a:t>
+            </a:r>
+          </a:p>
+        </p:txBody>
+      </p:sp>
+      <p:pic>
+        <p:nvPicPr>
+          <p:cNvPr id="3" name="Picture 2">
+            <a:extLst>
+              <a:ext uri="{FF2B5EF4-FFF2-40B4-BE49-F238E27FC236}">
+                <a16:creationId xmlns:a16="http://schemas.microsoft.com/office/drawing/2014/main" id="{CC569F81-B14B-C802-1FFD-9DC4411A7117}"/>
+              </a:ext>
+            </a:extLst>
+          </p:cNvPr>
+          <p:cNvPicPr>
+            <a:picLocks noChangeAspect="1"/>
+          </p:cNvPicPr>
+          <p:nvPr/>
+        </p:nvPicPr>
+        <p:blipFill>
+          <a:blip r:embed="rId2"/>
+          <a:stretch>
+            <a:fillRect/>
+          </a:stretch>
+        </p:blipFill>
+        <p:spPr>
+          <a:xfrm>
+            <a:off x="4969874" y="2503891"/>
+            <a:ext cx="3201571" cy="2625894"/>
+          </a:xfrm>
+          <a:prstGeom prst="rect">
+            <a:avLst/>
+          </a:prstGeom>
+        </p:spPr>
+      </p:pic>
+      <p:pic>
+        <p:nvPicPr>
+          <p:cNvPr id="7" name="Picture 6">
+            <a:extLst>
+              <a:ext uri="{FF2B5EF4-FFF2-40B4-BE49-F238E27FC236}">
+                <a16:creationId xmlns:a16="http://schemas.microsoft.com/office/drawing/2014/main" id="{AE9B00A6-F705-8FE5-679F-217FC55C62D9}"/>
+              </a:ext>
+            </a:extLst>
+          </p:cNvPr>
+          <p:cNvPicPr>
+            <a:picLocks noChangeAspect="1"/>
+          </p:cNvPicPr>
+          <p:nvPr/>
+        </p:nvPicPr>
+        <p:blipFill>
+          <a:blip r:embed="rId3"/>
+          <a:stretch>
+            <a:fillRect/>
+          </a:stretch>
+        </p:blipFill>
+        <p:spPr>
+          <a:xfrm>
+            <a:off x="8242337" y="826320"/>
+            <a:ext cx="3432577" cy="2625894"/>
+          </a:xfrm>
+          <a:prstGeom prst="rect">
+            <a:avLst/>
+          </a:prstGeom>
+        </p:spPr>
+      </p:pic>
+      <p:pic>
+        <p:nvPicPr>
+          <p:cNvPr id="11" name="Picture 10">
+            <a:extLst>
+              <a:ext uri="{FF2B5EF4-FFF2-40B4-BE49-F238E27FC236}">
+                <a16:creationId xmlns:a16="http://schemas.microsoft.com/office/drawing/2014/main" id="{7EBFD2FF-4389-D16B-6245-2CDA3E82F269}"/>
+              </a:ext>
+            </a:extLst>
+          </p:cNvPr>
+          <p:cNvPicPr>
+            <a:picLocks noChangeAspect="1"/>
+          </p:cNvPicPr>
+          <p:nvPr/>
+        </p:nvPicPr>
+        <p:blipFill>
+          <a:blip r:embed="rId4"/>
+          <a:stretch>
+            <a:fillRect/>
+          </a:stretch>
+        </p:blipFill>
+        <p:spPr>
+          <a:xfrm>
+            <a:off x="8262467" y="3696836"/>
+            <a:ext cx="3412447" cy="2705156"/>
+          </a:xfrm>
+          <a:prstGeom prst="rect">
+            <a:avLst/>
+          </a:prstGeom>
+        </p:spPr>
+      </p:pic>
+      <p:sp>
+        <p:nvSpPr>
+          <p:cNvPr id="5" name="TextBox 4">
+            <a:extLst>
+              <a:ext uri="{FF2B5EF4-FFF2-40B4-BE49-F238E27FC236}">
+                <a16:creationId xmlns:a16="http://schemas.microsoft.com/office/drawing/2014/main" id="{0BB27B2B-3BF3-3D6E-0A76-5CD15CA9498B}"/>
+              </a:ext>
+            </a:extLst>
+          </p:cNvPr>
+          <p:cNvSpPr txBox="1"/>
+          <p:nvPr/>
+        </p:nvSpPr>
+        <p:spPr>
+          <a:xfrm>
+            <a:off x="587767" y="2139267"/>
+            <a:ext cx="3834704" cy="2246769"/>
+          </a:xfrm>
+          <a:prstGeom prst="rect">
+            <a:avLst/>
+          </a:prstGeom>
+          <a:noFill/>
+        </p:spPr>
+        <p:txBody>
+          <a:bodyPr wrap="none" rtlCol="0">
+            <a:spAutoFit/>
+          </a:bodyPr>
+          <a:lstStyle/>
+          <a:p>
+            <a:r>
+              <a:rPr lang="en-US" sz="1400" dirty="0"/>
+              <a:t>.node</a:t>
+            </a:r>
+          </a:p>
+          <a:p>
+            <a:r>
+              <a:rPr lang="en-US" sz="1400" dirty="0"/>
+              <a:t>I1	1	0	2</a:t>
+            </a:r>
+          </a:p>
+          <a:p>
+            <a:r>
+              <a:rPr lang="en-US" sz="1400" dirty="0"/>
+              <a:t>R1	1	0	1000</a:t>
+            </a:r>
+          </a:p>
+          <a:p>
+            <a:r>
+              <a:rPr lang="en-US" sz="1400" dirty="0"/>
+              <a:t>C1	1	0	0.00001</a:t>
+            </a:r>
+          </a:p>
+          <a:p>
+            <a:r>
+              <a:rPr lang="en-US" sz="1400" dirty="0"/>
+              <a:t>.branch</a:t>
+            </a:r>
+          </a:p>
+          <a:p>
+            <a:r>
+              <a:rPr lang="en-US" sz="1400" dirty="0"/>
+              <a:t>R2	1	2	1000</a:t>
+            </a:r>
+          </a:p>
+          <a:p>
+            <a:r>
+              <a:rPr lang="en-US" sz="1400" dirty="0"/>
+              <a:t>L1	2	3	1</a:t>
+            </a:r>
+          </a:p>
+          <a:p>
+            <a:r>
+              <a:rPr lang="en-US" sz="1400" dirty="0"/>
+              <a:t>.node</a:t>
+            </a:r>
+          </a:p>
+          <a:p>
+            <a:r>
+              <a:rPr lang="en-US" sz="1400" dirty="0"/>
+              <a:t>R3	3	0	1000</a:t>
+            </a:r>
+          </a:p>
+          <a:p>
+            <a:r>
+              <a:rPr lang="en-US" sz="1400" dirty="0"/>
+              <a:t>C2	3	0	0.0000001</a:t>
+            </a:r>
+          </a:p>
+        </p:txBody>
+      </p:sp>
+      <p:pic>
+        <p:nvPicPr>
+          <p:cNvPr id="6" name="Picture 5">
+            <a:extLst>
+              <a:ext uri="{FF2B5EF4-FFF2-40B4-BE49-F238E27FC236}">
+                <a16:creationId xmlns:a16="http://schemas.microsoft.com/office/drawing/2014/main" id="{F0595E92-8FFA-DB6B-0092-8B1B1471379D}"/>
+              </a:ext>
+            </a:extLst>
+          </p:cNvPr>
+          <p:cNvPicPr>
+            <a:picLocks noChangeAspect="1"/>
+          </p:cNvPicPr>
+          <p:nvPr/>
+        </p:nvPicPr>
+        <p:blipFill>
+          <a:blip r:embed="rId5"/>
+          <a:stretch>
+            <a:fillRect/>
+          </a:stretch>
+        </p:blipFill>
+        <p:spPr>
+          <a:xfrm>
+            <a:off x="241403" y="4679618"/>
+            <a:ext cx="4899598" cy="2104168"/>
+          </a:xfrm>
+          <a:prstGeom prst="rect">
+            <a:avLst/>
+          </a:prstGeom>
+        </p:spPr>
+      </p:pic>
+    </p:spTree>
+    <p:extLst>
+      <p:ext uri="{BB962C8B-B14F-4D97-AF65-F5344CB8AC3E}">
+        <p14:creationId xmlns:p14="http://schemas.microsoft.com/office/powerpoint/2010/main" val="1701272158"/>
+      </p:ext>
+    </p:extLst>
+  </p:cSld>
+  <p:clrMapOvr>
+    <a:masterClrMapping/>
+  </p:clrMapOvr>
+</p:sld>
+</file>
+
+<file path=ppt/slides/slide7.xml><?xml version="1.0" encoding="utf-8"?>
+<p:sld xmlns:a="http://schemas.openxmlformats.org/drawingml/2006/main" xmlns:r="http://schemas.openxmlformats.org/officeDocument/2006/relationships" xmlns:p="http://schemas.openxmlformats.org/presentationml/2006/main">
+  <p:cSld>
+    <p:spTree>
+      <p:nvGrpSpPr>
+        <p:cNvPr id="1" name=""/>
+        <p:cNvGrpSpPr/>
+        <p:nvPr/>
+      </p:nvGrpSpPr>
+      <p:grpSpPr>
+        <a:xfrm>
+          <a:off x="0" y="0"/>
+          <a:ext cx="0" cy="0"/>
+          <a:chOff x="0" y="0"/>
+          <a:chExt cx="0" cy="0"/>
+        </a:xfrm>
+      </p:grpSpPr>
+      <p:sp>
+        <p:nvSpPr>
+          <p:cNvPr id="2" name="Title 1">
+            <a:extLst>
+              <a:ext uri="{FF2B5EF4-FFF2-40B4-BE49-F238E27FC236}">
+                <a16:creationId xmlns:a16="http://schemas.microsoft.com/office/drawing/2014/main" id="{17427281-9830-2FB5-E037-4213FEBE2BEF}"/>
+              </a:ext>
+            </a:extLst>
+          </p:cNvPr>
+          <p:cNvSpPr>
+            <a:spLocks noGrp="1"/>
+          </p:cNvSpPr>
+          <p:nvPr>
+            <p:ph type="title"/>
+          </p:nvPr>
+        </p:nvSpPr>
+        <p:spPr/>
+        <p:txBody>
+          <a:bodyPr/>
+          <a:lstStyle/>
+          <a:p>
+            <a:r>
+              <a:rPr lang="en-US" dirty="0"/>
+              <a:t>LIM - Example</a:t>
+            </a:r>
+          </a:p>
+        </p:txBody>
+      </p:sp>
+      <p:pic>
+        <p:nvPicPr>
+          <p:cNvPr id="3" name="Picture 2">
+            <a:extLst>
+              <a:ext uri="{FF2B5EF4-FFF2-40B4-BE49-F238E27FC236}">
+                <a16:creationId xmlns:a16="http://schemas.microsoft.com/office/drawing/2014/main" id="{CC569F81-B14B-C802-1FFD-9DC4411A7117}"/>
+              </a:ext>
+            </a:extLst>
+          </p:cNvPr>
+          <p:cNvPicPr>
+            <a:picLocks noChangeAspect="1"/>
+          </p:cNvPicPr>
+          <p:nvPr/>
+        </p:nvPicPr>
+        <p:blipFill>
+          <a:blip r:embed="rId2"/>
+          <a:stretch>
+            <a:fillRect/>
+          </a:stretch>
+        </p:blipFill>
+        <p:spPr>
+          <a:xfrm>
+            <a:off x="4969874" y="2503891"/>
+            <a:ext cx="3201571" cy="2625894"/>
+          </a:xfrm>
+          <a:prstGeom prst="rect">
+            <a:avLst/>
+          </a:prstGeom>
+        </p:spPr>
+      </p:pic>
+      <p:pic>
+        <p:nvPicPr>
+          <p:cNvPr id="7" name="Picture 6">
+            <a:extLst>
+              <a:ext uri="{FF2B5EF4-FFF2-40B4-BE49-F238E27FC236}">
+                <a16:creationId xmlns:a16="http://schemas.microsoft.com/office/drawing/2014/main" id="{AE9B00A6-F705-8FE5-679F-217FC55C62D9}"/>
+              </a:ext>
+            </a:extLst>
+          </p:cNvPr>
+          <p:cNvPicPr>
+            <a:picLocks noChangeAspect="1"/>
+          </p:cNvPicPr>
+          <p:nvPr/>
+        </p:nvPicPr>
+        <p:blipFill>
+          <a:blip r:embed="rId3"/>
+          <a:stretch>
+            <a:fillRect/>
+          </a:stretch>
+        </p:blipFill>
+        <p:spPr>
+          <a:xfrm>
+            <a:off x="8242337" y="826320"/>
+            <a:ext cx="3432577" cy="2625894"/>
+          </a:xfrm>
+          <a:prstGeom prst="rect">
+            <a:avLst/>
+          </a:prstGeom>
+        </p:spPr>
+      </p:pic>
+      <p:pic>
+        <p:nvPicPr>
+          <p:cNvPr id="11" name="Picture 10">
+            <a:extLst>
+              <a:ext uri="{FF2B5EF4-FFF2-40B4-BE49-F238E27FC236}">
+                <a16:creationId xmlns:a16="http://schemas.microsoft.com/office/drawing/2014/main" id="{7EBFD2FF-4389-D16B-6245-2CDA3E82F269}"/>
+              </a:ext>
+            </a:extLst>
+          </p:cNvPr>
+          <p:cNvPicPr>
+            <a:picLocks noChangeAspect="1"/>
+          </p:cNvPicPr>
+          <p:nvPr/>
+        </p:nvPicPr>
+        <p:blipFill>
+          <a:blip r:embed="rId4"/>
+          <a:stretch>
+            <a:fillRect/>
+          </a:stretch>
+        </p:blipFill>
+        <p:spPr>
+          <a:xfrm>
+            <a:off x="8262467" y="3696836"/>
+            <a:ext cx="3412447" cy="2705156"/>
+          </a:xfrm>
+          <a:prstGeom prst="rect">
+            <a:avLst/>
+          </a:prstGeom>
+        </p:spPr>
+      </p:pic>
+      <p:sp>
+        <p:nvSpPr>
+          <p:cNvPr id="5" name="TextBox 4">
+            <a:extLst>
+              <a:ext uri="{FF2B5EF4-FFF2-40B4-BE49-F238E27FC236}">
+                <a16:creationId xmlns:a16="http://schemas.microsoft.com/office/drawing/2014/main" id="{0BB27B2B-3BF3-3D6E-0A76-5CD15CA9498B}"/>
+              </a:ext>
+            </a:extLst>
+          </p:cNvPr>
+          <p:cNvSpPr txBox="1"/>
+          <p:nvPr/>
+        </p:nvSpPr>
+        <p:spPr>
+          <a:xfrm>
+            <a:off x="587767" y="2139267"/>
+            <a:ext cx="3834704" cy="2246769"/>
+          </a:xfrm>
+          <a:prstGeom prst="rect">
+            <a:avLst/>
+          </a:prstGeom>
+          <a:noFill/>
+        </p:spPr>
+        <p:txBody>
+          <a:bodyPr wrap="none" rtlCol="0">
+            <a:spAutoFit/>
+          </a:bodyPr>
+          <a:lstStyle/>
+          <a:p>
+            <a:r>
+              <a:rPr lang="en-US" sz="1400" dirty="0"/>
+              <a:t>.node</a:t>
+            </a:r>
+          </a:p>
+          <a:p>
+            <a:r>
+              <a:rPr lang="en-US" sz="1400" dirty="0"/>
+              <a:t>I1	1	0	2</a:t>
+            </a:r>
+          </a:p>
+          <a:p>
+            <a:r>
+              <a:rPr lang="en-US" sz="1400" dirty="0"/>
+              <a:t>R1	1	0	1000</a:t>
+            </a:r>
+          </a:p>
+          <a:p>
+            <a:r>
+              <a:rPr lang="en-US" sz="1400" dirty="0"/>
+              <a:t>C1	1	0	0.00001</a:t>
+            </a:r>
+          </a:p>
+          <a:p>
+            <a:r>
+              <a:rPr lang="en-US" sz="1400" dirty="0"/>
+              <a:t>.branch</a:t>
+            </a:r>
+          </a:p>
+          <a:p>
+            <a:r>
+              <a:rPr lang="en-US" sz="1400" dirty="0"/>
+              <a:t>R2	1	2	1000</a:t>
+            </a:r>
+          </a:p>
+          <a:p>
+            <a:r>
+              <a:rPr lang="en-US" sz="1400" dirty="0"/>
+              <a:t>L1	2	3	1</a:t>
+            </a:r>
+          </a:p>
+          <a:p>
+            <a:r>
+              <a:rPr lang="en-US" sz="1400" dirty="0"/>
+              <a:t>.node</a:t>
+            </a:r>
+          </a:p>
+          <a:p>
+            <a:r>
+              <a:rPr lang="en-US" sz="1400" dirty="0"/>
+              <a:t>R3	3	0	1000</a:t>
+            </a:r>
+          </a:p>
+          <a:p>
+            <a:r>
+              <a:rPr lang="en-US" sz="1400" dirty="0"/>
+              <a:t>C2	3	0	0.0000001</a:t>
+            </a:r>
+          </a:p>
+        </p:txBody>
+      </p:sp>
+      <p:pic>
+        <p:nvPicPr>
+          <p:cNvPr id="6" name="Picture 5">
+            <a:extLst>
+              <a:ext uri="{FF2B5EF4-FFF2-40B4-BE49-F238E27FC236}">
+                <a16:creationId xmlns:a16="http://schemas.microsoft.com/office/drawing/2014/main" id="{F0595E92-8FFA-DB6B-0092-8B1B1471379D}"/>
+              </a:ext>
+            </a:extLst>
+          </p:cNvPr>
+          <p:cNvPicPr>
+            <a:picLocks noChangeAspect="1"/>
+          </p:cNvPicPr>
+          <p:nvPr/>
+        </p:nvPicPr>
+        <p:blipFill>
+          <a:blip r:embed="rId5"/>
+          <a:stretch>
+            <a:fillRect/>
+          </a:stretch>
+        </p:blipFill>
+        <p:spPr>
+          <a:xfrm>
+            <a:off x="241403" y="4679618"/>
+            <a:ext cx="4899598" cy="2104168"/>
+          </a:xfrm>
+          <a:prstGeom prst="rect">
+            <a:avLst/>
+          </a:prstGeom>
+        </p:spPr>
+      </p:pic>
+    </p:spTree>
+    <p:extLst>
+      <p:ext uri="{BB962C8B-B14F-4D97-AF65-F5344CB8AC3E}">
+        <p14:creationId xmlns:p14="http://schemas.microsoft.com/office/powerpoint/2010/main" val="2576759932"/>
+      </p:ext>
+    </p:extLst>
+  </p:cSld>
+  <p:clrMapOvr>
+    <a:masterClrMapping/>
+  </p:clrMapOvr>
+</p:sld>
+</file>
+
+<file path=ppt/slides/slide8.xml><?xml version="1.0" encoding="utf-8"?>
+<p:sld xmlns:a="http://schemas.openxmlformats.org/drawingml/2006/main" xmlns:r="http://schemas.openxmlformats.org/officeDocument/2006/relationships" xmlns:p="http://schemas.openxmlformats.org/presentationml/2006/main">
+  <p:cSld>
+    <p:spTree>
+      <p:nvGrpSpPr>
+        <p:cNvPr id="1" name=""/>
+        <p:cNvGrpSpPr/>
+        <p:nvPr/>
+      </p:nvGrpSpPr>
+      <p:grpSpPr>
+        <a:xfrm>
+          <a:off x="0" y="0"/>
+          <a:ext cx="0" cy="0"/>
+          <a:chOff x="0" y="0"/>
+          <a:chExt cx="0" cy="0"/>
+        </a:xfrm>
+      </p:grpSpPr>
+      <p:sp>
+        <p:nvSpPr>
+          <p:cNvPr id="2" name="Title 1">
+            <a:extLst>
+              <a:ext uri="{FF2B5EF4-FFF2-40B4-BE49-F238E27FC236}">
+                <a16:creationId xmlns:a16="http://schemas.microsoft.com/office/drawing/2014/main" id="{17427281-9830-2FB5-E037-4213FEBE2BEF}"/>
+              </a:ext>
+            </a:extLst>
+          </p:cNvPr>
+          <p:cNvSpPr>
+            <a:spLocks noGrp="1"/>
+          </p:cNvSpPr>
+          <p:nvPr>
+            <p:ph type="title"/>
+          </p:nvPr>
+        </p:nvSpPr>
+        <p:spPr/>
+        <p:txBody>
+          <a:bodyPr/>
+          <a:lstStyle/>
+          <a:p>
+            <a:r>
+              <a:rPr lang="en-US" dirty="0"/>
               <a:t>LIM – Instability Example</a:t>
             </a:r>
           </a:p>
@@ -9815,7 +11740,7 @@
 </p:sld>
 </file>
 
-<file path=ppt/slides/slide7.xml><?xml version="1.0" encoding="utf-8"?>
+<file path=ppt/slides/slide9.xml><?xml version="1.0" encoding="utf-8"?>
 <p:sld xmlns:a="http://schemas.openxmlformats.org/drawingml/2006/main" xmlns:r="http://schemas.openxmlformats.org/officeDocument/2006/relationships" xmlns:p="http://schemas.openxmlformats.org/presentationml/2006/main">
   <p:cSld>
     <p:spTree>
@@ -10419,7 +12344,7 @@
           <p:nvPr>
             <p:extLst>
               <p:ext uri="{D42A27DB-BD31-4B8C-83A1-F6EECF244321}">
-                <p14:modId xmlns:p14="http://schemas.microsoft.com/office/powerpoint/2010/main" val="3526472377"/>
+                <p14:modId xmlns:p14="http://schemas.microsoft.com/office/powerpoint/2010/main" val="2305671798"/>
               </p:ext>
             </p:extLst>
           </p:nvPr>

</xml_diff>